<commit_message>
Added delete user and finished powerpoin
</commit_message>
<xml_diff>
--- a/Documents/Business Plan.pptx
+++ b/Documents/Business Plan.pptx
@@ -5,7 +5,7 @@
     <p:sldMasterId id="2147483861" r:id="rId1"/>
   </p:sldMasterIdLst>
   <p:notesMasterIdLst>
-    <p:notesMasterId r:id="rId18"/>
+    <p:notesMasterId r:id="rId19"/>
   </p:notesMasterIdLst>
   <p:sldIdLst>
     <p:sldId id="279" r:id="rId2"/>
@@ -17,13 +17,14 @@
     <p:sldId id="287" r:id="rId8"/>
     <p:sldId id="288" r:id="rId9"/>
     <p:sldId id="289" r:id="rId10"/>
-    <p:sldId id="294" r:id="rId11"/>
-    <p:sldId id="296" r:id="rId12"/>
-    <p:sldId id="297" r:id="rId13"/>
-    <p:sldId id="286" r:id="rId14"/>
-    <p:sldId id="300" r:id="rId15"/>
-    <p:sldId id="292" r:id="rId16"/>
-    <p:sldId id="299" r:id="rId17"/>
+    <p:sldId id="301" r:id="rId11"/>
+    <p:sldId id="294" r:id="rId12"/>
+    <p:sldId id="296" r:id="rId13"/>
+    <p:sldId id="297" r:id="rId14"/>
+    <p:sldId id="286" r:id="rId15"/>
+    <p:sldId id="300" r:id="rId16"/>
+    <p:sldId id="292" r:id="rId17"/>
+    <p:sldId id="299" r:id="rId18"/>
   </p:sldIdLst>
   <p:sldSz cx="9144000" cy="6858000" type="screen4x3"/>
   <p:notesSz cx="6858000" cy="9144000"/>
@@ -4607,6 +4608,753 @@
 </dgm:colorsDef>
 </file>
 
+<file path=ppt/diagrams/colors15.xml><?xml version="1.0" encoding="utf-8"?>
+<dgm:colorsDef xmlns:dgm="http://schemas.openxmlformats.org/drawingml/2006/diagram" xmlns:a="http://schemas.openxmlformats.org/drawingml/2006/main" uniqueId="urn:microsoft.com/office/officeart/2005/8/colors/accent1_2">
+  <dgm:title val=""/>
+  <dgm:desc val=""/>
+  <dgm:catLst>
+    <dgm:cat type="accent1" pri="11200"/>
+  </dgm:catLst>
+  <dgm:styleLbl name="node0">
+    <dgm:fillClrLst meth="repeat">
+      <a:schemeClr val="accent1"/>
+    </dgm:fillClrLst>
+    <dgm:linClrLst meth="repeat">
+      <a:schemeClr val="lt1"/>
+    </dgm:linClrLst>
+    <dgm:effectClrLst/>
+    <dgm:txLinClrLst/>
+    <dgm:txFillClrLst/>
+    <dgm:txEffectClrLst/>
+  </dgm:styleLbl>
+  <dgm:styleLbl name="alignNode1">
+    <dgm:fillClrLst meth="repeat">
+      <a:schemeClr val="accent1"/>
+    </dgm:fillClrLst>
+    <dgm:linClrLst meth="repeat">
+      <a:schemeClr val="accent1"/>
+    </dgm:linClrLst>
+    <dgm:effectClrLst/>
+    <dgm:txLinClrLst/>
+    <dgm:txFillClrLst/>
+    <dgm:txEffectClrLst/>
+  </dgm:styleLbl>
+  <dgm:styleLbl name="node1">
+    <dgm:fillClrLst meth="repeat">
+      <a:schemeClr val="accent1"/>
+    </dgm:fillClrLst>
+    <dgm:linClrLst meth="repeat">
+      <a:schemeClr val="lt1"/>
+    </dgm:linClrLst>
+    <dgm:effectClrLst/>
+    <dgm:txLinClrLst/>
+    <dgm:txFillClrLst/>
+    <dgm:txEffectClrLst/>
+  </dgm:styleLbl>
+  <dgm:styleLbl name="lnNode1">
+    <dgm:fillClrLst meth="repeat">
+      <a:schemeClr val="accent1"/>
+    </dgm:fillClrLst>
+    <dgm:linClrLst meth="repeat">
+      <a:schemeClr val="lt1"/>
+    </dgm:linClrLst>
+    <dgm:effectClrLst/>
+    <dgm:txLinClrLst/>
+    <dgm:txFillClrLst/>
+    <dgm:txEffectClrLst/>
+  </dgm:styleLbl>
+  <dgm:styleLbl name="vennNode1">
+    <dgm:fillClrLst meth="repeat">
+      <a:schemeClr val="accent1">
+        <a:alpha val="50000"/>
+      </a:schemeClr>
+    </dgm:fillClrLst>
+    <dgm:linClrLst meth="repeat">
+      <a:schemeClr val="lt1"/>
+    </dgm:linClrLst>
+    <dgm:effectClrLst/>
+    <dgm:txLinClrLst/>
+    <dgm:txFillClrLst/>
+    <dgm:txEffectClrLst/>
+  </dgm:styleLbl>
+  <dgm:styleLbl name="node2">
+    <dgm:fillClrLst meth="repeat">
+      <a:schemeClr val="accent1"/>
+    </dgm:fillClrLst>
+    <dgm:linClrLst meth="repeat">
+      <a:schemeClr val="lt1"/>
+    </dgm:linClrLst>
+    <dgm:effectClrLst/>
+    <dgm:txLinClrLst/>
+    <dgm:txFillClrLst/>
+    <dgm:txEffectClrLst/>
+  </dgm:styleLbl>
+  <dgm:styleLbl name="node3">
+    <dgm:fillClrLst meth="repeat">
+      <a:schemeClr val="accent1"/>
+    </dgm:fillClrLst>
+    <dgm:linClrLst meth="repeat">
+      <a:schemeClr val="lt1"/>
+    </dgm:linClrLst>
+    <dgm:effectClrLst/>
+    <dgm:txLinClrLst/>
+    <dgm:txFillClrLst/>
+    <dgm:txEffectClrLst/>
+  </dgm:styleLbl>
+  <dgm:styleLbl name="node4">
+    <dgm:fillClrLst meth="repeat">
+      <a:schemeClr val="accent1"/>
+    </dgm:fillClrLst>
+    <dgm:linClrLst meth="repeat">
+      <a:schemeClr val="lt1"/>
+    </dgm:linClrLst>
+    <dgm:effectClrLst/>
+    <dgm:txLinClrLst/>
+    <dgm:txFillClrLst/>
+    <dgm:txEffectClrLst/>
+  </dgm:styleLbl>
+  <dgm:styleLbl name="fgImgPlace1">
+    <dgm:fillClrLst meth="repeat">
+      <a:schemeClr val="accent1">
+        <a:tint val="50000"/>
+      </a:schemeClr>
+    </dgm:fillClrLst>
+    <dgm:linClrLst meth="repeat">
+      <a:schemeClr val="lt1"/>
+    </dgm:linClrLst>
+    <dgm:effectClrLst/>
+    <dgm:txLinClrLst/>
+    <dgm:txFillClrLst meth="repeat">
+      <a:schemeClr val="lt1"/>
+    </dgm:txFillClrLst>
+    <dgm:txEffectClrLst/>
+  </dgm:styleLbl>
+  <dgm:styleLbl name="alignImgPlace1">
+    <dgm:fillClrLst meth="repeat">
+      <a:schemeClr val="accent1">
+        <a:tint val="50000"/>
+      </a:schemeClr>
+    </dgm:fillClrLst>
+    <dgm:linClrLst meth="repeat">
+      <a:schemeClr val="lt1"/>
+    </dgm:linClrLst>
+    <dgm:effectClrLst/>
+    <dgm:txLinClrLst/>
+    <dgm:txFillClrLst meth="repeat">
+      <a:schemeClr val="lt1"/>
+    </dgm:txFillClrLst>
+    <dgm:txEffectClrLst/>
+  </dgm:styleLbl>
+  <dgm:styleLbl name="bgImgPlace1">
+    <dgm:fillClrLst meth="repeat">
+      <a:schemeClr val="accent1">
+        <a:tint val="50000"/>
+      </a:schemeClr>
+    </dgm:fillClrLst>
+    <dgm:linClrLst meth="repeat">
+      <a:schemeClr val="lt1"/>
+    </dgm:linClrLst>
+    <dgm:effectClrLst/>
+    <dgm:txLinClrLst/>
+    <dgm:txFillClrLst meth="repeat">
+      <a:schemeClr val="lt1"/>
+    </dgm:txFillClrLst>
+    <dgm:txEffectClrLst/>
+  </dgm:styleLbl>
+  <dgm:styleLbl name="sibTrans2D1">
+    <dgm:fillClrLst meth="repeat">
+      <a:schemeClr val="accent1">
+        <a:tint val="60000"/>
+      </a:schemeClr>
+    </dgm:fillClrLst>
+    <dgm:linClrLst meth="repeat">
+      <a:schemeClr val="accent1">
+        <a:tint val="60000"/>
+      </a:schemeClr>
+    </dgm:linClrLst>
+    <dgm:effectClrLst/>
+    <dgm:txLinClrLst/>
+    <dgm:txFillClrLst/>
+    <dgm:txEffectClrLst/>
+  </dgm:styleLbl>
+  <dgm:styleLbl name="fgSibTrans2D1">
+    <dgm:fillClrLst meth="repeat">
+      <a:schemeClr val="accent1">
+        <a:tint val="60000"/>
+      </a:schemeClr>
+    </dgm:fillClrLst>
+    <dgm:linClrLst meth="repeat">
+      <a:schemeClr val="accent1">
+        <a:tint val="60000"/>
+      </a:schemeClr>
+    </dgm:linClrLst>
+    <dgm:effectClrLst/>
+    <dgm:txLinClrLst/>
+    <dgm:txFillClrLst/>
+    <dgm:txEffectClrLst/>
+  </dgm:styleLbl>
+  <dgm:styleLbl name="bgSibTrans2D1">
+    <dgm:fillClrLst meth="repeat">
+      <a:schemeClr val="accent1">
+        <a:tint val="60000"/>
+      </a:schemeClr>
+    </dgm:fillClrLst>
+    <dgm:linClrLst meth="repeat">
+      <a:schemeClr val="accent1">
+        <a:tint val="60000"/>
+      </a:schemeClr>
+    </dgm:linClrLst>
+    <dgm:effectClrLst/>
+    <dgm:txLinClrLst/>
+    <dgm:txFillClrLst/>
+    <dgm:txEffectClrLst/>
+  </dgm:styleLbl>
+  <dgm:styleLbl name="sibTrans1D1">
+    <dgm:fillClrLst meth="repeat">
+      <a:schemeClr val="accent1"/>
+    </dgm:fillClrLst>
+    <dgm:linClrLst meth="repeat">
+      <a:schemeClr val="accent1"/>
+    </dgm:linClrLst>
+    <dgm:effectClrLst/>
+    <dgm:txLinClrLst/>
+    <dgm:txFillClrLst meth="repeat">
+      <a:schemeClr val="tx1"/>
+    </dgm:txFillClrLst>
+    <dgm:txEffectClrLst/>
+  </dgm:styleLbl>
+  <dgm:styleLbl name="callout">
+    <dgm:fillClrLst meth="repeat">
+      <a:schemeClr val="accent1"/>
+    </dgm:fillClrLst>
+    <dgm:linClrLst meth="repeat">
+      <a:schemeClr val="accent1">
+        <a:tint val="50000"/>
+      </a:schemeClr>
+    </dgm:linClrLst>
+    <dgm:effectClrLst/>
+    <dgm:txLinClrLst/>
+    <dgm:txFillClrLst meth="repeat">
+      <a:schemeClr val="tx1"/>
+    </dgm:txFillClrLst>
+    <dgm:txEffectClrLst/>
+  </dgm:styleLbl>
+  <dgm:styleLbl name="asst0">
+    <dgm:fillClrLst meth="repeat">
+      <a:schemeClr val="accent1"/>
+    </dgm:fillClrLst>
+    <dgm:linClrLst meth="repeat">
+      <a:schemeClr val="lt1"/>
+    </dgm:linClrLst>
+    <dgm:effectClrLst/>
+    <dgm:txLinClrLst/>
+    <dgm:txFillClrLst/>
+    <dgm:txEffectClrLst/>
+  </dgm:styleLbl>
+  <dgm:styleLbl name="asst1">
+    <dgm:fillClrLst meth="repeat">
+      <a:schemeClr val="accent1"/>
+    </dgm:fillClrLst>
+    <dgm:linClrLst meth="repeat">
+      <a:schemeClr val="lt1"/>
+    </dgm:linClrLst>
+    <dgm:effectClrLst/>
+    <dgm:txLinClrLst/>
+    <dgm:txFillClrLst/>
+    <dgm:txEffectClrLst/>
+  </dgm:styleLbl>
+  <dgm:styleLbl name="asst2">
+    <dgm:fillClrLst meth="repeat">
+      <a:schemeClr val="accent1"/>
+    </dgm:fillClrLst>
+    <dgm:linClrLst meth="repeat">
+      <a:schemeClr val="lt1"/>
+    </dgm:linClrLst>
+    <dgm:effectClrLst/>
+    <dgm:txLinClrLst/>
+    <dgm:txFillClrLst/>
+    <dgm:txEffectClrLst/>
+  </dgm:styleLbl>
+  <dgm:styleLbl name="asst3">
+    <dgm:fillClrLst meth="repeat">
+      <a:schemeClr val="accent1"/>
+    </dgm:fillClrLst>
+    <dgm:linClrLst meth="repeat">
+      <a:schemeClr val="lt1"/>
+    </dgm:linClrLst>
+    <dgm:effectClrLst/>
+    <dgm:txLinClrLst/>
+    <dgm:txFillClrLst/>
+    <dgm:txEffectClrLst/>
+  </dgm:styleLbl>
+  <dgm:styleLbl name="asst4">
+    <dgm:fillClrLst meth="repeat">
+      <a:schemeClr val="accent1"/>
+    </dgm:fillClrLst>
+    <dgm:linClrLst meth="repeat">
+      <a:schemeClr val="lt1"/>
+    </dgm:linClrLst>
+    <dgm:effectClrLst/>
+    <dgm:txLinClrLst/>
+    <dgm:txFillClrLst/>
+    <dgm:txEffectClrLst/>
+  </dgm:styleLbl>
+  <dgm:styleLbl name="parChTrans2D1">
+    <dgm:fillClrLst meth="repeat">
+      <a:schemeClr val="accent1">
+        <a:tint val="60000"/>
+      </a:schemeClr>
+    </dgm:fillClrLst>
+    <dgm:linClrLst meth="repeat">
+      <a:schemeClr val="accent1">
+        <a:tint val="60000"/>
+      </a:schemeClr>
+    </dgm:linClrLst>
+    <dgm:effectClrLst/>
+    <dgm:txLinClrLst/>
+    <dgm:txFillClrLst meth="repeat">
+      <a:schemeClr val="lt1"/>
+    </dgm:txFillClrLst>
+    <dgm:txEffectClrLst/>
+  </dgm:styleLbl>
+  <dgm:styleLbl name="parChTrans2D2">
+    <dgm:fillClrLst meth="repeat">
+      <a:schemeClr val="accent1"/>
+    </dgm:fillClrLst>
+    <dgm:linClrLst meth="repeat">
+      <a:schemeClr val="accent1"/>
+    </dgm:linClrLst>
+    <dgm:effectClrLst/>
+    <dgm:txLinClrLst/>
+    <dgm:txFillClrLst meth="repeat">
+      <a:schemeClr val="lt1"/>
+    </dgm:txFillClrLst>
+    <dgm:txEffectClrLst/>
+  </dgm:styleLbl>
+  <dgm:styleLbl name="parChTrans2D3">
+    <dgm:fillClrLst meth="repeat">
+      <a:schemeClr val="accent1"/>
+    </dgm:fillClrLst>
+    <dgm:linClrLst meth="repeat">
+      <a:schemeClr val="accent1"/>
+    </dgm:linClrLst>
+    <dgm:effectClrLst/>
+    <dgm:txLinClrLst/>
+    <dgm:txFillClrLst meth="repeat">
+      <a:schemeClr val="lt1"/>
+    </dgm:txFillClrLst>
+    <dgm:txEffectClrLst/>
+  </dgm:styleLbl>
+  <dgm:styleLbl name="parChTrans2D4">
+    <dgm:fillClrLst meth="repeat">
+      <a:schemeClr val="accent1"/>
+    </dgm:fillClrLst>
+    <dgm:linClrLst meth="repeat">
+      <a:schemeClr val="accent1"/>
+    </dgm:linClrLst>
+    <dgm:effectClrLst/>
+    <dgm:txLinClrLst/>
+    <dgm:txFillClrLst meth="repeat">
+      <a:schemeClr val="lt1"/>
+    </dgm:txFillClrLst>
+    <dgm:txEffectClrLst/>
+  </dgm:styleLbl>
+  <dgm:styleLbl name="parChTrans1D1">
+    <dgm:fillClrLst meth="repeat">
+      <a:schemeClr val="accent1"/>
+    </dgm:fillClrLst>
+    <dgm:linClrLst meth="repeat">
+      <a:schemeClr val="accent1">
+        <a:shade val="60000"/>
+      </a:schemeClr>
+    </dgm:linClrLst>
+    <dgm:effectClrLst/>
+    <dgm:txLinClrLst/>
+    <dgm:txFillClrLst meth="repeat">
+      <a:schemeClr val="tx1"/>
+    </dgm:txFillClrLst>
+    <dgm:txEffectClrLst/>
+  </dgm:styleLbl>
+  <dgm:styleLbl name="parChTrans1D2">
+    <dgm:fillClrLst meth="repeat">
+      <a:schemeClr val="accent1"/>
+    </dgm:fillClrLst>
+    <dgm:linClrLst meth="repeat">
+      <a:schemeClr val="accent1">
+        <a:shade val="60000"/>
+      </a:schemeClr>
+    </dgm:linClrLst>
+    <dgm:effectClrLst/>
+    <dgm:txLinClrLst/>
+    <dgm:txFillClrLst meth="repeat">
+      <a:schemeClr val="tx1"/>
+    </dgm:txFillClrLst>
+    <dgm:txEffectClrLst/>
+  </dgm:styleLbl>
+  <dgm:styleLbl name="parChTrans1D3">
+    <dgm:fillClrLst meth="repeat">
+      <a:schemeClr val="accent1"/>
+    </dgm:fillClrLst>
+    <dgm:linClrLst meth="repeat">
+      <a:schemeClr val="accent1">
+        <a:shade val="80000"/>
+      </a:schemeClr>
+    </dgm:linClrLst>
+    <dgm:effectClrLst/>
+    <dgm:txLinClrLst/>
+    <dgm:txFillClrLst meth="repeat">
+      <a:schemeClr val="tx1"/>
+    </dgm:txFillClrLst>
+    <dgm:txEffectClrLst/>
+  </dgm:styleLbl>
+  <dgm:styleLbl name="parChTrans1D4">
+    <dgm:fillClrLst meth="repeat">
+      <a:schemeClr val="accent1"/>
+    </dgm:fillClrLst>
+    <dgm:linClrLst meth="repeat">
+      <a:schemeClr val="accent1">
+        <a:shade val="80000"/>
+      </a:schemeClr>
+    </dgm:linClrLst>
+    <dgm:effectClrLst/>
+    <dgm:txLinClrLst/>
+    <dgm:txFillClrLst meth="repeat">
+      <a:schemeClr val="tx1"/>
+    </dgm:txFillClrLst>
+    <dgm:txEffectClrLst/>
+  </dgm:styleLbl>
+  <dgm:styleLbl name="fgAcc1">
+    <dgm:fillClrLst meth="repeat">
+      <a:schemeClr val="lt1">
+        <a:alpha val="90000"/>
+      </a:schemeClr>
+    </dgm:fillClrLst>
+    <dgm:linClrLst meth="repeat">
+      <a:schemeClr val="accent1"/>
+    </dgm:linClrLst>
+    <dgm:effectClrLst/>
+    <dgm:txLinClrLst/>
+    <dgm:txFillClrLst meth="repeat">
+      <a:schemeClr val="dk1"/>
+    </dgm:txFillClrLst>
+    <dgm:txEffectClrLst/>
+  </dgm:styleLbl>
+  <dgm:styleLbl name="conFgAcc1">
+    <dgm:fillClrLst meth="repeat">
+      <a:schemeClr val="lt1">
+        <a:alpha val="90000"/>
+      </a:schemeClr>
+    </dgm:fillClrLst>
+    <dgm:linClrLst meth="repeat">
+      <a:schemeClr val="accent1"/>
+    </dgm:linClrLst>
+    <dgm:effectClrLst/>
+    <dgm:txLinClrLst/>
+    <dgm:txFillClrLst meth="repeat">
+      <a:schemeClr val="dk1"/>
+    </dgm:txFillClrLst>
+    <dgm:txEffectClrLst/>
+  </dgm:styleLbl>
+  <dgm:styleLbl name="alignAcc1">
+    <dgm:fillClrLst meth="repeat">
+      <a:schemeClr val="lt1">
+        <a:alpha val="90000"/>
+      </a:schemeClr>
+    </dgm:fillClrLst>
+    <dgm:linClrLst meth="repeat">
+      <a:schemeClr val="accent1"/>
+    </dgm:linClrLst>
+    <dgm:effectClrLst/>
+    <dgm:txLinClrLst/>
+    <dgm:txFillClrLst meth="repeat">
+      <a:schemeClr val="dk1"/>
+    </dgm:txFillClrLst>
+    <dgm:txEffectClrLst/>
+  </dgm:styleLbl>
+  <dgm:styleLbl name="trAlignAcc1">
+    <dgm:fillClrLst meth="repeat">
+      <a:schemeClr val="lt1">
+        <a:alpha val="40000"/>
+      </a:schemeClr>
+    </dgm:fillClrLst>
+    <dgm:linClrLst meth="repeat">
+      <a:schemeClr val="accent1"/>
+    </dgm:linClrLst>
+    <dgm:effectClrLst/>
+    <dgm:txLinClrLst/>
+    <dgm:txFillClrLst meth="repeat">
+      <a:schemeClr val="dk1"/>
+    </dgm:txFillClrLst>
+    <dgm:txEffectClrLst/>
+  </dgm:styleLbl>
+  <dgm:styleLbl name="bgAcc1">
+    <dgm:fillClrLst meth="repeat">
+      <a:schemeClr val="lt1">
+        <a:alpha val="90000"/>
+      </a:schemeClr>
+    </dgm:fillClrLst>
+    <dgm:linClrLst meth="repeat">
+      <a:schemeClr val="accent1"/>
+    </dgm:linClrLst>
+    <dgm:effectClrLst/>
+    <dgm:txLinClrLst/>
+    <dgm:txFillClrLst meth="repeat">
+      <a:schemeClr val="dk1"/>
+    </dgm:txFillClrLst>
+    <dgm:txEffectClrLst/>
+  </dgm:styleLbl>
+  <dgm:styleLbl name="solidFgAcc1">
+    <dgm:fillClrLst meth="repeat">
+      <a:schemeClr val="lt1"/>
+    </dgm:fillClrLst>
+    <dgm:linClrLst meth="repeat">
+      <a:schemeClr val="accent1"/>
+    </dgm:linClrLst>
+    <dgm:effectClrLst/>
+    <dgm:txLinClrLst/>
+    <dgm:txFillClrLst meth="repeat">
+      <a:schemeClr val="dk1"/>
+    </dgm:txFillClrLst>
+    <dgm:txEffectClrLst/>
+  </dgm:styleLbl>
+  <dgm:styleLbl name="solidAlignAcc1">
+    <dgm:fillClrLst meth="repeat">
+      <a:schemeClr val="lt1"/>
+    </dgm:fillClrLst>
+    <dgm:linClrLst meth="repeat">
+      <a:schemeClr val="accent1"/>
+    </dgm:linClrLst>
+    <dgm:effectClrLst/>
+    <dgm:txLinClrLst/>
+    <dgm:txFillClrLst meth="repeat">
+      <a:schemeClr val="dk1"/>
+    </dgm:txFillClrLst>
+    <dgm:txEffectClrLst/>
+  </dgm:styleLbl>
+  <dgm:styleLbl name="solidBgAcc1">
+    <dgm:fillClrLst meth="repeat">
+      <a:schemeClr val="lt1"/>
+    </dgm:fillClrLst>
+    <dgm:linClrLst meth="repeat">
+      <a:schemeClr val="accent1"/>
+    </dgm:linClrLst>
+    <dgm:effectClrLst/>
+    <dgm:txLinClrLst/>
+    <dgm:txFillClrLst meth="repeat">
+      <a:schemeClr val="dk1"/>
+    </dgm:txFillClrLst>
+    <dgm:txEffectClrLst/>
+  </dgm:styleLbl>
+  <dgm:styleLbl name="fgAccFollowNode1">
+    <dgm:fillClrLst meth="repeat">
+      <a:schemeClr val="accent1">
+        <a:alpha val="90000"/>
+        <a:tint val="40000"/>
+      </a:schemeClr>
+    </dgm:fillClrLst>
+    <dgm:linClrLst meth="repeat">
+      <a:schemeClr val="accent1">
+        <a:alpha val="90000"/>
+        <a:tint val="40000"/>
+      </a:schemeClr>
+    </dgm:linClrLst>
+    <dgm:effectClrLst/>
+    <dgm:txLinClrLst/>
+    <dgm:txFillClrLst meth="repeat">
+      <a:schemeClr val="dk1"/>
+    </dgm:txFillClrLst>
+    <dgm:txEffectClrLst/>
+  </dgm:styleLbl>
+  <dgm:styleLbl name="alignAccFollowNode1">
+    <dgm:fillClrLst meth="repeat">
+      <a:schemeClr val="accent1">
+        <a:alpha val="90000"/>
+        <a:tint val="40000"/>
+      </a:schemeClr>
+    </dgm:fillClrLst>
+    <dgm:linClrLst meth="repeat">
+      <a:schemeClr val="accent1">
+        <a:alpha val="90000"/>
+        <a:tint val="40000"/>
+      </a:schemeClr>
+    </dgm:linClrLst>
+    <dgm:effectClrLst/>
+    <dgm:txLinClrLst/>
+    <dgm:txFillClrLst meth="repeat">
+      <a:schemeClr val="dk1"/>
+    </dgm:txFillClrLst>
+    <dgm:txEffectClrLst/>
+  </dgm:styleLbl>
+  <dgm:styleLbl name="bgAccFollowNode1">
+    <dgm:fillClrLst meth="repeat">
+      <a:schemeClr val="accent1">
+        <a:alpha val="90000"/>
+        <a:tint val="40000"/>
+      </a:schemeClr>
+    </dgm:fillClrLst>
+    <dgm:linClrLst meth="repeat">
+      <a:schemeClr val="accent1">
+        <a:alpha val="90000"/>
+        <a:tint val="40000"/>
+      </a:schemeClr>
+    </dgm:linClrLst>
+    <dgm:effectClrLst/>
+    <dgm:txLinClrLst/>
+    <dgm:txFillClrLst meth="repeat">
+      <a:schemeClr val="dk1"/>
+    </dgm:txFillClrLst>
+    <dgm:txEffectClrLst/>
+  </dgm:styleLbl>
+  <dgm:styleLbl name="fgAcc0">
+    <dgm:fillClrLst meth="repeat">
+      <a:schemeClr val="lt1">
+        <a:alpha val="90000"/>
+      </a:schemeClr>
+    </dgm:fillClrLst>
+    <dgm:linClrLst meth="repeat">
+      <a:schemeClr val="accent1"/>
+    </dgm:linClrLst>
+    <dgm:effectClrLst/>
+    <dgm:txLinClrLst/>
+    <dgm:txFillClrLst meth="repeat">
+      <a:schemeClr val="dk1"/>
+    </dgm:txFillClrLst>
+    <dgm:txEffectClrLst/>
+  </dgm:styleLbl>
+  <dgm:styleLbl name="fgAcc2">
+    <dgm:fillClrLst meth="repeat">
+      <a:schemeClr val="lt1">
+        <a:alpha val="90000"/>
+      </a:schemeClr>
+    </dgm:fillClrLst>
+    <dgm:linClrLst meth="repeat">
+      <a:schemeClr val="accent1"/>
+    </dgm:linClrLst>
+    <dgm:effectClrLst/>
+    <dgm:txLinClrLst/>
+    <dgm:txFillClrLst meth="repeat">
+      <a:schemeClr val="dk1"/>
+    </dgm:txFillClrLst>
+    <dgm:txEffectClrLst/>
+  </dgm:styleLbl>
+  <dgm:styleLbl name="fgAcc3">
+    <dgm:fillClrLst meth="repeat">
+      <a:schemeClr val="lt1">
+        <a:alpha val="90000"/>
+      </a:schemeClr>
+    </dgm:fillClrLst>
+    <dgm:linClrLst meth="repeat">
+      <a:schemeClr val="accent1"/>
+    </dgm:linClrLst>
+    <dgm:effectClrLst/>
+    <dgm:txLinClrLst/>
+    <dgm:txFillClrLst meth="repeat">
+      <a:schemeClr val="dk1"/>
+    </dgm:txFillClrLst>
+    <dgm:txEffectClrLst/>
+  </dgm:styleLbl>
+  <dgm:styleLbl name="fgAcc4">
+    <dgm:fillClrLst meth="repeat">
+      <a:schemeClr val="lt1">
+        <a:alpha val="90000"/>
+      </a:schemeClr>
+    </dgm:fillClrLst>
+    <dgm:linClrLst meth="repeat">
+      <a:schemeClr val="accent1"/>
+    </dgm:linClrLst>
+    <dgm:effectClrLst/>
+    <dgm:txLinClrLst/>
+    <dgm:txFillClrLst meth="repeat">
+      <a:schemeClr val="dk1"/>
+    </dgm:txFillClrLst>
+    <dgm:txEffectClrLst/>
+  </dgm:styleLbl>
+  <dgm:styleLbl name="bgShp">
+    <dgm:fillClrLst meth="repeat">
+      <a:schemeClr val="accent1">
+        <a:tint val="40000"/>
+      </a:schemeClr>
+    </dgm:fillClrLst>
+    <dgm:linClrLst meth="repeat">
+      <a:schemeClr val="accent1"/>
+    </dgm:linClrLst>
+    <dgm:effectClrLst/>
+    <dgm:txLinClrLst/>
+    <dgm:txFillClrLst meth="repeat">
+      <a:schemeClr val="dk1"/>
+    </dgm:txFillClrLst>
+    <dgm:txEffectClrLst/>
+  </dgm:styleLbl>
+  <dgm:styleLbl name="dkBgShp">
+    <dgm:fillClrLst meth="repeat">
+      <a:schemeClr val="accent1">
+        <a:shade val="80000"/>
+      </a:schemeClr>
+    </dgm:fillClrLst>
+    <dgm:linClrLst meth="repeat">
+      <a:schemeClr val="accent1"/>
+    </dgm:linClrLst>
+    <dgm:effectClrLst/>
+    <dgm:txLinClrLst/>
+    <dgm:txFillClrLst meth="repeat">
+      <a:schemeClr val="lt1"/>
+    </dgm:txFillClrLst>
+    <dgm:txEffectClrLst/>
+  </dgm:styleLbl>
+  <dgm:styleLbl name="trBgShp">
+    <dgm:fillClrLst meth="repeat">
+      <a:schemeClr val="accent1">
+        <a:tint val="50000"/>
+        <a:alpha val="40000"/>
+      </a:schemeClr>
+    </dgm:fillClrLst>
+    <dgm:linClrLst meth="repeat">
+      <a:schemeClr val="accent1"/>
+    </dgm:linClrLst>
+    <dgm:effectClrLst/>
+    <dgm:txLinClrLst/>
+    <dgm:txFillClrLst meth="repeat">
+      <a:schemeClr val="lt1"/>
+    </dgm:txFillClrLst>
+    <dgm:txEffectClrLst/>
+  </dgm:styleLbl>
+  <dgm:styleLbl name="fgShp">
+    <dgm:fillClrLst meth="repeat">
+      <a:schemeClr val="accent1">
+        <a:tint val="60000"/>
+      </a:schemeClr>
+    </dgm:fillClrLst>
+    <dgm:linClrLst meth="repeat">
+      <a:schemeClr val="lt1"/>
+    </dgm:linClrLst>
+    <dgm:effectClrLst/>
+    <dgm:txLinClrLst/>
+    <dgm:txFillClrLst meth="repeat">
+      <a:schemeClr val="dk1"/>
+    </dgm:txFillClrLst>
+    <dgm:txEffectClrLst/>
+  </dgm:styleLbl>
+  <dgm:styleLbl name="revTx">
+    <dgm:fillClrLst meth="repeat">
+      <a:schemeClr val="lt1">
+        <a:alpha val="0"/>
+      </a:schemeClr>
+    </dgm:fillClrLst>
+    <dgm:linClrLst meth="repeat">
+      <a:schemeClr val="dk1">
+        <a:alpha val="0"/>
+      </a:schemeClr>
+    </dgm:linClrLst>
+    <dgm:effectClrLst/>
+    <dgm:txLinClrLst/>
+    <dgm:txFillClrLst meth="repeat">
+      <a:schemeClr val="tx1"/>
+    </dgm:txFillClrLst>
+    <dgm:txEffectClrLst/>
+  </dgm:styleLbl>
+</dgm:colorsDef>
+</file>
+
 <file path=ppt/diagrams/colors2.xml><?xml version="1.0" encoding="utf-8"?>
 <dgm:colorsDef xmlns:dgm="http://schemas.openxmlformats.org/drawingml/2006/diagram" xmlns:a="http://schemas.openxmlformats.org/drawingml/2006/main" uniqueId="urn:microsoft.com/office/officeart/2005/8/colors/accent1_2">
   <dgm:title val=""/>
@@ -10885,7 +11633,7 @@
                 </a:solidFill>
               </a:ln>
             </a:rPr>
-            <a:t>Powerful Algorithms</a:t>
+            <a:t>Store Data</a:t>
           </a:r>
           <a:endParaRPr lang="en-US" sz="3600" dirty="0">
             <a:ln>
@@ -11280,30 +12028,30 @@
     </dgm:pt>
   </dgm:ptLst>
   <dgm:cxnLst>
+    <dgm:cxn modelId="{1A6CFF73-36C7-2D44-9B63-4F1E0ECBBD86}" srcId="{2209AEEA-5F84-E64F-9EBD-8FF772D27DF8}" destId="{D1F92C95-CFF0-9F4A-B33A-2E110BADCD67}" srcOrd="6" destOrd="0" parTransId="{9804EC8D-0F99-8742-B1BC-7B84EE529766}" sibTransId="{9B26A82C-852C-5244-9054-12C94E60B5FB}"/>
+    <dgm:cxn modelId="{0E1C4437-5646-4140-91F7-3F76CCB9C8BE}" type="presOf" srcId="{19D708D6-D27D-3A4B-886A-DB7B0D510F2C}" destId="{EBF8DBF3-6E5F-5847-A68E-96B2A92CD659}" srcOrd="0" destOrd="2" presId="urn:microsoft.com/office/officeart/2005/8/layout/hList1"/>
+    <dgm:cxn modelId="{BF661864-A4AE-C24E-8C24-EA0EF2930AC5}" srcId="{70A5E778-AFCA-A946-B6B7-E9018C237695}" destId="{2209AEEA-5F84-E64F-9EBD-8FF772D27DF8}" srcOrd="0" destOrd="0" parTransId="{0BA36C0C-9D9C-6645-A703-125733D3F321}" sibTransId="{EA937E8A-C8D0-3E4B-8C0E-14BE6580222D}"/>
+    <dgm:cxn modelId="{28543334-FB22-D449-9748-CAC6B818BC69}" srcId="{2209AEEA-5F84-E64F-9EBD-8FF772D27DF8}" destId="{1A57E6ED-CEBB-3C46-8F99-7D04431D0C52}" srcOrd="3" destOrd="0" parTransId="{DA92A563-5C1B-BE4D-8737-0B98ABC82931}" sibTransId="{F22B4315-3F2C-0E4A-96F0-D69EC6A590E1}"/>
+    <dgm:cxn modelId="{791224CE-C319-5844-9B19-A234249B1C35}" type="presOf" srcId="{EDDA4A65-D04B-224D-B4E4-0DE423E1DCF9}" destId="{EBF8DBF3-6E5F-5847-A68E-96B2A92CD659}" srcOrd="0" destOrd="0" presId="urn:microsoft.com/office/officeart/2005/8/layout/hList1"/>
     <dgm:cxn modelId="{4D568ADB-1919-1344-970F-1B28E2780C98}" srcId="{2209AEEA-5F84-E64F-9EBD-8FF772D27DF8}" destId="{19D708D6-D27D-3A4B-886A-DB7B0D510F2C}" srcOrd="2" destOrd="0" parTransId="{C286A733-AF5C-6848-95CF-E93FC133EE08}" sibTransId="{E3E3F5CD-4260-FA4D-8782-CB3397950BEC}"/>
-    <dgm:cxn modelId="{D0C755B0-9D5F-9947-8051-93EB790E6B5D}" type="presOf" srcId="{749BBB69-76B8-6349-8047-68683438B47A}" destId="{EBF8DBF3-6E5F-5847-A68E-96B2A92CD659}" srcOrd="0" destOrd="5" presId="urn:microsoft.com/office/officeart/2005/8/layout/hList1"/>
+    <dgm:cxn modelId="{E23B7ACD-1DFB-EF47-B92C-1099034D93B5}" type="presOf" srcId="{1A57E6ED-CEBB-3C46-8F99-7D04431D0C52}" destId="{EBF8DBF3-6E5F-5847-A68E-96B2A92CD659}" srcOrd="0" destOrd="3" presId="urn:microsoft.com/office/officeart/2005/8/layout/hList1"/>
+    <dgm:cxn modelId="{E8CED718-8780-4549-88A8-AD40DF7B5D99}" type="presOf" srcId="{93E094C9-DA5B-6F49-BC95-7851E6C5C530}" destId="{EBF8DBF3-6E5F-5847-A68E-96B2A92CD659}" srcOrd="0" destOrd="7" presId="urn:microsoft.com/office/officeart/2005/8/layout/hList1"/>
+    <dgm:cxn modelId="{947A11EF-6AB9-4544-9090-34B4957F3133}" srcId="{2209AEEA-5F84-E64F-9EBD-8FF772D27DF8}" destId="{10410FBB-2576-8C40-A58C-AB25EB573677}" srcOrd="4" destOrd="0" parTransId="{352CB9BC-710C-914A-BED6-D5E1EC8BE968}" sibTransId="{AE660217-24EA-D64B-916C-D29DE107F60D}"/>
+    <dgm:cxn modelId="{1BD023D4-3CBD-D844-9043-7EC65E80348D}" type="presOf" srcId="{0147E501-E825-5446-BF3F-C5170975A319}" destId="{EBF8DBF3-6E5F-5847-A68E-96B2A92CD659}" srcOrd="0" destOrd="8" presId="urn:microsoft.com/office/officeart/2005/8/layout/hList1"/>
+    <dgm:cxn modelId="{397B7B44-30EA-7D41-B313-EAD2D7685EF3}" type="presOf" srcId="{70A5E778-AFCA-A946-B6B7-E9018C237695}" destId="{CB7460AF-4F25-BD4E-960C-96B640F3AA05}" srcOrd="0" destOrd="0" presId="urn:microsoft.com/office/officeart/2005/8/layout/hList1"/>
+    <dgm:cxn modelId="{A0CDDB70-AD7C-944C-ACF6-1DCD3F342530}" srcId="{2209AEEA-5F84-E64F-9EBD-8FF772D27DF8}" destId="{EDDA4A65-D04B-224D-B4E4-0DE423E1DCF9}" srcOrd="0" destOrd="0" parTransId="{1288CC64-A9EB-CC4F-A8E4-1EE28C097D7A}" sibTransId="{A931BE9D-D3BD-0344-B8ED-7AB03B82E613}"/>
+    <dgm:cxn modelId="{4CB615A8-7F15-A74E-8A3D-CE5A5A104012}" srcId="{2209AEEA-5F84-E64F-9EBD-8FF772D27DF8}" destId="{749BBB69-76B8-6349-8047-68683438B47A}" srcOrd="5" destOrd="0" parTransId="{E40F8621-1CC0-6F47-9857-AFB0DDD5EBF6}" sibTransId="{A5271B73-2A2F-A94F-8B57-58D34F0B4FCE}"/>
     <dgm:cxn modelId="{6B45AE64-D9FB-0140-95F0-B25F0B2CBC06}" srcId="{2209AEEA-5F84-E64F-9EBD-8FF772D27DF8}" destId="{93E094C9-DA5B-6F49-BC95-7851E6C5C530}" srcOrd="7" destOrd="0" parTransId="{C3BB2670-AB4F-4C47-8A9D-9B2DF804B807}" sibTransId="{B189A5C0-08A1-044A-822A-C45BB8C973FA}"/>
-    <dgm:cxn modelId="{CD12923A-33D9-EB4A-98A3-F0DB8AEAC077}" type="presOf" srcId="{1A57E6ED-CEBB-3C46-8F99-7D04431D0C52}" destId="{EBF8DBF3-6E5F-5847-A68E-96B2A92CD659}" srcOrd="0" destOrd="3" presId="urn:microsoft.com/office/officeart/2005/8/layout/hList1"/>
+    <dgm:cxn modelId="{539E65E0-E303-7041-A920-2F68B2AFDBEE}" type="presOf" srcId="{749BBB69-76B8-6349-8047-68683438B47A}" destId="{EBF8DBF3-6E5F-5847-A68E-96B2A92CD659}" srcOrd="0" destOrd="5" presId="urn:microsoft.com/office/officeart/2005/8/layout/hList1"/>
+    <dgm:cxn modelId="{A37F5184-00B3-3848-9177-49FD4563483F}" type="presOf" srcId="{2209AEEA-5F84-E64F-9EBD-8FF772D27DF8}" destId="{7E6C81D4-705E-6B42-A657-E351F81CCFF3}" srcOrd="0" destOrd="0" presId="urn:microsoft.com/office/officeart/2005/8/layout/hList1"/>
+    <dgm:cxn modelId="{0179D9A5-B756-F64C-B518-09E8B7BA3AFB}" type="presOf" srcId="{5ACD7E5B-B339-EB4A-AD50-AD20C86800DA}" destId="{EBF8DBF3-6E5F-5847-A68E-96B2A92CD659}" srcOrd="0" destOrd="1" presId="urn:microsoft.com/office/officeart/2005/8/layout/hList1"/>
+    <dgm:cxn modelId="{CB42AF44-D50D-E74A-8D41-581EF940F11E}" type="presOf" srcId="{10410FBB-2576-8C40-A58C-AB25EB573677}" destId="{EBF8DBF3-6E5F-5847-A68E-96B2A92CD659}" srcOrd="0" destOrd="4" presId="urn:microsoft.com/office/officeart/2005/8/layout/hList1"/>
+    <dgm:cxn modelId="{A88A4F7F-C548-1F4F-A013-D131D7F82B17}" type="presOf" srcId="{D1F92C95-CFF0-9F4A-B33A-2E110BADCD67}" destId="{EBF8DBF3-6E5F-5847-A68E-96B2A92CD659}" srcOrd="0" destOrd="6" presId="urn:microsoft.com/office/officeart/2005/8/layout/hList1"/>
+    <dgm:cxn modelId="{E399124C-EE63-0340-94C6-87C7AEEAF923}" srcId="{2209AEEA-5F84-E64F-9EBD-8FF772D27DF8}" destId="{0147E501-E825-5446-BF3F-C5170975A319}" srcOrd="8" destOrd="0" parTransId="{09BE2E53-BF92-6241-88E5-5DB9BCFE7E9D}" sibTransId="{50B296DE-FD30-AC4B-8E06-1ADD2399D396}"/>
     <dgm:cxn modelId="{10F00651-17C0-C549-A2AD-37880B65C920}" srcId="{2209AEEA-5F84-E64F-9EBD-8FF772D27DF8}" destId="{5ACD7E5B-B339-EB4A-AD50-AD20C86800DA}" srcOrd="1" destOrd="0" parTransId="{4A9186E9-0099-E34A-A0E9-08AFFC91B1C7}" sibTransId="{186D8D00-8BFB-E346-B2F4-BE068FB07C0C}"/>
-    <dgm:cxn modelId="{CA2F41D0-3260-E143-B04D-9E9084426DAF}" type="presOf" srcId="{19D708D6-D27D-3A4B-886A-DB7B0D510F2C}" destId="{EBF8DBF3-6E5F-5847-A68E-96B2A92CD659}" srcOrd="0" destOrd="2" presId="urn:microsoft.com/office/officeart/2005/8/layout/hList1"/>
-    <dgm:cxn modelId="{1A6CFF73-36C7-2D44-9B63-4F1E0ECBBD86}" srcId="{2209AEEA-5F84-E64F-9EBD-8FF772D27DF8}" destId="{D1F92C95-CFF0-9F4A-B33A-2E110BADCD67}" srcOrd="6" destOrd="0" parTransId="{9804EC8D-0F99-8742-B1BC-7B84EE529766}" sibTransId="{9B26A82C-852C-5244-9054-12C94E60B5FB}"/>
-    <dgm:cxn modelId="{EC2FEE01-FDC2-0940-B649-D3A181DB7349}" type="presOf" srcId="{10410FBB-2576-8C40-A58C-AB25EB573677}" destId="{EBF8DBF3-6E5F-5847-A68E-96B2A92CD659}" srcOrd="0" destOrd="4" presId="urn:microsoft.com/office/officeart/2005/8/layout/hList1"/>
-    <dgm:cxn modelId="{E5C38527-DE21-E846-B69D-1DBB84EC98B3}" type="presOf" srcId="{93E094C9-DA5B-6F49-BC95-7851E6C5C530}" destId="{EBF8DBF3-6E5F-5847-A68E-96B2A92CD659}" srcOrd="0" destOrd="7" presId="urn:microsoft.com/office/officeart/2005/8/layout/hList1"/>
-    <dgm:cxn modelId="{947A11EF-6AB9-4544-9090-34B4957F3133}" srcId="{2209AEEA-5F84-E64F-9EBD-8FF772D27DF8}" destId="{10410FBB-2576-8C40-A58C-AB25EB573677}" srcOrd="4" destOrd="0" parTransId="{352CB9BC-710C-914A-BED6-D5E1EC8BE968}" sibTransId="{AE660217-24EA-D64B-916C-D29DE107F60D}"/>
-    <dgm:cxn modelId="{4CB615A8-7F15-A74E-8A3D-CE5A5A104012}" srcId="{2209AEEA-5F84-E64F-9EBD-8FF772D27DF8}" destId="{749BBB69-76B8-6349-8047-68683438B47A}" srcOrd="5" destOrd="0" parTransId="{E40F8621-1CC0-6F47-9857-AFB0DDD5EBF6}" sibTransId="{A5271B73-2A2F-A94F-8B57-58D34F0B4FCE}"/>
-    <dgm:cxn modelId="{74796AD7-A235-1143-AD13-897246EA7FE4}" type="presOf" srcId="{5ACD7E5B-B339-EB4A-AD50-AD20C86800DA}" destId="{EBF8DBF3-6E5F-5847-A68E-96B2A92CD659}" srcOrd="0" destOrd="1" presId="urn:microsoft.com/office/officeart/2005/8/layout/hList1"/>
-    <dgm:cxn modelId="{A0CDDB70-AD7C-944C-ACF6-1DCD3F342530}" srcId="{2209AEEA-5F84-E64F-9EBD-8FF772D27DF8}" destId="{EDDA4A65-D04B-224D-B4E4-0DE423E1DCF9}" srcOrd="0" destOrd="0" parTransId="{1288CC64-A9EB-CC4F-A8E4-1EE28C097D7A}" sibTransId="{A931BE9D-D3BD-0344-B8ED-7AB03B82E613}"/>
-    <dgm:cxn modelId="{28543334-FB22-D449-9748-CAC6B818BC69}" srcId="{2209AEEA-5F84-E64F-9EBD-8FF772D27DF8}" destId="{1A57E6ED-CEBB-3C46-8F99-7D04431D0C52}" srcOrd="3" destOrd="0" parTransId="{DA92A563-5C1B-BE4D-8737-0B98ABC82931}" sibTransId="{F22B4315-3F2C-0E4A-96F0-D69EC6A590E1}"/>
-    <dgm:cxn modelId="{BF661864-A4AE-C24E-8C24-EA0EF2930AC5}" srcId="{70A5E778-AFCA-A946-B6B7-E9018C237695}" destId="{2209AEEA-5F84-E64F-9EBD-8FF772D27DF8}" srcOrd="0" destOrd="0" parTransId="{0BA36C0C-9D9C-6645-A703-125733D3F321}" sibTransId="{EA937E8A-C8D0-3E4B-8C0E-14BE6580222D}"/>
-    <dgm:cxn modelId="{6BA44BF6-EE50-064E-B72A-8F6C8FFD8DFE}" type="presOf" srcId="{70A5E778-AFCA-A946-B6B7-E9018C237695}" destId="{CB7460AF-4F25-BD4E-960C-96B640F3AA05}" srcOrd="0" destOrd="0" presId="urn:microsoft.com/office/officeart/2005/8/layout/hList1"/>
-    <dgm:cxn modelId="{506F9E4C-D770-0541-972E-A1EDEF837F0E}" type="presOf" srcId="{EDDA4A65-D04B-224D-B4E4-0DE423E1DCF9}" destId="{EBF8DBF3-6E5F-5847-A68E-96B2A92CD659}" srcOrd="0" destOrd="0" presId="urn:microsoft.com/office/officeart/2005/8/layout/hList1"/>
-    <dgm:cxn modelId="{E399124C-EE63-0340-94C6-87C7AEEAF923}" srcId="{2209AEEA-5F84-E64F-9EBD-8FF772D27DF8}" destId="{0147E501-E825-5446-BF3F-C5170975A319}" srcOrd="8" destOrd="0" parTransId="{09BE2E53-BF92-6241-88E5-5DB9BCFE7E9D}" sibTransId="{50B296DE-FD30-AC4B-8E06-1ADD2399D396}"/>
-    <dgm:cxn modelId="{C203454D-2E29-6F44-9D06-16E784EA951A}" type="presOf" srcId="{2209AEEA-5F84-E64F-9EBD-8FF772D27DF8}" destId="{7E6C81D4-705E-6B42-A657-E351F81CCFF3}" srcOrd="0" destOrd="0" presId="urn:microsoft.com/office/officeart/2005/8/layout/hList1"/>
-    <dgm:cxn modelId="{716A7991-B69F-A049-B1CB-66E8C362CE07}" type="presOf" srcId="{0147E501-E825-5446-BF3F-C5170975A319}" destId="{EBF8DBF3-6E5F-5847-A68E-96B2A92CD659}" srcOrd="0" destOrd="8" presId="urn:microsoft.com/office/officeart/2005/8/layout/hList1"/>
-    <dgm:cxn modelId="{8EF9BADD-8BB0-0A44-8B11-F8A6F7457859}" type="presOf" srcId="{D1F92C95-CFF0-9F4A-B33A-2E110BADCD67}" destId="{EBF8DBF3-6E5F-5847-A68E-96B2A92CD659}" srcOrd="0" destOrd="6" presId="urn:microsoft.com/office/officeart/2005/8/layout/hList1"/>
-    <dgm:cxn modelId="{3FCC167C-0916-4544-908D-71DADB250E72}" type="presParOf" srcId="{CB7460AF-4F25-BD4E-960C-96B640F3AA05}" destId="{B17656AB-CE6F-3840-95E0-D1E085C4626A}" srcOrd="0" destOrd="0" presId="urn:microsoft.com/office/officeart/2005/8/layout/hList1"/>
-    <dgm:cxn modelId="{49874756-A21B-0C49-B809-16D95FAB4593}" type="presParOf" srcId="{B17656AB-CE6F-3840-95E0-D1E085C4626A}" destId="{7E6C81D4-705E-6B42-A657-E351F81CCFF3}" srcOrd="0" destOrd="0" presId="urn:microsoft.com/office/officeart/2005/8/layout/hList1"/>
-    <dgm:cxn modelId="{BEE1F6ED-50C6-434D-A98D-E342B9158B05}" type="presParOf" srcId="{B17656AB-CE6F-3840-95E0-D1E085C4626A}" destId="{EBF8DBF3-6E5F-5847-A68E-96B2A92CD659}" srcOrd="1" destOrd="0" presId="urn:microsoft.com/office/officeart/2005/8/layout/hList1"/>
+    <dgm:cxn modelId="{4ABFDCC8-3BA2-3A42-BC41-E26755B5F088}" type="presParOf" srcId="{CB7460AF-4F25-BD4E-960C-96B640F3AA05}" destId="{B17656AB-CE6F-3840-95E0-D1E085C4626A}" srcOrd="0" destOrd="0" presId="urn:microsoft.com/office/officeart/2005/8/layout/hList1"/>
+    <dgm:cxn modelId="{9EF79472-F72E-B24F-89BF-5A279C99442D}" type="presParOf" srcId="{B17656AB-CE6F-3840-95E0-D1E085C4626A}" destId="{7E6C81D4-705E-6B42-A657-E351F81CCFF3}" srcOrd="0" destOrd="0" presId="urn:microsoft.com/office/officeart/2005/8/layout/hList1"/>
+    <dgm:cxn modelId="{E1A34017-04EB-4B44-AF51-EF6A2B597262}" type="presParOf" srcId="{B17656AB-CE6F-3840-95E0-D1E085C4626A}" destId="{EBF8DBF3-6E5F-5847-A68E-96B2A92CD659}" srcOrd="1" destOrd="0" presId="urn:microsoft.com/office/officeart/2005/8/layout/hList1"/>
   </dgm:cxnLst>
   <dgm:bg/>
   <dgm:whole/>
@@ -11356,7 +12104,7 @@
                 </a:solidFill>
               </a:ln>
             </a:rPr>
-            <a:t>Simple Interface</a:t>
+            <a:t>Powerful Algorithms</a:t>
           </a:r>
           <a:endParaRPr lang="en-US" sz="3600" dirty="0">
             <a:ln>
@@ -11752,29 +12500,29 @@
   </dgm:ptLst>
   <dgm:cxnLst>
     <dgm:cxn modelId="{1A6CFF73-36C7-2D44-9B63-4F1E0ECBBD86}" srcId="{2209AEEA-5F84-E64F-9EBD-8FF772D27DF8}" destId="{D1F92C95-CFF0-9F4A-B33A-2E110BADCD67}" srcOrd="6" destOrd="0" parTransId="{9804EC8D-0F99-8742-B1BC-7B84EE529766}" sibTransId="{9B26A82C-852C-5244-9054-12C94E60B5FB}"/>
+    <dgm:cxn modelId="{CD12923A-33D9-EB4A-98A3-F0DB8AEAC077}" type="presOf" srcId="{1A57E6ED-CEBB-3C46-8F99-7D04431D0C52}" destId="{EBF8DBF3-6E5F-5847-A68E-96B2A92CD659}" srcOrd="0" destOrd="3" presId="urn:microsoft.com/office/officeart/2005/8/layout/hList1"/>
     <dgm:cxn modelId="{BF661864-A4AE-C24E-8C24-EA0EF2930AC5}" srcId="{70A5E778-AFCA-A946-B6B7-E9018C237695}" destId="{2209AEEA-5F84-E64F-9EBD-8FF772D27DF8}" srcOrd="0" destOrd="0" parTransId="{0BA36C0C-9D9C-6645-A703-125733D3F321}" sibTransId="{EA937E8A-C8D0-3E4B-8C0E-14BE6580222D}"/>
-    <dgm:cxn modelId="{92820D24-AE68-8645-9F47-1B7E95AEA110}" type="presOf" srcId="{EDDA4A65-D04B-224D-B4E4-0DE423E1DCF9}" destId="{EBF8DBF3-6E5F-5847-A68E-96B2A92CD659}" srcOrd="0" destOrd="0" presId="urn:microsoft.com/office/officeart/2005/8/layout/hList1"/>
     <dgm:cxn modelId="{28543334-FB22-D449-9748-CAC6B818BC69}" srcId="{2209AEEA-5F84-E64F-9EBD-8FF772D27DF8}" destId="{1A57E6ED-CEBB-3C46-8F99-7D04431D0C52}" srcOrd="3" destOrd="0" parTransId="{DA92A563-5C1B-BE4D-8737-0B98ABC82931}" sibTransId="{F22B4315-3F2C-0E4A-96F0-D69EC6A590E1}"/>
+    <dgm:cxn modelId="{8EF9BADD-8BB0-0A44-8B11-F8A6F7457859}" type="presOf" srcId="{D1F92C95-CFF0-9F4A-B33A-2E110BADCD67}" destId="{EBF8DBF3-6E5F-5847-A68E-96B2A92CD659}" srcOrd="0" destOrd="6" presId="urn:microsoft.com/office/officeart/2005/8/layout/hList1"/>
+    <dgm:cxn modelId="{E5C38527-DE21-E846-B69D-1DBB84EC98B3}" type="presOf" srcId="{93E094C9-DA5B-6F49-BC95-7851E6C5C530}" destId="{EBF8DBF3-6E5F-5847-A68E-96B2A92CD659}" srcOrd="0" destOrd="7" presId="urn:microsoft.com/office/officeart/2005/8/layout/hList1"/>
     <dgm:cxn modelId="{4D568ADB-1919-1344-970F-1B28E2780C98}" srcId="{2209AEEA-5F84-E64F-9EBD-8FF772D27DF8}" destId="{19D708D6-D27D-3A4B-886A-DB7B0D510F2C}" srcOrd="2" destOrd="0" parTransId="{C286A733-AF5C-6848-95CF-E93FC133EE08}" sibTransId="{E3E3F5CD-4260-FA4D-8782-CB3397950BEC}"/>
-    <dgm:cxn modelId="{06187476-0AE1-0440-B66A-5B15E8A5030D}" type="presOf" srcId="{D1F92C95-CFF0-9F4A-B33A-2E110BADCD67}" destId="{EBF8DBF3-6E5F-5847-A68E-96B2A92CD659}" srcOrd="0" destOrd="6" presId="urn:microsoft.com/office/officeart/2005/8/layout/hList1"/>
-    <dgm:cxn modelId="{ED95E73E-8D56-AF41-8733-80A87FBDC3AB}" type="presOf" srcId="{70A5E778-AFCA-A946-B6B7-E9018C237695}" destId="{CB7460AF-4F25-BD4E-960C-96B640F3AA05}" srcOrd="0" destOrd="0" presId="urn:microsoft.com/office/officeart/2005/8/layout/hList1"/>
-    <dgm:cxn modelId="{AC9B8AC3-9870-2841-8B93-F808271B10DF}" type="presOf" srcId="{93E094C9-DA5B-6F49-BC95-7851E6C5C530}" destId="{EBF8DBF3-6E5F-5847-A68E-96B2A92CD659}" srcOrd="0" destOrd="7" presId="urn:microsoft.com/office/officeart/2005/8/layout/hList1"/>
-    <dgm:cxn modelId="{AD2048DC-3C05-F040-8469-E4218A29CFB7}" type="presOf" srcId="{0147E501-E825-5446-BF3F-C5170975A319}" destId="{EBF8DBF3-6E5F-5847-A68E-96B2A92CD659}" srcOrd="0" destOrd="8" presId="urn:microsoft.com/office/officeart/2005/8/layout/hList1"/>
+    <dgm:cxn modelId="{EC2FEE01-FDC2-0940-B649-D3A181DB7349}" type="presOf" srcId="{10410FBB-2576-8C40-A58C-AB25EB573677}" destId="{EBF8DBF3-6E5F-5847-A68E-96B2A92CD659}" srcOrd="0" destOrd="4" presId="urn:microsoft.com/office/officeart/2005/8/layout/hList1"/>
     <dgm:cxn modelId="{947A11EF-6AB9-4544-9090-34B4957F3133}" srcId="{2209AEEA-5F84-E64F-9EBD-8FF772D27DF8}" destId="{10410FBB-2576-8C40-A58C-AB25EB573677}" srcOrd="4" destOrd="0" parTransId="{352CB9BC-710C-914A-BED6-D5E1EC8BE968}" sibTransId="{AE660217-24EA-D64B-916C-D29DE107F60D}"/>
-    <dgm:cxn modelId="{F1B4EAEF-56FA-5D45-985A-B5C8ED9B9977}" type="presOf" srcId="{1A57E6ED-CEBB-3C46-8F99-7D04431D0C52}" destId="{EBF8DBF3-6E5F-5847-A68E-96B2A92CD659}" srcOrd="0" destOrd="3" presId="urn:microsoft.com/office/officeart/2005/8/layout/hList1"/>
+    <dgm:cxn modelId="{716A7991-B69F-A049-B1CB-66E8C362CE07}" type="presOf" srcId="{0147E501-E825-5446-BF3F-C5170975A319}" destId="{EBF8DBF3-6E5F-5847-A68E-96B2A92CD659}" srcOrd="0" destOrd="8" presId="urn:microsoft.com/office/officeart/2005/8/layout/hList1"/>
+    <dgm:cxn modelId="{6BA44BF6-EE50-064E-B72A-8F6C8FFD8DFE}" type="presOf" srcId="{70A5E778-AFCA-A946-B6B7-E9018C237695}" destId="{CB7460AF-4F25-BD4E-960C-96B640F3AA05}" srcOrd="0" destOrd="0" presId="urn:microsoft.com/office/officeart/2005/8/layout/hList1"/>
+    <dgm:cxn modelId="{CA2F41D0-3260-E143-B04D-9E9084426DAF}" type="presOf" srcId="{19D708D6-D27D-3A4B-886A-DB7B0D510F2C}" destId="{EBF8DBF3-6E5F-5847-A68E-96B2A92CD659}" srcOrd="0" destOrd="2" presId="urn:microsoft.com/office/officeart/2005/8/layout/hList1"/>
     <dgm:cxn modelId="{A0CDDB70-AD7C-944C-ACF6-1DCD3F342530}" srcId="{2209AEEA-5F84-E64F-9EBD-8FF772D27DF8}" destId="{EDDA4A65-D04B-224D-B4E4-0DE423E1DCF9}" srcOrd="0" destOrd="0" parTransId="{1288CC64-A9EB-CC4F-A8E4-1EE28C097D7A}" sibTransId="{A931BE9D-D3BD-0344-B8ED-7AB03B82E613}"/>
     <dgm:cxn modelId="{4CB615A8-7F15-A74E-8A3D-CE5A5A104012}" srcId="{2209AEEA-5F84-E64F-9EBD-8FF772D27DF8}" destId="{749BBB69-76B8-6349-8047-68683438B47A}" srcOrd="5" destOrd="0" parTransId="{E40F8621-1CC0-6F47-9857-AFB0DDD5EBF6}" sibTransId="{A5271B73-2A2F-A94F-8B57-58D34F0B4FCE}"/>
+    <dgm:cxn modelId="{74796AD7-A235-1143-AD13-897246EA7FE4}" type="presOf" srcId="{5ACD7E5B-B339-EB4A-AD50-AD20C86800DA}" destId="{EBF8DBF3-6E5F-5847-A68E-96B2A92CD659}" srcOrd="0" destOrd="1" presId="urn:microsoft.com/office/officeart/2005/8/layout/hList1"/>
     <dgm:cxn modelId="{6B45AE64-D9FB-0140-95F0-B25F0B2CBC06}" srcId="{2209AEEA-5F84-E64F-9EBD-8FF772D27DF8}" destId="{93E094C9-DA5B-6F49-BC95-7851E6C5C530}" srcOrd="7" destOrd="0" parTransId="{C3BB2670-AB4F-4C47-8A9D-9B2DF804B807}" sibTransId="{B189A5C0-08A1-044A-822A-C45BB8C973FA}"/>
-    <dgm:cxn modelId="{78489A6E-63AA-2E48-8F59-8B8360D6B5FF}" type="presOf" srcId="{2209AEEA-5F84-E64F-9EBD-8FF772D27DF8}" destId="{7E6C81D4-705E-6B42-A657-E351F81CCFF3}" srcOrd="0" destOrd="0" presId="urn:microsoft.com/office/officeart/2005/8/layout/hList1"/>
-    <dgm:cxn modelId="{A6AE3EE6-53AB-3B48-8181-B8A07997BAB5}" type="presOf" srcId="{749BBB69-76B8-6349-8047-68683438B47A}" destId="{EBF8DBF3-6E5F-5847-A68E-96B2A92CD659}" srcOrd="0" destOrd="5" presId="urn:microsoft.com/office/officeart/2005/8/layout/hList1"/>
-    <dgm:cxn modelId="{DE51E70C-6DF6-1B46-9C85-E302D7DA51F3}" type="presOf" srcId="{10410FBB-2576-8C40-A58C-AB25EB573677}" destId="{EBF8DBF3-6E5F-5847-A68E-96B2A92CD659}" srcOrd="0" destOrd="4" presId="urn:microsoft.com/office/officeart/2005/8/layout/hList1"/>
-    <dgm:cxn modelId="{F8A88CFB-334A-0A42-8827-BBA9F6CC4D44}" type="presOf" srcId="{5ACD7E5B-B339-EB4A-AD50-AD20C86800DA}" destId="{EBF8DBF3-6E5F-5847-A68E-96B2A92CD659}" srcOrd="0" destOrd="1" presId="urn:microsoft.com/office/officeart/2005/8/layout/hList1"/>
-    <dgm:cxn modelId="{A7A5981D-53FF-2445-AB4B-2CAC6D76C3E3}" type="presOf" srcId="{19D708D6-D27D-3A4B-886A-DB7B0D510F2C}" destId="{EBF8DBF3-6E5F-5847-A68E-96B2A92CD659}" srcOrd="0" destOrd="2" presId="urn:microsoft.com/office/officeart/2005/8/layout/hList1"/>
+    <dgm:cxn modelId="{C203454D-2E29-6F44-9D06-16E784EA951A}" type="presOf" srcId="{2209AEEA-5F84-E64F-9EBD-8FF772D27DF8}" destId="{7E6C81D4-705E-6B42-A657-E351F81CCFF3}" srcOrd="0" destOrd="0" presId="urn:microsoft.com/office/officeart/2005/8/layout/hList1"/>
+    <dgm:cxn modelId="{506F9E4C-D770-0541-972E-A1EDEF837F0E}" type="presOf" srcId="{EDDA4A65-D04B-224D-B4E4-0DE423E1DCF9}" destId="{EBF8DBF3-6E5F-5847-A68E-96B2A92CD659}" srcOrd="0" destOrd="0" presId="urn:microsoft.com/office/officeart/2005/8/layout/hList1"/>
     <dgm:cxn modelId="{E399124C-EE63-0340-94C6-87C7AEEAF923}" srcId="{2209AEEA-5F84-E64F-9EBD-8FF772D27DF8}" destId="{0147E501-E825-5446-BF3F-C5170975A319}" srcOrd="8" destOrd="0" parTransId="{09BE2E53-BF92-6241-88E5-5DB9BCFE7E9D}" sibTransId="{50B296DE-FD30-AC4B-8E06-1ADD2399D396}"/>
+    <dgm:cxn modelId="{D0C755B0-9D5F-9947-8051-93EB790E6B5D}" type="presOf" srcId="{749BBB69-76B8-6349-8047-68683438B47A}" destId="{EBF8DBF3-6E5F-5847-A68E-96B2A92CD659}" srcOrd="0" destOrd="5" presId="urn:microsoft.com/office/officeart/2005/8/layout/hList1"/>
     <dgm:cxn modelId="{10F00651-17C0-C549-A2AD-37880B65C920}" srcId="{2209AEEA-5F84-E64F-9EBD-8FF772D27DF8}" destId="{5ACD7E5B-B339-EB4A-AD50-AD20C86800DA}" srcOrd="1" destOrd="0" parTransId="{4A9186E9-0099-E34A-A0E9-08AFFC91B1C7}" sibTransId="{186D8D00-8BFB-E346-B2F4-BE068FB07C0C}"/>
-    <dgm:cxn modelId="{07FA3087-5167-A946-86F5-22FD47151318}" type="presParOf" srcId="{CB7460AF-4F25-BD4E-960C-96B640F3AA05}" destId="{B17656AB-CE6F-3840-95E0-D1E085C4626A}" srcOrd="0" destOrd="0" presId="urn:microsoft.com/office/officeart/2005/8/layout/hList1"/>
-    <dgm:cxn modelId="{48D95F2E-82D2-0647-BFBB-5D859D3A4B42}" type="presParOf" srcId="{B17656AB-CE6F-3840-95E0-D1E085C4626A}" destId="{7E6C81D4-705E-6B42-A657-E351F81CCFF3}" srcOrd="0" destOrd="0" presId="urn:microsoft.com/office/officeart/2005/8/layout/hList1"/>
-    <dgm:cxn modelId="{1752FA35-B219-224A-A0D7-EF1E130623A7}" type="presParOf" srcId="{B17656AB-CE6F-3840-95E0-D1E085C4626A}" destId="{EBF8DBF3-6E5F-5847-A68E-96B2A92CD659}" srcOrd="1" destOrd="0" presId="urn:microsoft.com/office/officeart/2005/8/layout/hList1"/>
+    <dgm:cxn modelId="{3FCC167C-0916-4544-908D-71DADB250E72}" type="presParOf" srcId="{CB7460AF-4F25-BD4E-960C-96B640F3AA05}" destId="{B17656AB-CE6F-3840-95E0-D1E085C4626A}" srcOrd="0" destOrd="0" presId="urn:microsoft.com/office/officeart/2005/8/layout/hList1"/>
+    <dgm:cxn modelId="{49874756-A21B-0C49-B809-16D95FAB4593}" type="presParOf" srcId="{B17656AB-CE6F-3840-95E0-D1E085C4626A}" destId="{7E6C81D4-705E-6B42-A657-E351F81CCFF3}" srcOrd="0" destOrd="0" presId="urn:microsoft.com/office/officeart/2005/8/layout/hList1"/>
+    <dgm:cxn modelId="{BEE1F6ED-50C6-434D-A98D-E342B9158B05}" type="presParOf" srcId="{B17656AB-CE6F-3840-95E0-D1E085C4626A}" destId="{EBF8DBF3-6E5F-5847-A68E-96B2A92CD659}" srcOrd="1" destOrd="0" presId="urn:microsoft.com/office/officeart/2005/8/layout/hList1"/>
   </dgm:cxnLst>
   <dgm:bg/>
   <dgm:whole/>
@@ -11800,6 +12548,477 @@
         </a:p>
       </dgm:t>
     </dgm:pt>
+    <dgm:pt modelId="{2209AEEA-5F84-E64F-9EBD-8FF772D27DF8}">
+      <dgm:prSet phldrT="[Text]" custT="1"/>
+      <dgm:spPr>
+        <a:solidFill>
+          <a:schemeClr val="tx2">
+            <a:lumMod val="40000"/>
+            <a:lumOff val="60000"/>
+          </a:schemeClr>
+        </a:solidFill>
+        <a:ln>
+          <a:solidFill>
+            <a:srgbClr val="8EB4E3"/>
+          </a:solidFill>
+        </a:ln>
+      </dgm:spPr>
+      <dgm:t>
+        <a:bodyPr/>
+        <a:lstStyle/>
+        <a:p>
+          <a:r>
+            <a:rPr lang="en-US" sz="3600" dirty="0" smtClean="0">
+              <a:ln>
+                <a:solidFill>
+                  <a:schemeClr val="bg1"/>
+                </a:solidFill>
+              </a:ln>
+            </a:rPr>
+            <a:t>Simple Interface</a:t>
+          </a:r>
+          <a:endParaRPr lang="en-US" sz="3600" dirty="0">
+            <a:ln>
+              <a:solidFill>
+                <a:schemeClr val="bg1"/>
+              </a:solidFill>
+            </a:ln>
+          </a:endParaRPr>
+        </a:p>
+      </dgm:t>
+    </dgm:pt>
+    <dgm:pt modelId="{EA937E8A-C8D0-3E4B-8C0E-14BE6580222D}" type="sibTrans" cxnId="{BF661864-A4AE-C24E-8C24-EA0EF2930AC5}">
+      <dgm:prSet/>
+      <dgm:spPr/>
+      <dgm:t>
+        <a:bodyPr/>
+        <a:lstStyle/>
+        <a:p>
+          <a:endParaRPr lang="en-US"/>
+        </a:p>
+      </dgm:t>
+    </dgm:pt>
+    <dgm:pt modelId="{0BA36C0C-9D9C-6645-A703-125733D3F321}" type="parTrans" cxnId="{BF661864-A4AE-C24E-8C24-EA0EF2930AC5}">
+      <dgm:prSet/>
+      <dgm:spPr/>
+      <dgm:t>
+        <a:bodyPr/>
+        <a:lstStyle/>
+        <a:p>
+          <a:endParaRPr lang="en-US"/>
+        </a:p>
+      </dgm:t>
+    </dgm:pt>
+    <dgm:pt modelId="{EDDA4A65-D04B-224D-B4E4-0DE423E1DCF9}">
+      <dgm:prSet/>
+      <dgm:spPr/>
+      <dgm:t>
+        <a:bodyPr/>
+        <a:lstStyle/>
+        <a:p>
+          <a:pPr algn="ctr"/>
+          <a:endParaRPr lang="en-US" dirty="0" smtClean="0"/>
+        </a:p>
+      </dgm:t>
+    </dgm:pt>
+    <dgm:pt modelId="{1288CC64-A9EB-CC4F-A8E4-1EE28C097D7A}" type="parTrans" cxnId="{A0CDDB70-AD7C-944C-ACF6-1DCD3F342530}">
+      <dgm:prSet/>
+      <dgm:spPr/>
+      <dgm:t>
+        <a:bodyPr/>
+        <a:lstStyle/>
+        <a:p>
+          <a:endParaRPr lang="en-US"/>
+        </a:p>
+      </dgm:t>
+    </dgm:pt>
+    <dgm:pt modelId="{A931BE9D-D3BD-0344-B8ED-7AB03B82E613}" type="sibTrans" cxnId="{A0CDDB70-AD7C-944C-ACF6-1DCD3F342530}">
+      <dgm:prSet/>
+      <dgm:spPr/>
+      <dgm:t>
+        <a:bodyPr/>
+        <a:lstStyle/>
+        <a:p>
+          <a:endParaRPr lang="en-US"/>
+        </a:p>
+      </dgm:t>
+    </dgm:pt>
+    <dgm:pt modelId="{5ACD7E5B-B339-EB4A-AD50-AD20C86800DA}">
+      <dgm:prSet/>
+      <dgm:spPr/>
+      <dgm:t>
+        <a:bodyPr/>
+        <a:lstStyle/>
+        <a:p>
+          <a:pPr algn="ctr"/>
+          <a:endParaRPr lang="en-US" dirty="0" smtClean="0"/>
+        </a:p>
+      </dgm:t>
+    </dgm:pt>
+    <dgm:pt modelId="{4A9186E9-0099-E34A-A0E9-08AFFC91B1C7}" type="parTrans" cxnId="{10F00651-17C0-C549-A2AD-37880B65C920}">
+      <dgm:prSet/>
+      <dgm:spPr/>
+      <dgm:t>
+        <a:bodyPr/>
+        <a:lstStyle/>
+        <a:p>
+          <a:endParaRPr lang="en-US"/>
+        </a:p>
+      </dgm:t>
+    </dgm:pt>
+    <dgm:pt modelId="{186D8D00-8BFB-E346-B2F4-BE068FB07C0C}" type="sibTrans" cxnId="{10F00651-17C0-C549-A2AD-37880B65C920}">
+      <dgm:prSet/>
+      <dgm:spPr/>
+      <dgm:t>
+        <a:bodyPr/>
+        <a:lstStyle/>
+        <a:p>
+          <a:endParaRPr lang="en-US"/>
+        </a:p>
+      </dgm:t>
+    </dgm:pt>
+    <dgm:pt modelId="{19D708D6-D27D-3A4B-886A-DB7B0D510F2C}">
+      <dgm:prSet/>
+      <dgm:spPr/>
+      <dgm:t>
+        <a:bodyPr/>
+        <a:lstStyle/>
+        <a:p>
+          <a:pPr algn="ctr"/>
+          <a:endParaRPr lang="en-US" dirty="0" smtClean="0"/>
+        </a:p>
+      </dgm:t>
+    </dgm:pt>
+    <dgm:pt modelId="{C286A733-AF5C-6848-95CF-E93FC133EE08}" type="parTrans" cxnId="{4D568ADB-1919-1344-970F-1B28E2780C98}">
+      <dgm:prSet/>
+      <dgm:spPr/>
+      <dgm:t>
+        <a:bodyPr/>
+        <a:lstStyle/>
+        <a:p>
+          <a:endParaRPr lang="en-US"/>
+        </a:p>
+      </dgm:t>
+    </dgm:pt>
+    <dgm:pt modelId="{E3E3F5CD-4260-FA4D-8782-CB3397950BEC}" type="sibTrans" cxnId="{4D568ADB-1919-1344-970F-1B28E2780C98}">
+      <dgm:prSet/>
+      <dgm:spPr/>
+      <dgm:t>
+        <a:bodyPr/>
+        <a:lstStyle/>
+        <a:p>
+          <a:endParaRPr lang="en-US"/>
+        </a:p>
+      </dgm:t>
+    </dgm:pt>
+    <dgm:pt modelId="{1A57E6ED-CEBB-3C46-8F99-7D04431D0C52}">
+      <dgm:prSet/>
+      <dgm:spPr/>
+      <dgm:t>
+        <a:bodyPr/>
+        <a:lstStyle/>
+        <a:p>
+          <a:pPr algn="ctr"/>
+          <a:endParaRPr lang="en-US" dirty="0" smtClean="0"/>
+        </a:p>
+      </dgm:t>
+    </dgm:pt>
+    <dgm:pt modelId="{DA92A563-5C1B-BE4D-8737-0B98ABC82931}" type="parTrans" cxnId="{28543334-FB22-D449-9748-CAC6B818BC69}">
+      <dgm:prSet/>
+      <dgm:spPr/>
+      <dgm:t>
+        <a:bodyPr/>
+        <a:lstStyle/>
+        <a:p>
+          <a:endParaRPr lang="en-US"/>
+        </a:p>
+      </dgm:t>
+    </dgm:pt>
+    <dgm:pt modelId="{F22B4315-3F2C-0E4A-96F0-D69EC6A590E1}" type="sibTrans" cxnId="{28543334-FB22-D449-9748-CAC6B818BC69}">
+      <dgm:prSet/>
+      <dgm:spPr/>
+      <dgm:t>
+        <a:bodyPr/>
+        <a:lstStyle/>
+        <a:p>
+          <a:endParaRPr lang="en-US"/>
+        </a:p>
+      </dgm:t>
+    </dgm:pt>
+    <dgm:pt modelId="{10410FBB-2576-8C40-A58C-AB25EB573677}">
+      <dgm:prSet/>
+      <dgm:spPr/>
+      <dgm:t>
+        <a:bodyPr/>
+        <a:lstStyle/>
+        <a:p>
+          <a:pPr algn="ctr"/>
+          <a:endParaRPr lang="en-US" dirty="0" smtClean="0"/>
+        </a:p>
+      </dgm:t>
+    </dgm:pt>
+    <dgm:pt modelId="{352CB9BC-710C-914A-BED6-D5E1EC8BE968}" type="parTrans" cxnId="{947A11EF-6AB9-4544-9090-34B4957F3133}">
+      <dgm:prSet/>
+      <dgm:spPr/>
+      <dgm:t>
+        <a:bodyPr/>
+        <a:lstStyle/>
+        <a:p>
+          <a:endParaRPr lang="en-US"/>
+        </a:p>
+      </dgm:t>
+    </dgm:pt>
+    <dgm:pt modelId="{AE660217-24EA-D64B-916C-D29DE107F60D}" type="sibTrans" cxnId="{947A11EF-6AB9-4544-9090-34B4957F3133}">
+      <dgm:prSet/>
+      <dgm:spPr/>
+      <dgm:t>
+        <a:bodyPr/>
+        <a:lstStyle/>
+        <a:p>
+          <a:endParaRPr lang="en-US"/>
+        </a:p>
+      </dgm:t>
+    </dgm:pt>
+    <dgm:pt modelId="{749BBB69-76B8-6349-8047-68683438B47A}">
+      <dgm:prSet/>
+      <dgm:spPr/>
+      <dgm:t>
+        <a:bodyPr/>
+        <a:lstStyle/>
+        <a:p>
+          <a:pPr algn="ctr"/>
+          <a:endParaRPr lang="en-US" dirty="0" smtClean="0"/>
+        </a:p>
+      </dgm:t>
+    </dgm:pt>
+    <dgm:pt modelId="{E40F8621-1CC0-6F47-9857-AFB0DDD5EBF6}" type="parTrans" cxnId="{4CB615A8-7F15-A74E-8A3D-CE5A5A104012}">
+      <dgm:prSet/>
+      <dgm:spPr/>
+      <dgm:t>
+        <a:bodyPr/>
+        <a:lstStyle/>
+        <a:p>
+          <a:endParaRPr lang="en-US"/>
+        </a:p>
+      </dgm:t>
+    </dgm:pt>
+    <dgm:pt modelId="{A5271B73-2A2F-A94F-8B57-58D34F0B4FCE}" type="sibTrans" cxnId="{4CB615A8-7F15-A74E-8A3D-CE5A5A104012}">
+      <dgm:prSet/>
+      <dgm:spPr/>
+      <dgm:t>
+        <a:bodyPr/>
+        <a:lstStyle/>
+        <a:p>
+          <a:endParaRPr lang="en-US"/>
+        </a:p>
+      </dgm:t>
+    </dgm:pt>
+    <dgm:pt modelId="{D1F92C95-CFF0-9F4A-B33A-2E110BADCD67}">
+      <dgm:prSet/>
+      <dgm:spPr/>
+      <dgm:t>
+        <a:bodyPr/>
+        <a:lstStyle/>
+        <a:p>
+          <a:pPr algn="ctr"/>
+          <a:endParaRPr lang="en-US" dirty="0" smtClean="0"/>
+        </a:p>
+      </dgm:t>
+    </dgm:pt>
+    <dgm:pt modelId="{9804EC8D-0F99-8742-B1BC-7B84EE529766}" type="parTrans" cxnId="{1A6CFF73-36C7-2D44-9B63-4F1E0ECBBD86}">
+      <dgm:prSet/>
+      <dgm:spPr/>
+      <dgm:t>
+        <a:bodyPr/>
+        <a:lstStyle/>
+        <a:p>
+          <a:endParaRPr lang="en-US"/>
+        </a:p>
+      </dgm:t>
+    </dgm:pt>
+    <dgm:pt modelId="{9B26A82C-852C-5244-9054-12C94E60B5FB}" type="sibTrans" cxnId="{1A6CFF73-36C7-2D44-9B63-4F1E0ECBBD86}">
+      <dgm:prSet/>
+      <dgm:spPr/>
+      <dgm:t>
+        <a:bodyPr/>
+        <a:lstStyle/>
+        <a:p>
+          <a:endParaRPr lang="en-US"/>
+        </a:p>
+      </dgm:t>
+    </dgm:pt>
+    <dgm:pt modelId="{93E094C9-DA5B-6F49-BC95-7851E6C5C530}">
+      <dgm:prSet/>
+      <dgm:spPr/>
+      <dgm:t>
+        <a:bodyPr/>
+        <a:lstStyle/>
+        <a:p>
+          <a:pPr algn="ctr"/>
+          <a:endParaRPr lang="en-US" dirty="0" smtClean="0"/>
+        </a:p>
+      </dgm:t>
+    </dgm:pt>
+    <dgm:pt modelId="{C3BB2670-AB4F-4C47-8A9D-9B2DF804B807}" type="parTrans" cxnId="{6B45AE64-D9FB-0140-95F0-B25F0B2CBC06}">
+      <dgm:prSet/>
+      <dgm:spPr/>
+      <dgm:t>
+        <a:bodyPr/>
+        <a:lstStyle/>
+        <a:p>
+          <a:endParaRPr lang="en-US"/>
+        </a:p>
+      </dgm:t>
+    </dgm:pt>
+    <dgm:pt modelId="{B189A5C0-08A1-044A-822A-C45BB8C973FA}" type="sibTrans" cxnId="{6B45AE64-D9FB-0140-95F0-B25F0B2CBC06}">
+      <dgm:prSet/>
+      <dgm:spPr/>
+      <dgm:t>
+        <a:bodyPr/>
+        <a:lstStyle/>
+        <a:p>
+          <a:endParaRPr lang="en-US"/>
+        </a:p>
+      </dgm:t>
+    </dgm:pt>
+    <dgm:pt modelId="{0147E501-E825-5446-BF3F-C5170975A319}">
+      <dgm:prSet/>
+      <dgm:spPr/>
+      <dgm:t>
+        <a:bodyPr/>
+        <a:lstStyle/>
+        <a:p>
+          <a:pPr algn="ctr"/>
+          <a:endParaRPr lang="en-US" dirty="0" smtClean="0"/>
+        </a:p>
+      </dgm:t>
+    </dgm:pt>
+    <dgm:pt modelId="{09BE2E53-BF92-6241-88E5-5DB9BCFE7E9D}" type="parTrans" cxnId="{E399124C-EE63-0340-94C6-87C7AEEAF923}">
+      <dgm:prSet/>
+      <dgm:spPr/>
+      <dgm:t>
+        <a:bodyPr/>
+        <a:lstStyle/>
+        <a:p>
+          <a:endParaRPr lang="en-US"/>
+        </a:p>
+      </dgm:t>
+    </dgm:pt>
+    <dgm:pt modelId="{50B296DE-FD30-AC4B-8E06-1ADD2399D396}" type="sibTrans" cxnId="{E399124C-EE63-0340-94C6-87C7AEEAF923}">
+      <dgm:prSet/>
+      <dgm:spPr/>
+      <dgm:t>
+        <a:bodyPr/>
+        <a:lstStyle/>
+        <a:p>
+          <a:endParaRPr lang="en-US"/>
+        </a:p>
+      </dgm:t>
+    </dgm:pt>
+    <dgm:pt modelId="{CB7460AF-4F25-BD4E-960C-96B640F3AA05}" type="pres">
+      <dgm:prSet presAssocID="{70A5E778-AFCA-A946-B6B7-E9018C237695}" presName="Name0" presStyleCnt="0">
+        <dgm:presLayoutVars>
+          <dgm:dir/>
+          <dgm:animLvl val="lvl"/>
+          <dgm:resizeHandles val="exact"/>
+        </dgm:presLayoutVars>
+      </dgm:prSet>
+      <dgm:spPr/>
+      <dgm:t>
+        <a:bodyPr/>
+        <a:lstStyle/>
+        <a:p>
+          <a:endParaRPr lang="en-US"/>
+        </a:p>
+      </dgm:t>
+    </dgm:pt>
+    <dgm:pt modelId="{B17656AB-CE6F-3840-95E0-D1E085C4626A}" type="pres">
+      <dgm:prSet presAssocID="{2209AEEA-5F84-E64F-9EBD-8FF772D27DF8}" presName="composite" presStyleCnt="0"/>
+      <dgm:spPr/>
+    </dgm:pt>
+    <dgm:pt modelId="{7E6C81D4-705E-6B42-A657-E351F81CCFF3}" type="pres">
+      <dgm:prSet presAssocID="{2209AEEA-5F84-E64F-9EBD-8FF772D27DF8}" presName="parTx" presStyleLbl="alignNode1" presStyleIdx="0" presStyleCnt="1">
+        <dgm:presLayoutVars>
+          <dgm:chMax val="0"/>
+          <dgm:chPref val="0"/>
+          <dgm:bulletEnabled val="1"/>
+        </dgm:presLayoutVars>
+      </dgm:prSet>
+      <dgm:spPr/>
+      <dgm:t>
+        <a:bodyPr/>
+        <a:lstStyle/>
+        <a:p>
+          <a:endParaRPr lang="en-US"/>
+        </a:p>
+      </dgm:t>
+    </dgm:pt>
+    <dgm:pt modelId="{EBF8DBF3-6E5F-5847-A68E-96B2A92CD659}" type="pres">
+      <dgm:prSet presAssocID="{2209AEEA-5F84-E64F-9EBD-8FF772D27DF8}" presName="desTx" presStyleLbl="alignAccFollowNode1" presStyleIdx="0" presStyleCnt="1">
+        <dgm:presLayoutVars>
+          <dgm:bulletEnabled val="1"/>
+        </dgm:presLayoutVars>
+      </dgm:prSet>
+      <dgm:spPr/>
+      <dgm:t>
+        <a:bodyPr/>
+        <a:lstStyle/>
+        <a:p>
+          <a:endParaRPr lang="en-US"/>
+        </a:p>
+      </dgm:t>
+    </dgm:pt>
+  </dgm:ptLst>
+  <dgm:cxnLst>
+    <dgm:cxn modelId="{1A6CFF73-36C7-2D44-9B63-4F1E0ECBBD86}" srcId="{2209AEEA-5F84-E64F-9EBD-8FF772D27DF8}" destId="{D1F92C95-CFF0-9F4A-B33A-2E110BADCD67}" srcOrd="6" destOrd="0" parTransId="{9804EC8D-0F99-8742-B1BC-7B84EE529766}" sibTransId="{9B26A82C-852C-5244-9054-12C94E60B5FB}"/>
+    <dgm:cxn modelId="{92820D24-AE68-8645-9F47-1B7E95AEA110}" type="presOf" srcId="{EDDA4A65-D04B-224D-B4E4-0DE423E1DCF9}" destId="{EBF8DBF3-6E5F-5847-A68E-96B2A92CD659}" srcOrd="0" destOrd="0" presId="urn:microsoft.com/office/officeart/2005/8/layout/hList1"/>
+    <dgm:cxn modelId="{BF661864-A4AE-C24E-8C24-EA0EF2930AC5}" srcId="{70A5E778-AFCA-A946-B6B7-E9018C237695}" destId="{2209AEEA-5F84-E64F-9EBD-8FF772D27DF8}" srcOrd="0" destOrd="0" parTransId="{0BA36C0C-9D9C-6645-A703-125733D3F321}" sibTransId="{EA937E8A-C8D0-3E4B-8C0E-14BE6580222D}"/>
+    <dgm:cxn modelId="{28543334-FB22-D449-9748-CAC6B818BC69}" srcId="{2209AEEA-5F84-E64F-9EBD-8FF772D27DF8}" destId="{1A57E6ED-CEBB-3C46-8F99-7D04431D0C52}" srcOrd="3" destOrd="0" parTransId="{DA92A563-5C1B-BE4D-8737-0B98ABC82931}" sibTransId="{F22B4315-3F2C-0E4A-96F0-D69EC6A590E1}"/>
+    <dgm:cxn modelId="{4D568ADB-1919-1344-970F-1B28E2780C98}" srcId="{2209AEEA-5F84-E64F-9EBD-8FF772D27DF8}" destId="{19D708D6-D27D-3A4B-886A-DB7B0D510F2C}" srcOrd="2" destOrd="0" parTransId="{C286A733-AF5C-6848-95CF-E93FC133EE08}" sibTransId="{E3E3F5CD-4260-FA4D-8782-CB3397950BEC}"/>
+    <dgm:cxn modelId="{ED95E73E-8D56-AF41-8733-80A87FBDC3AB}" type="presOf" srcId="{70A5E778-AFCA-A946-B6B7-E9018C237695}" destId="{CB7460AF-4F25-BD4E-960C-96B640F3AA05}" srcOrd="0" destOrd="0" presId="urn:microsoft.com/office/officeart/2005/8/layout/hList1"/>
+    <dgm:cxn modelId="{06187476-0AE1-0440-B66A-5B15E8A5030D}" type="presOf" srcId="{D1F92C95-CFF0-9F4A-B33A-2E110BADCD67}" destId="{EBF8DBF3-6E5F-5847-A68E-96B2A92CD659}" srcOrd="0" destOrd="6" presId="urn:microsoft.com/office/officeart/2005/8/layout/hList1"/>
+    <dgm:cxn modelId="{AC9B8AC3-9870-2841-8B93-F808271B10DF}" type="presOf" srcId="{93E094C9-DA5B-6F49-BC95-7851E6C5C530}" destId="{EBF8DBF3-6E5F-5847-A68E-96B2A92CD659}" srcOrd="0" destOrd="7" presId="urn:microsoft.com/office/officeart/2005/8/layout/hList1"/>
+    <dgm:cxn modelId="{AD2048DC-3C05-F040-8469-E4218A29CFB7}" type="presOf" srcId="{0147E501-E825-5446-BF3F-C5170975A319}" destId="{EBF8DBF3-6E5F-5847-A68E-96B2A92CD659}" srcOrd="0" destOrd="8" presId="urn:microsoft.com/office/officeart/2005/8/layout/hList1"/>
+    <dgm:cxn modelId="{F1B4EAEF-56FA-5D45-985A-B5C8ED9B9977}" type="presOf" srcId="{1A57E6ED-CEBB-3C46-8F99-7D04431D0C52}" destId="{EBF8DBF3-6E5F-5847-A68E-96B2A92CD659}" srcOrd="0" destOrd="3" presId="urn:microsoft.com/office/officeart/2005/8/layout/hList1"/>
+    <dgm:cxn modelId="{947A11EF-6AB9-4544-9090-34B4957F3133}" srcId="{2209AEEA-5F84-E64F-9EBD-8FF772D27DF8}" destId="{10410FBB-2576-8C40-A58C-AB25EB573677}" srcOrd="4" destOrd="0" parTransId="{352CB9BC-710C-914A-BED6-D5E1EC8BE968}" sibTransId="{AE660217-24EA-D64B-916C-D29DE107F60D}"/>
+    <dgm:cxn modelId="{A0CDDB70-AD7C-944C-ACF6-1DCD3F342530}" srcId="{2209AEEA-5F84-E64F-9EBD-8FF772D27DF8}" destId="{EDDA4A65-D04B-224D-B4E4-0DE423E1DCF9}" srcOrd="0" destOrd="0" parTransId="{1288CC64-A9EB-CC4F-A8E4-1EE28C097D7A}" sibTransId="{A931BE9D-D3BD-0344-B8ED-7AB03B82E613}"/>
+    <dgm:cxn modelId="{4CB615A8-7F15-A74E-8A3D-CE5A5A104012}" srcId="{2209AEEA-5F84-E64F-9EBD-8FF772D27DF8}" destId="{749BBB69-76B8-6349-8047-68683438B47A}" srcOrd="5" destOrd="0" parTransId="{E40F8621-1CC0-6F47-9857-AFB0DDD5EBF6}" sibTransId="{A5271B73-2A2F-A94F-8B57-58D34F0B4FCE}"/>
+    <dgm:cxn modelId="{6B45AE64-D9FB-0140-95F0-B25F0B2CBC06}" srcId="{2209AEEA-5F84-E64F-9EBD-8FF772D27DF8}" destId="{93E094C9-DA5B-6F49-BC95-7851E6C5C530}" srcOrd="7" destOrd="0" parTransId="{C3BB2670-AB4F-4C47-8A9D-9B2DF804B807}" sibTransId="{B189A5C0-08A1-044A-822A-C45BB8C973FA}"/>
+    <dgm:cxn modelId="{78489A6E-63AA-2E48-8F59-8B8360D6B5FF}" type="presOf" srcId="{2209AEEA-5F84-E64F-9EBD-8FF772D27DF8}" destId="{7E6C81D4-705E-6B42-A657-E351F81CCFF3}" srcOrd="0" destOrd="0" presId="urn:microsoft.com/office/officeart/2005/8/layout/hList1"/>
+    <dgm:cxn modelId="{DE51E70C-6DF6-1B46-9C85-E302D7DA51F3}" type="presOf" srcId="{10410FBB-2576-8C40-A58C-AB25EB573677}" destId="{EBF8DBF3-6E5F-5847-A68E-96B2A92CD659}" srcOrd="0" destOrd="4" presId="urn:microsoft.com/office/officeart/2005/8/layout/hList1"/>
+    <dgm:cxn modelId="{A6AE3EE6-53AB-3B48-8181-B8A07997BAB5}" type="presOf" srcId="{749BBB69-76B8-6349-8047-68683438B47A}" destId="{EBF8DBF3-6E5F-5847-A68E-96B2A92CD659}" srcOrd="0" destOrd="5" presId="urn:microsoft.com/office/officeart/2005/8/layout/hList1"/>
+    <dgm:cxn modelId="{F8A88CFB-334A-0A42-8827-BBA9F6CC4D44}" type="presOf" srcId="{5ACD7E5B-B339-EB4A-AD50-AD20C86800DA}" destId="{EBF8DBF3-6E5F-5847-A68E-96B2A92CD659}" srcOrd="0" destOrd="1" presId="urn:microsoft.com/office/officeart/2005/8/layout/hList1"/>
+    <dgm:cxn modelId="{A7A5981D-53FF-2445-AB4B-2CAC6D76C3E3}" type="presOf" srcId="{19D708D6-D27D-3A4B-886A-DB7B0D510F2C}" destId="{EBF8DBF3-6E5F-5847-A68E-96B2A92CD659}" srcOrd="0" destOrd="2" presId="urn:microsoft.com/office/officeart/2005/8/layout/hList1"/>
+    <dgm:cxn modelId="{E399124C-EE63-0340-94C6-87C7AEEAF923}" srcId="{2209AEEA-5F84-E64F-9EBD-8FF772D27DF8}" destId="{0147E501-E825-5446-BF3F-C5170975A319}" srcOrd="8" destOrd="0" parTransId="{09BE2E53-BF92-6241-88E5-5DB9BCFE7E9D}" sibTransId="{50B296DE-FD30-AC4B-8E06-1ADD2399D396}"/>
+    <dgm:cxn modelId="{10F00651-17C0-C549-A2AD-37880B65C920}" srcId="{2209AEEA-5F84-E64F-9EBD-8FF772D27DF8}" destId="{5ACD7E5B-B339-EB4A-AD50-AD20C86800DA}" srcOrd="1" destOrd="0" parTransId="{4A9186E9-0099-E34A-A0E9-08AFFC91B1C7}" sibTransId="{186D8D00-8BFB-E346-B2F4-BE068FB07C0C}"/>
+    <dgm:cxn modelId="{07FA3087-5167-A946-86F5-22FD47151318}" type="presParOf" srcId="{CB7460AF-4F25-BD4E-960C-96B640F3AA05}" destId="{B17656AB-CE6F-3840-95E0-D1E085C4626A}" srcOrd="0" destOrd="0" presId="urn:microsoft.com/office/officeart/2005/8/layout/hList1"/>
+    <dgm:cxn modelId="{48D95F2E-82D2-0647-BFBB-5D859D3A4B42}" type="presParOf" srcId="{B17656AB-CE6F-3840-95E0-D1E085C4626A}" destId="{7E6C81D4-705E-6B42-A657-E351F81CCFF3}" srcOrd="0" destOrd="0" presId="urn:microsoft.com/office/officeart/2005/8/layout/hList1"/>
+    <dgm:cxn modelId="{1752FA35-B219-224A-A0D7-EF1E130623A7}" type="presParOf" srcId="{B17656AB-CE6F-3840-95E0-D1E085C4626A}" destId="{EBF8DBF3-6E5F-5847-A68E-96B2A92CD659}" srcOrd="1" destOrd="0" presId="urn:microsoft.com/office/officeart/2005/8/layout/hList1"/>
+  </dgm:cxnLst>
+  <dgm:bg/>
+  <dgm:whole/>
+  <dgm:extLst>
+    <a:ext uri="http://schemas.microsoft.com/office/drawing/2008/diagram">
+      <dsp:dataModelExt xmlns:dsp="http://schemas.microsoft.com/office/drawing/2008/diagram" relId="rId7" minVer="http://schemas.openxmlformats.org/drawingml/2006/diagram"/>
+    </a:ext>
+  </dgm:extLst>
+</dgm:dataModel>
+</file>
+
+<file path=ppt/diagrams/data13.xml><?xml version="1.0" encoding="utf-8"?>
+<dgm:dataModel xmlns:dgm="http://schemas.openxmlformats.org/drawingml/2006/diagram" xmlns:a="http://schemas.openxmlformats.org/drawingml/2006/main">
+  <dgm:ptLst>
+    <dgm:pt modelId="{70A5E778-AFCA-A946-B6B7-E9018C237695}" type="doc">
+      <dgm:prSet loTypeId="urn:microsoft.com/office/officeart/2005/8/layout/hList1" loCatId="list" qsTypeId="urn:microsoft.com/office/officeart/2005/8/quickstyle/simple4" qsCatId="simple" csTypeId="urn:microsoft.com/office/officeart/2005/8/colors/accent1_2" csCatId="accent1" phldr="1"/>
+      <dgm:spPr/>
+      <dgm:t>
+        <a:bodyPr/>
+        <a:lstStyle/>
+        <a:p>
+          <a:endParaRPr lang="en-US"/>
+        </a:p>
+      </dgm:t>
+    </dgm:pt>
     <dgm:pt modelId="{0C113674-F92A-DB4A-95DF-2E5D01B51808}">
       <dgm:prSet/>
       <dgm:spPr/>
@@ -12019,11 +13238,7 @@
           </a:r>
           <a:r>
             <a:rPr lang="en-US" smtClean="0"/>
-            <a:t>and </a:t>
-          </a:r>
-          <a:r>
-            <a:rPr lang="en-US" smtClean="0"/>
-            <a:t>breaks </a:t>
+            <a:t>and breaks </a:t>
           </a:r>
           <a:r>
             <a:rPr lang="en-US" dirty="0" smtClean="0"/>
@@ -12063,15 +13278,7 @@
         <a:p>
           <a:r>
             <a:rPr lang="en-US" dirty="0" smtClean="0"/>
-            <a:t>Target school score </a:t>
-          </a:r>
-          <a:r>
-            <a:rPr lang="en-US" dirty="0" smtClean="0"/>
-            <a:t>calculator </a:t>
-          </a:r>
-          <a:r>
-            <a:rPr lang="en-US" dirty="0" smtClean="0"/>
-            <a:t>that shows progress in relation to school applicant scores</a:t>
+            <a:t>Target school score calculator that shows progress in relation to school applicant scores</a:t>
           </a:r>
           <a:endParaRPr lang="en-US" dirty="0"/>
         </a:p>
@@ -12236,8 +13443,8 @@
     <dgm:cxn modelId="{73287663-17E0-3F4D-901D-CA40C98616EE}" srcId="{2209AEEA-5F84-E64F-9EBD-8FF772D27DF8}" destId="{6DA3BA12-54C0-1C48-8025-FAEC2E0D9903}" srcOrd="2" destOrd="0" parTransId="{B19E9CDC-B61E-DB4A-8A3E-707B39DC93E1}" sibTransId="{712A6154-B495-3C49-B963-F5BC9FCCF5E6}"/>
     <dgm:cxn modelId="{BF661864-A4AE-C24E-8C24-EA0EF2930AC5}" srcId="{70A5E778-AFCA-A946-B6B7-E9018C237695}" destId="{2209AEEA-5F84-E64F-9EBD-8FF772D27DF8}" srcOrd="0" destOrd="0" parTransId="{0BA36C0C-9D9C-6645-A703-125733D3F321}" sibTransId="{EA937E8A-C8D0-3E4B-8C0E-14BE6580222D}"/>
     <dgm:cxn modelId="{6DF90621-6C7F-8D46-AFA4-428E7EE8A65A}" type="presOf" srcId="{E64E35A3-8837-DD45-9C2A-06462ED25F0C}" destId="{EBF8DBF3-6E5F-5847-A68E-96B2A92CD659}" srcOrd="0" destOrd="1" presId="urn:microsoft.com/office/officeart/2005/8/layout/hList1"/>
+    <dgm:cxn modelId="{93CDEA99-DB8A-3648-BDFF-FA55EE767BAD}" type="presOf" srcId="{7D9F5737-CD88-C341-8631-ED026FA9E36B}" destId="{25D2F1A2-81B1-3D48-913D-98F6A00EAA7B}" srcOrd="0" destOrd="2" presId="urn:microsoft.com/office/officeart/2005/8/layout/hList1"/>
     <dgm:cxn modelId="{27AD6E73-56FB-F742-BD06-F02A9590CB98}" srcId="{2209AEEA-5F84-E64F-9EBD-8FF772D27DF8}" destId="{E64E35A3-8837-DD45-9C2A-06462ED25F0C}" srcOrd="1" destOrd="0" parTransId="{B5124557-396E-F74B-A770-F13FFC1EE30A}" sibTransId="{C78398F2-4FE2-B846-AAA9-57FAAA7A3127}"/>
-    <dgm:cxn modelId="{93CDEA99-DB8A-3648-BDFF-FA55EE767BAD}" type="presOf" srcId="{7D9F5737-CD88-C341-8631-ED026FA9E36B}" destId="{25D2F1A2-81B1-3D48-913D-98F6A00EAA7B}" srcOrd="0" destOrd="2" presId="urn:microsoft.com/office/officeart/2005/8/layout/hList1"/>
     <dgm:cxn modelId="{A23A3113-5198-9849-BFA0-1F59B4F17FE7}" type="presOf" srcId="{6DA3BA12-54C0-1C48-8025-FAEC2E0D9903}" destId="{EBF8DBF3-6E5F-5847-A68E-96B2A92CD659}" srcOrd="0" destOrd="2" presId="urn:microsoft.com/office/officeart/2005/8/layout/hList1"/>
     <dgm:cxn modelId="{CC63D9E4-C574-FD4A-A9F0-7EF93C8A97F9}" srcId="{3FF92AB4-5F3D-2F47-AF94-07DEF542D124}" destId="{7D9F5737-CD88-C341-8631-ED026FA9E36B}" srcOrd="2" destOrd="0" parTransId="{2E015F9D-1368-8B44-A519-CF3307F0EB64}" sibTransId="{A5DF22DA-B9C0-0F4D-8260-A66EDAD979B0}"/>
     <dgm:cxn modelId="{C48B2C5B-CDB1-B441-A66B-9CE7A67422F4}" type="presOf" srcId="{2209AEEA-5F84-E64F-9EBD-8FF772D27DF8}" destId="{7E6C81D4-705E-6B42-A657-E351F81CCFF3}" srcOrd="0" destOrd="0" presId="urn:microsoft.com/office/officeart/2005/8/layout/hList1"/>
@@ -12266,7 +13473,7 @@
 </dgm:dataModel>
 </file>
 
-<file path=ppt/diagrams/data13.xml><?xml version="1.0" encoding="utf-8"?>
+<file path=ppt/diagrams/data14.xml><?xml version="1.0" encoding="utf-8"?>
 <dgm:dataModel xmlns:dgm="http://schemas.openxmlformats.org/drawingml/2006/diagram" xmlns:a="http://schemas.openxmlformats.org/drawingml/2006/main">
   <dgm:ptLst>
     <dgm:pt modelId="{70A5E778-AFCA-A946-B6B7-E9018C237695}" type="doc">
@@ -12449,7 +13656,7 @@
 </dgm:dataModel>
 </file>
 
-<file path=ppt/diagrams/data14.xml><?xml version="1.0" encoding="utf-8"?>
+<file path=ppt/diagrams/data15.xml><?xml version="1.0" encoding="utf-8"?>
 <dgm:dataModel xmlns:dgm="http://schemas.openxmlformats.org/drawingml/2006/diagram" xmlns:a="http://schemas.openxmlformats.org/drawingml/2006/main">
   <dgm:ptLst>
     <dgm:pt modelId="{70A5E778-AFCA-A946-B6B7-E9018C237695}" type="doc">
@@ -13403,53 +14610,53 @@
     </dgm:pt>
   </dgm:ptLst>
   <dgm:cxnLst>
+    <dgm:cxn modelId="{3587BEDD-0EBC-1D40-A58F-4014F160CD51}" type="presOf" srcId="{B1BD251C-74A6-E046-9924-6B130BEC7FB3}" destId="{C6C15021-3E49-9A44-B2B2-6BEDB8687CAC}" srcOrd="0" destOrd="9" presId="urn:microsoft.com/office/officeart/2005/8/layout/hList1"/>
+    <dgm:cxn modelId="{B34BCE24-4A24-D74D-895D-5BBAD89FA76E}" type="presOf" srcId="{F3FE80A6-1A05-EF49-A11C-5FB2001D0A01}" destId="{14B6CA00-5F61-564B-92F9-594F06D73999}" srcOrd="0" destOrd="1" presId="urn:microsoft.com/office/officeart/2005/8/layout/hList1"/>
+    <dgm:cxn modelId="{CEDB1C52-8F0C-0741-82CA-0EE33B49908F}" srcId="{70A5E778-AFCA-A946-B6B7-E9018C237695}" destId="{42630A07-DCFA-484B-9DB3-F5AEAAD996F9}" srcOrd="1" destOrd="0" parTransId="{A4CBF787-C708-E048-8949-534DE271C27F}" sibTransId="{E5B05E30-2F6C-F342-865E-02E01F694A55}"/>
+    <dgm:cxn modelId="{E8A57BCC-E333-5B48-B3A6-0C4DA49A2CCE}" srcId="{E68E29C5-E4D7-434A-875B-21750E3E0353}" destId="{563D4C83-E92A-D44A-BB7C-3A9634CE2C6D}" srcOrd="4" destOrd="0" parTransId="{00CBD091-D314-3846-9FDA-0C69128B4323}" sibTransId="{09EA99E5-6040-CA49-9028-82AE2A185CC1}"/>
+    <dgm:cxn modelId="{1AB30173-996D-2A4D-97D8-C62C61551DBD}" type="presOf" srcId="{231C6582-A73B-6944-9B91-CFF35E47AA15}" destId="{14B6CA00-5F61-564B-92F9-594F06D73999}" srcOrd="0" destOrd="8" presId="urn:microsoft.com/office/officeart/2005/8/layout/hList1"/>
     <dgm:cxn modelId="{EFDDEB4F-DBDE-A744-99FD-B9D18B8E71FE}" srcId="{E68E29C5-E4D7-434A-875B-21750E3E0353}" destId="{1E93DEC3-F1AD-0749-8523-108E79615CCB}" srcOrd="3" destOrd="0" parTransId="{3057092F-EB72-3544-978A-3EB2FC869DBC}" sibTransId="{BF2D188E-34D6-E345-8454-B53234B85BB9}"/>
-    <dgm:cxn modelId="{209624C2-BEF1-7248-BF67-0D38A350127B}" type="presOf" srcId="{EBD066FD-4AC8-064D-AB5C-9193A4B3D56A}" destId="{14B6CA00-5F61-564B-92F9-594F06D73999}" srcOrd="0" destOrd="2" presId="urn:microsoft.com/office/officeart/2005/8/layout/hList1"/>
-    <dgm:cxn modelId="{1AB30173-996D-2A4D-97D8-C62C61551DBD}" type="presOf" srcId="{231C6582-A73B-6944-9B91-CFF35E47AA15}" destId="{14B6CA00-5F61-564B-92F9-594F06D73999}" srcOrd="0" destOrd="8" presId="urn:microsoft.com/office/officeart/2005/8/layout/hList1"/>
-    <dgm:cxn modelId="{03AF63E6-B411-944F-B103-45D48C59A62F}" srcId="{42630A07-DCFA-484B-9DB3-F5AEAAD996F9}" destId="{93866546-FE30-2841-8439-EEB238AA6D33}" srcOrd="3" destOrd="0" parTransId="{E2D2D0FF-AAF9-DD41-AD65-A90B7C214C12}" sibTransId="{FDBA5791-587A-5C42-AA46-098871ACB74E}"/>
+    <dgm:cxn modelId="{665B7B8A-A1D9-9246-81D7-6C7F2545B1DF}" type="presOf" srcId="{E4641ABD-8784-014A-B685-7508124E6982}" destId="{14B6CA00-5F61-564B-92F9-594F06D73999}" srcOrd="0" destOrd="7" presId="urn:microsoft.com/office/officeart/2005/8/layout/hList1"/>
+    <dgm:cxn modelId="{E52A83B6-80EB-0B46-968A-AE262E00C0D6}" type="presOf" srcId="{A57B3DAC-846D-7647-BFCD-40C245427A27}" destId="{C6C15021-3E49-9A44-B2B2-6BEDB8687CAC}" srcOrd="0" destOrd="0" presId="urn:microsoft.com/office/officeart/2005/8/layout/hList1"/>
+    <dgm:cxn modelId="{E6F5DB3C-18F2-5F40-8EC7-79B5D1E8C579}" type="presOf" srcId="{1E93DEC3-F1AD-0749-8523-108E79615CCB}" destId="{C6C15021-3E49-9A44-B2B2-6BEDB8687CAC}" srcOrd="0" destOrd="3" presId="urn:microsoft.com/office/officeart/2005/8/layout/hList1"/>
+    <dgm:cxn modelId="{AB8B5D9E-0BEA-9B42-8EE0-0446EEF9AD7F}" type="presOf" srcId="{E00E4437-3764-504D-A445-145DB993CFF2}" destId="{C6C15021-3E49-9A44-B2B2-6BEDB8687CAC}" srcOrd="0" destOrd="2" presId="urn:microsoft.com/office/officeart/2005/8/layout/hList1"/>
     <dgm:cxn modelId="{A9D21755-F74E-A340-9193-49A72DC3A678}" srcId="{42630A07-DCFA-484B-9DB3-F5AEAAD996F9}" destId="{6A782498-1CD6-8543-A095-B5EA90F443B9}" srcOrd="5" destOrd="0" parTransId="{32717DD2-4BC1-F64F-BB11-283C2EE9BBAD}" sibTransId="{17556478-8DC7-2148-B6E4-96E8F1CDD863}"/>
+    <dgm:cxn modelId="{97C3B838-8C78-7A42-A576-1CCCB248A0DA}" srcId="{42630A07-DCFA-484B-9DB3-F5AEAAD996F9}" destId="{EBD066FD-4AC8-064D-AB5C-9193A4B3D56A}" srcOrd="2" destOrd="0" parTransId="{228540D3-C969-4E4C-8EA3-CA88A77D5BB0}" sibTransId="{9634C674-7419-A447-952F-507BED070FAD}"/>
+    <dgm:cxn modelId="{C9EFC970-2310-904A-942F-4211BAA30449}" type="presOf" srcId="{E68E29C5-E4D7-434A-875B-21750E3E0353}" destId="{92BBACBD-019F-144C-8637-FBD80133653D}" srcOrd="0" destOrd="0" presId="urn:microsoft.com/office/officeart/2005/8/layout/hList1"/>
+    <dgm:cxn modelId="{56FF5ACF-262D-0647-936C-639D6DF07BA6}" srcId="{42630A07-DCFA-484B-9DB3-F5AEAAD996F9}" destId="{C9A2EFC4-81C3-DA43-A847-1A73CDCB69F4}" srcOrd="4" destOrd="0" parTransId="{3F02A17F-3EF8-F440-B296-DE1CC4436816}" sibTransId="{C3F4BB75-A965-E84D-BD1B-C1CCF8A2E33F}"/>
+    <dgm:cxn modelId="{79F47C4C-4C19-B64F-96EC-685D0E76FB7B}" type="presOf" srcId="{42630A07-DCFA-484B-9DB3-F5AEAAD996F9}" destId="{FD5FB62A-646C-D64D-AD68-2142122D4AE7}" srcOrd="0" destOrd="0" presId="urn:microsoft.com/office/officeart/2005/8/layout/hList1"/>
+    <dgm:cxn modelId="{0D2A59B7-49C4-0947-ACC5-19AF4DF21D44}" type="presOf" srcId="{DD8A92AB-1262-D14E-963F-3A35119EB779}" destId="{C6C15021-3E49-9A44-B2B2-6BEDB8687CAC}" srcOrd="0" destOrd="8" presId="urn:microsoft.com/office/officeart/2005/8/layout/hList1"/>
+    <dgm:cxn modelId="{EAC62293-FEAA-9942-AAF1-3FA8C099BF75}" type="presOf" srcId="{ACDA1808-FE2C-DF49-ACA8-2D37B226428B}" destId="{14B6CA00-5F61-564B-92F9-594F06D73999}" srcOrd="0" destOrd="0" presId="urn:microsoft.com/office/officeart/2005/8/layout/hList1"/>
+    <dgm:cxn modelId="{BAE1E32C-4844-1A49-AB70-CD88571693F8}" srcId="{E68E29C5-E4D7-434A-875B-21750E3E0353}" destId="{B1BD251C-74A6-E046-9924-6B130BEC7FB3}" srcOrd="9" destOrd="0" parTransId="{6D952F70-2721-D841-A17C-22B0F113D9DA}" sibTransId="{4ADCA896-45F0-B946-8CC9-9DFFA8F9267C}"/>
+    <dgm:cxn modelId="{2BC40BD9-9A6E-6A4F-A2C8-A88761949623}" type="presOf" srcId="{52D60A4E-1BEB-7943-832C-CA76BFF6D7CA}" destId="{30DBE893-0FB6-F64F-BFD6-635313C8E75E}" srcOrd="0" destOrd="0" presId="urn:microsoft.com/office/officeart/2005/8/layout/hList1"/>
     <dgm:cxn modelId="{CD04C508-46D8-E645-9715-42250CC424BD}" type="presOf" srcId="{0BE386F1-E3A1-9B40-A273-7559DC333DC8}" destId="{C6C15021-3E49-9A44-B2B2-6BEDB8687CAC}" srcOrd="0" destOrd="5" presId="urn:microsoft.com/office/officeart/2005/8/layout/hList1"/>
-    <dgm:cxn modelId="{AB8B5D9E-0BEA-9B42-8EE0-0446EEF9AD7F}" type="presOf" srcId="{E00E4437-3764-504D-A445-145DB993CFF2}" destId="{C6C15021-3E49-9A44-B2B2-6BEDB8687CAC}" srcOrd="0" destOrd="2" presId="urn:microsoft.com/office/officeart/2005/8/layout/hList1"/>
-    <dgm:cxn modelId="{2BC40BD9-9A6E-6A4F-A2C8-A88761949623}" type="presOf" srcId="{52D60A4E-1BEB-7943-832C-CA76BFF6D7CA}" destId="{30DBE893-0FB6-F64F-BFD6-635313C8E75E}" srcOrd="0" destOrd="0" presId="urn:microsoft.com/office/officeart/2005/8/layout/hList1"/>
     <dgm:cxn modelId="{D065C2F6-E212-1F42-BEBD-ECDEBC921D45}" srcId="{42630A07-DCFA-484B-9DB3-F5AEAAD996F9}" destId="{ACDA1808-FE2C-DF49-ACA8-2D37B226428B}" srcOrd="0" destOrd="0" parTransId="{4374FA81-C02D-DB46-958E-753255760455}" sibTransId="{7D90027A-5EA4-2044-87B6-D68E9D877B5B}"/>
-    <dgm:cxn modelId="{3587BEDD-0EBC-1D40-A58F-4014F160CD51}" type="presOf" srcId="{B1BD251C-74A6-E046-9924-6B130BEC7FB3}" destId="{C6C15021-3E49-9A44-B2B2-6BEDB8687CAC}" srcOrd="0" destOrd="9" presId="urn:microsoft.com/office/officeart/2005/8/layout/hList1"/>
-    <dgm:cxn modelId="{EAC62293-FEAA-9942-AAF1-3FA8C099BF75}" type="presOf" srcId="{ACDA1808-FE2C-DF49-ACA8-2D37B226428B}" destId="{14B6CA00-5F61-564B-92F9-594F06D73999}" srcOrd="0" destOrd="0" presId="urn:microsoft.com/office/officeart/2005/8/layout/hList1"/>
+    <dgm:cxn modelId="{F54F657D-31F0-1D4A-B3E2-AA3B7A4CF770}" type="presOf" srcId="{70A5E778-AFCA-A946-B6B7-E9018C237695}" destId="{CB7460AF-4F25-BD4E-960C-96B640F3AA05}" srcOrd="0" destOrd="0" presId="urn:microsoft.com/office/officeart/2005/8/layout/hList1"/>
+    <dgm:cxn modelId="{65A681DD-AD84-C845-8187-A5B9B150266A}" srcId="{E68E29C5-E4D7-434A-875B-21750E3E0353}" destId="{A57B3DAC-846D-7647-BFCD-40C245427A27}" srcOrd="0" destOrd="0" parTransId="{D8D4FC8B-9A21-754F-842B-7A6EE19E3BE1}" sibTransId="{6A9EE42C-4A2A-9B49-AD72-1FFF6CE49692}"/>
+    <dgm:cxn modelId="{A011714D-B870-5A4D-A5D9-F178886FD771}" srcId="{42630A07-DCFA-484B-9DB3-F5AEAAD996F9}" destId="{F3FE80A6-1A05-EF49-A11C-5FB2001D0A01}" srcOrd="1" destOrd="0" parTransId="{80907BFD-3B8F-4F43-8E7B-E5966633C336}" sibTransId="{0CA05C61-500D-6440-BF2A-AA6908FA94A6}"/>
+    <dgm:cxn modelId="{28708A2F-DFBA-C649-AFC4-07805F02C6C4}" srcId="{70A5E778-AFCA-A946-B6B7-E9018C237695}" destId="{E68E29C5-E4D7-434A-875B-21750E3E0353}" srcOrd="0" destOrd="0" parTransId="{CBAF8A5D-76E1-004D-A4B6-2250EC1723CE}" sibTransId="{7D1A6CC6-FFB5-2E4F-8653-0820DC21CE2D}"/>
+    <dgm:cxn modelId="{27AD6E73-56FB-F742-BD06-F02A9590CB98}" srcId="{E68E29C5-E4D7-434A-875B-21750E3E0353}" destId="{E64E35A3-8837-DD45-9C2A-06462ED25F0C}" srcOrd="7" destOrd="0" parTransId="{B5124557-396E-F74B-A770-F13FFC1EE30A}" sibTransId="{C78398F2-4FE2-B846-AAA9-57FAAA7A3127}"/>
+    <dgm:cxn modelId="{AF02EC83-3BE6-544F-B9CE-43EAEC58FF8B}" type="presOf" srcId="{C9A2EFC4-81C3-DA43-A847-1A73CDCB69F4}" destId="{14B6CA00-5F61-564B-92F9-594F06D73999}" srcOrd="0" destOrd="4" presId="urn:microsoft.com/office/officeart/2005/8/layout/hList1"/>
+    <dgm:cxn modelId="{5C7DA287-4C31-B441-A9E9-652C5C2B5A25}" srcId="{E68E29C5-E4D7-434A-875B-21750E3E0353}" destId="{DD8A92AB-1262-D14E-963F-3A35119EB779}" srcOrd="8" destOrd="0" parTransId="{46C30B3D-2C65-7146-B7CA-8257474C5ACC}" sibTransId="{24EE00FA-40DB-EF4B-917B-C0A641640646}"/>
+    <dgm:cxn modelId="{D41CAD7D-E534-7C4F-9B62-9D3A6465CA0E}" srcId="{42630A07-DCFA-484B-9DB3-F5AEAAD996F9}" destId="{44F1CA15-C4DE-8D45-804F-129D3F8A6690}" srcOrd="6" destOrd="0" parTransId="{E10A52A8-E459-B345-8AB7-4428F9DCF6E8}" sibTransId="{CB12D0EF-B700-6C43-A13E-AA8C50F8CE16}"/>
     <dgm:cxn modelId="{077243DA-5D8D-2143-81F9-759EF73D50DC}" type="presOf" srcId="{5FF66264-A599-8E4B-BD8D-F10CEB70BA30}" destId="{14B6CA00-5F61-564B-92F9-594F06D73999}" srcOrd="0" destOrd="9" presId="urn:microsoft.com/office/officeart/2005/8/layout/hList1"/>
+    <dgm:cxn modelId="{54C62854-CFE9-4947-B1C0-9227B88AE76E}" type="presOf" srcId="{44F1CA15-C4DE-8D45-804F-129D3F8A6690}" destId="{14B6CA00-5F61-564B-92F9-594F06D73999}" srcOrd="0" destOrd="6" presId="urn:microsoft.com/office/officeart/2005/8/layout/hList1"/>
+    <dgm:cxn modelId="{065AB682-C55F-D240-B52E-35BA010A4379}" type="presOf" srcId="{6A782498-1CD6-8543-A095-B5EA90F443B9}" destId="{14B6CA00-5F61-564B-92F9-594F06D73999}" srcOrd="0" destOrd="5" presId="urn:microsoft.com/office/officeart/2005/8/layout/hList1"/>
     <dgm:cxn modelId="{6819D6B9-57C1-7040-84AB-2F5B0C5CBB06}" type="presOf" srcId="{62A408E2-CBCB-4143-8F2C-2F16E8333347}" destId="{C6C15021-3E49-9A44-B2B2-6BEDB8687CAC}" srcOrd="0" destOrd="6" presId="urn:microsoft.com/office/officeart/2005/8/layout/hList1"/>
-    <dgm:cxn modelId="{B4FC9489-A320-3446-B050-CE1A6B355CBC}" srcId="{E68E29C5-E4D7-434A-875B-21750E3E0353}" destId="{62A408E2-CBCB-4143-8F2C-2F16E8333347}" srcOrd="6" destOrd="0" parTransId="{2483A5AC-A35F-3C41-95F7-81CF13289E35}" sibTransId="{6BB391F2-16DC-2A4E-8768-19C4DE03092C}"/>
-    <dgm:cxn modelId="{79F47C4C-4C19-B64F-96EC-685D0E76FB7B}" type="presOf" srcId="{42630A07-DCFA-484B-9DB3-F5AEAAD996F9}" destId="{FD5FB62A-646C-D64D-AD68-2142122D4AE7}" srcOrd="0" destOrd="0" presId="urn:microsoft.com/office/officeart/2005/8/layout/hList1"/>
-    <dgm:cxn modelId="{76B74BC5-7191-844C-929B-8CDA180FFF61}" type="presOf" srcId="{E64E35A3-8837-DD45-9C2A-06462ED25F0C}" destId="{C6C15021-3E49-9A44-B2B2-6BEDB8687CAC}" srcOrd="0" destOrd="7" presId="urn:microsoft.com/office/officeart/2005/8/layout/hList1"/>
-    <dgm:cxn modelId="{54C62854-CFE9-4947-B1C0-9227B88AE76E}" type="presOf" srcId="{44F1CA15-C4DE-8D45-804F-129D3F8A6690}" destId="{14B6CA00-5F61-564B-92F9-594F06D73999}" srcOrd="0" destOrd="6" presId="urn:microsoft.com/office/officeart/2005/8/layout/hList1"/>
-    <dgm:cxn modelId="{27AD6E73-56FB-F742-BD06-F02A9590CB98}" srcId="{E68E29C5-E4D7-434A-875B-21750E3E0353}" destId="{E64E35A3-8837-DD45-9C2A-06462ED25F0C}" srcOrd="7" destOrd="0" parTransId="{B5124557-396E-F74B-A770-F13FFC1EE30A}" sibTransId="{C78398F2-4FE2-B846-AAA9-57FAAA7A3127}"/>
-    <dgm:cxn modelId="{F54F657D-31F0-1D4A-B3E2-AA3B7A4CF770}" type="presOf" srcId="{70A5E778-AFCA-A946-B6B7-E9018C237695}" destId="{CB7460AF-4F25-BD4E-960C-96B640F3AA05}" srcOrd="0" destOrd="0" presId="urn:microsoft.com/office/officeart/2005/8/layout/hList1"/>
-    <dgm:cxn modelId="{AEA4086B-8D50-C645-A70B-0D6862B5B268}" srcId="{42630A07-DCFA-484B-9DB3-F5AEAAD996F9}" destId="{231C6582-A73B-6944-9B91-CFF35E47AA15}" srcOrd="8" destOrd="0" parTransId="{A0D62229-535B-6B46-915A-83A0F90D3F99}" sibTransId="{E34F470B-E02C-C44E-B6EF-8313B966DC25}"/>
-    <dgm:cxn modelId="{EEE11A36-26BA-1A4E-86E3-B70BD017B707}" srcId="{E68E29C5-E4D7-434A-875B-21750E3E0353}" destId="{2F2B2B94-7095-E44B-A2CE-7964817AB1CD}" srcOrd="1" destOrd="0" parTransId="{26963A6E-7BBB-3D45-812C-A96C784E8933}" sibTransId="{0B583481-29CD-0F41-A92C-44518A64D2D2}"/>
-    <dgm:cxn modelId="{5C7DA287-4C31-B441-A9E9-652C5C2B5A25}" srcId="{E68E29C5-E4D7-434A-875B-21750E3E0353}" destId="{DD8A92AB-1262-D14E-963F-3A35119EB779}" srcOrd="8" destOrd="0" parTransId="{46C30B3D-2C65-7146-B7CA-8257474C5ACC}" sibTransId="{24EE00FA-40DB-EF4B-917B-C0A641640646}"/>
-    <dgm:cxn modelId="{56FF5ACF-262D-0647-936C-639D6DF07BA6}" srcId="{42630A07-DCFA-484B-9DB3-F5AEAAD996F9}" destId="{C9A2EFC4-81C3-DA43-A847-1A73CDCB69F4}" srcOrd="4" destOrd="0" parTransId="{3F02A17F-3EF8-F440-B296-DE1CC4436816}" sibTransId="{C3F4BB75-A965-E84D-BD1B-C1CCF8A2E33F}"/>
+    <dgm:cxn modelId="{12D3611A-6235-3341-82D7-B63953AA6C24}" type="presOf" srcId="{563D4C83-E92A-D44A-BB7C-3A9634CE2C6D}" destId="{C6C15021-3E49-9A44-B2B2-6BEDB8687CAC}" srcOrd="0" destOrd="4" presId="urn:microsoft.com/office/officeart/2005/8/layout/hList1"/>
+    <dgm:cxn modelId="{22426B1F-4089-3F4B-9D2C-EEE2F03F0C68}" srcId="{70A5E778-AFCA-A946-B6B7-E9018C237695}" destId="{52D60A4E-1BEB-7943-832C-CA76BFF6D7CA}" srcOrd="2" destOrd="0" parTransId="{402BFD52-E5A8-E949-B665-34E5E7C024AB}" sibTransId="{57C26A45-48E4-784D-8325-33A6901003E9}"/>
     <dgm:cxn modelId="{D693122C-3943-9349-8648-8F8425FE587D}" srcId="{42630A07-DCFA-484B-9DB3-F5AEAAD996F9}" destId="{E4641ABD-8784-014A-B685-7508124E6982}" srcOrd="7" destOrd="0" parTransId="{222E8C3D-EB8C-5841-A553-60FC03AB7F45}" sibTransId="{606A045C-06DE-D642-84DF-96EB27FE5A6D}"/>
-    <dgm:cxn modelId="{BAE1E32C-4844-1A49-AB70-CD88571693F8}" srcId="{E68E29C5-E4D7-434A-875B-21750E3E0353}" destId="{B1BD251C-74A6-E046-9924-6B130BEC7FB3}" srcOrd="9" destOrd="0" parTransId="{6D952F70-2721-D841-A17C-22B0F113D9DA}" sibTransId="{4ADCA896-45F0-B946-8CC9-9DFFA8F9267C}"/>
-    <dgm:cxn modelId="{C9EFC970-2310-904A-942F-4211BAA30449}" type="presOf" srcId="{E68E29C5-E4D7-434A-875B-21750E3E0353}" destId="{92BBACBD-019F-144C-8637-FBD80133653D}" srcOrd="0" destOrd="0" presId="urn:microsoft.com/office/officeart/2005/8/layout/hList1"/>
-    <dgm:cxn modelId="{665B7B8A-A1D9-9246-81D7-6C7F2545B1DF}" type="presOf" srcId="{E4641ABD-8784-014A-B685-7508124E6982}" destId="{14B6CA00-5F61-564B-92F9-594F06D73999}" srcOrd="0" destOrd="7" presId="urn:microsoft.com/office/officeart/2005/8/layout/hList1"/>
     <dgm:cxn modelId="{E93B8485-B88D-1C46-8A74-120A9D19B4D7}" type="presOf" srcId="{2F2B2B94-7095-E44B-A2CE-7964817AB1CD}" destId="{C6C15021-3E49-9A44-B2B2-6BEDB8687CAC}" srcOrd="0" destOrd="1" presId="urn:microsoft.com/office/officeart/2005/8/layout/hList1"/>
     <dgm:cxn modelId="{DB389053-25EC-824D-94E4-7B05207A19F1}" type="presOf" srcId="{93866546-FE30-2841-8439-EEB238AA6D33}" destId="{14B6CA00-5F61-564B-92F9-594F06D73999}" srcOrd="0" destOrd="3" presId="urn:microsoft.com/office/officeart/2005/8/layout/hList1"/>
-    <dgm:cxn modelId="{CEDB1C52-8F0C-0741-82CA-0EE33B49908F}" srcId="{70A5E778-AFCA-A946-B6B7-E9018C237695}" destId="{42630A07-DCFA-484B-9DB3-F5AEAAD996F9}" srcOrd="1" destOrd="0" parTransId="{A4CBF787-C708-E048-8949-534DE271C27F}" sibTransId="{E5B05E30-2F6C-F342-865E-02E01F694A55}"/>
-    <dgm:cxn modelId="{28708A2F-DFBA-C649-AFC4-07805F02C6C4}" srcId="{70A5E778-AFCA-A946-B6B7-E9018C237695}" destId="{E68E29C5-E4D7-434A-875B-21750E3E0353}" srcOrd="0" destOrd="0" parTransId="{CBAF8A5D-76E1-004D-A4B6-2250EC1723CE}" sibTransId="{7D1A6CC6-FFB5-2E4F-8653-0820DC21CE2D}"/>
-    <dgm:cxn modelId="{B34BCE24-4A24-D74D-895D-5BBAD89FA76E}" type="presOf" srcId="{F3FE80A6-1A05-EF49-A11C-5FB2001D0A01}" destId="{14B6CA00-5F61-564B-92F9-594F06D73999}" srcOrd="0" destOrd="1" presId="urn:microsoft.com/office/officeart/2005/8/layout/hList1"/>
+    <dgm:cxn modelId="{8EDCFBB2-21CE-A04B-B0B5-1F7E4DA6D354}" srcId="{E68E29C5-E4D7-434A-875B-21750E3E0353}" destId="{0BE386F1-E3A1-9B40-A273-7559DC333DC8}" srcOrd="5" destOrd="0" parTransId="{E83E9660-648F-664C-BD96-44F350938D68}" sibTransId="{6FB2D117-3254-2E42-A7D0-69C10999C037}"/>
     <dgm:cxn modelId="{DB8001C5-2BAA-1543-A8B2-03F1DF58AAD9}" srcId="{E68E29C5-E4D7-434A-875B-21750E3E0353}" destId="{E00E4437-3764-504D-A445-145DB993CFF2}" srcOrd="2" destOrd="0" parTransId="{C69F6A32-A939-0D4D-A170-B98800FEFA25}" sibTransId="{EA082724-A308-CF46-B056-4A5B36B03989}"/>
-    <dgm:cxn modelId="{E6F5DB3C-18F2-5F40-8EC7-79B5D1E8C579}" type="presOf" srcId="{1E93DEC3-F1AD-0749-8523-108E79615CCB}" destId="{C6C15021-3E49-9A44-B2B2-6BEDB8687CAC}" srcOrd="0" destOrd="3" presId="urn:microsoft.com/office/officeart/2005/8/layout/hList1"/>
-    <dgm:cxn modelId="{12D3611A-6235-3341-82D7-B63953AA6C24}" type="presOf" srcId="{563D4C83-E92A-D44A-BB7C-3A9634CE2C6D}" destId="{C6C15021-3E49-9A44-B2B2-6BEDB8687CAC}" srcOrd="0" destOrd="4" presId="urn:microsoft.com/office/officeart/2005/8/layout/hList1"/>
-    <dgm:cxn modelId="{E52A83B6-80EB-0B46-968A-AE262E00C0D6}" type="presOf" srcId="{A57B3DAC-846D-7647-BFCD-40C245427A27}" destId="{C6C15021-3E49-9A44-B2B2-6BEDB8687CAC}" srcOrd="0" destOrd="0" presId="urn:microsoft.com/office/officeart/2005/8/layout/hList1"/>
-    <dgm:cxn modelId="{65A681DD-AD84-C845-8187-A5B9B150266A}" srcId="{E68E29C5-E4D7-434A-875B-21750E3E0353}" destId="{A57B3DAC-846D-7647-BFCD-40C245427A27}" srcOrd="0" destOrd="0" parTransId="{D8D4FC8B-9A21-754F-842B-7A6EE19E3BE1}" sibTransId="{6A9EE42C-4A2A-9B49-AD72-1FFF6CE49692}"/>
-    <dgm:cxn modelId="{065AB682-C55F-D240-B52E-35BA010A4379}" type="presOf" srcId="{6A782498-1CD6-8543-A095-B5EA90F443B9}" destId="{14B6CA00-5F61-564B-92F9-594F06D73999}" srcOrd="0" destOrd="5" presId="urn:microsoft.com/office/officeart/2005/8/layout/hList1"/>
-    <dgm:cxn modelId="{22426B1F-4089-3F4B-9D2C-EEE2F03F0C68}" srcId="{70A5E778-AFCA-A946-B6B7-E9018C237695}" destId="{52D60A4E-1BEB-7943-832C-CA76BFF6D7CA}" srcOrd="2" destOrd="0" parTransId="{402BFD52-E5A8-E949-B665-34E5E7C024AB}" sibTransId="{57C26A45-48E4-784D-8325-33A6901003E9}"/>
-    <dgm:cxn modelId="{8EDCFBB2-21CE-A04B-B0B5-1F7E4DA6D354}" srcId="{E68E29C5-E4D7-434A-875B-21750E3E0353}" destId="{0BE386F1-E3A1-9B40-A273-7559DC333DC8}" srcOrd="5" destOrd="0" parTransId="{E83E9660-648F-664C-BD96-44F350938D68}" sibTransId="{6FB2D117-3254-2E42-A7D0-69C10999C037}"/>
-    <dgm:cxn modelId="{97C3B838-8C78-7A42-A576-1CCCB248A0DA}" srcId="{42630A07-DCFA-484B-9DB3-F5AEAAD996F9}" destId="{EBD066FD-4AC8-064D-AB5C-9193A4B3D56A}" srcOrd="2" destOrd="0" parTransId="{228540D3-C969-4E4C-8EA3-CA88A77D5BB0}" sibTransId="{9634C674-7419-A447-952F-507BED070FAD}"/>
-    <dgm:cxn modelId="{AF02EC83-3BE6-544F-B9CE-43EAEC58FF8B}" type="presOf" srcId="{C9A2EFC4-81C3-DA43-A847-1A73CDCB69F4}" destId="{14B6CA00-5F61-564B-92F9-594F06D73999}" srcOrd="0" destOrd="4" presId="urn:microsoft.com/office/officeart/2005/8/layout/hList1"/>
-    <dgm:cxn modelId="{E8A57BCC-E333-5B48-B3A6-0C4DA49A2CCE}" srcId="{E68E29C5-E4D7-434A-875B-21750E3E0353}" destId="{563D4C83-E92A-D44A-BB7C-3A9634CE2C6D}" srcOrd="4" destOrd="0" parTransId="{00CBD091-D314-3846-9FDA-0C69128B4323}" sibTransId="{09EA99E5-6040-CA49-9028-82AE2A185CC1}"/>
-    <dgm:cxn modelId="{0D2A59B7-49C4-0947-ACC5-19AF4DF21D44}" type="presOf" srcId="{DD8A92AB-1262-D14E-963F-3A35119EB779}" destId="{C6C15021-3E49-9A44-B2B2-6BEDB8687CAC}" srcOrd="0" destOrd="8" presId="urn:microsoft.com/office/officeart/2005/8/layout/hList1"/>
-    <dgm:cxn modelId="{D41CAD7D-E534-7C4F-9B62-9D3A6465CA0E}" srcId="{42630A07-DCFA-484B-9DB3-F5AEAAD996F9}" destId="{44F1CA15-C4DE-8D45-804F-129D3F8A6690}" srcOrd="6" destOrd="0" parTransId="{E10A52A8-E459-B345-8AB7-4428F9DCF6E8}" sibTransId="{CB12D0EF-B700-6C43-A13E-AA8C50F8CE16}"/>
     <dgm:cxn modelId="{39DC03E6-7A8A-8E40-BA43-D4CD6B975384}" srcId="{42630A07-DCFA-484B-9DB3-F5AEAAD996F9}" destId="{5FF66264-A599-8E4B-BD8D-F10CEB70BA30}" srcOrd="9" destOrd="0" parTransId="{1F68037E-F86F-B843-9BE5-B2545E6F87AC}" sibTransId="{615D059F-4E70-2A4B-B25E-D1C5DC71FB08}"/>
-    <dgm:cxn modelId="{A011714D-B870-5A4D-A5D9-F178886FD771}" srcId="{42630A07-DCFA-484B-9DB3-F5AEAAD996F9}" destId="{F3FE80A6-1A05-EF49-A11C-5FB2001D0A01}" srcOrd="1" destOrd="0" parTransId="{80907BFD-3B8F-4F43-8E7B-E5966633C336}" sibTransId="{0CA05C61-500D-6440-BF2A-AA6908FA94A6}"/>
+    <dgm:cxn modelId="{76B74BC5-7191-844C-929B-8CDA180FFF61}" type="presOf" srcId="{E64E35A3-8837-DD45-9C2A-06462ED25F0C}" destId="{C6C15021-3E49-9A44-B2B2-6BEDB8687CAC}" srcOrd="0" destOrd="7" presId="urn:microsoft.com/office/officeart/2005/8/layout/hList1"/>
+    <dgm:cxn modelId="{AEA4086B-8D50-C645-A70B-0D6862B5B268}" srcId="{42630A07-DCFA-484B-9DB3-F5AEAAD996F9}" destId="{231C6582-A73B-6944-9B91-CFF35E47AA15}" srcOrd="8" destOrd="0" parTransId="{A0D62229-535B-6B46-915A-83A0F90D3F99}" sibTransId="{E34F470B-E02C-C44E-B6EF-8313B966DC25}"/>
+    <dgm:cxn modelId="{03AF63E6-B411-944F-B103-45D48C59A62F}" srcId="{42630A07-DCFA-484B-9DB3-F5AEAAD996F9}" destId="{93866546-FE30-2841-8439-EEB238AA6D33}" srcOrd="3" destOrd="0" parTransId="{E2D2D0FF-AAF9-DD41-AD65-A90B7C214C12}" sibTransId="{FDBA5791-587A-5C42-AA46-098871ACB74E}"/>
+    <dgm:cxn modelId="{209624C2-BEF1-7248-BF67-0D38A350127B}" type="presOf" srcId="{EBD066FD-4AC8-064D-AB5C-9193A4B3D56A}" destId="{14B6CA00-5F61-564B-92F9-594F06D73999}" srcOrd="0" destOrd="2" presId="urn:microsoft.com/office/officeart/2005/8/layout/hList1"/>
+    <dgm:cxn modelId="{EEE11A36-26BA-1A4E-86E3-B70BD017B707}" srcId="{E68E29C5-E4D7-434A-875B-21750E3E0353}" destId="{2F2B2B94-7095-E44B-A2CE-7964817AB1CD}" srcOrd="1" destOrd="0" parTransId="{26963A6E-7BBB-3D45-812C-A96C784E8933}" sibTransId="{0B583481-29CD-0F41-A92C-44518A64D2D2}"/>
+    <dgm:cxn modelId="{B4FC9489-A320-3446-B050-CE1A6B355CBC}" srcId="{E68E29C5-E4D7-434A-875B-21750E3E0353}" destId="{62A408E2-CBCB-4143-8F2C-2F16E8333347}" srcOrd="6" destOrd="0" parTransId="{2483A5AC-A35F-3C41-95F7-81CF13289E35}" sibTransId="{6BB391F2-16DC-2A4E-8768-19C4DE03092C}"/>
     <dgm:cxn modelId="{DD4BF1AE-AD20-B847-91C6-A19E19CA625B}" type="presParOf" srcId="{CB7460AF-4F25-BD4E-960C-96B640F3AA05}" destId="{CB02F17D-42A1-4044-ABD3-0F2B78E1F2B4}" srcOrd="0" destOrd="0" presId="urn:microsoft.com/office/officeart/2005/8/layout/hList1"/>
     <dgm:cxn modelId="{CF027232-F80D-A342-9151-1A88067D800E}" type="presParOf" srcId="{CB02F17D-42A1-4044-ABD3-0F2B78E1F2B4}" destId="{92BBACBD-019F-144C-8637-FBD80133653D}" srcOrd="0" destOrd="0" presId="urn:microsoft.com/office/officeart/2005/8/layout/hList1"/>
     <dgm:cxn modelId="{5240242E-6628-5E43-8935-BC8EEBE273E2}" type="presParOf" srcId="{CB02F17D-42A1-4044-ABD3-0F2B78E1F2B4}" destId="{C6C15021-3E49-9A44-B2B2-6BEDB8687CAC}" srcOrd="1" destOrd="0" presId="urn:microsoft.com/office/officeart/2005/8/layout/hList1"/>
@@ -14455,8 +15662,8 @@
     </dgm:pt>
   </dgm:ptLst>
   <dgm:cxnLst>
+    <dgm:cxn modelId="{EE54D38F-9355-AC49-ABA3-13533B19A87A}" srcId="{70A5E778-AFCA-A946-B6B7-E9018C237695}" destId="{3FF92AB4-5F3D-2F47-AF94-07DEF542D124}" srcOrd="1" destOrd="0" parTransId="{65E4845A-14D5-A540-AA84-CF5EA11A6F85}" sibTransId="{CB414626-D10D-8043-88E0-B22EAC80F0D7}"/>
     <dgm:cxn modelId="{D693122C-3943-9349-8648-8F8425FE587D}" srcId="{3FF92AB4-5F3D-2F47-AF94-07DEF542D124}" destId="{E4641ABD-8784-014A-B685-7508124E6982}" srcOrd="1" destOrd="0" parTransId="{222E8C3D-EB8C-5841-A553-60FC03AB7F45}" sibTransId="{606A045C-06DE-D642-84DF-96EB27FE5A6D}"/>
-    <dgm:cxn modelId="{EE54D38F-9355-AC49-ABA3-13533B19A87A}" srcId="{70A5E778-AFCA-A946-B6B7-E9018C237695}" destId="{3FF92AB4-5F3D-2F47-AF94-07DEF542D124}" srcOrd="1" destOrd="0" parTransId="{65E4845A-14D5-A540-AA84-CF5EA11A6F85}" sibTransId="{CB414626-D10D-8043-88E0-B22EAC80F0D7}"/>
     <dgm:cxn modelId="{75A85E6F-87A9-CE4B-90B2-99A5A885E029}" srcId="{3FF92AB4-5F3D-2F47-AF94-07DEF542D124}" destId="{52998DCD-9058-2349-B895-6BEBE4B77937}" srcOrd="0" destOrd="0" parTransId="{94EE037E-631B-4C47-9898-F0A5DA885F38}" sibTransId="{FAAED39E-2022-4D41-A7F2-7D1A95D84C79}"/>
     <dgm:cxn modelId="{73287663-17E0-3F4D-901D-CA40C98616EE}" srcId="{2209AEEA-5F84-E64F-9EBD-8FF772D27DF8}" destId="{6DA3BA12-54C0-1C48-8025-FAEC2E0D9903}" srcOrd="2" destOrd="0" parTransId="{B19E9CDC-B61E-DB4A-8A3E-707B39DC93E1}" sibTransId="{712A6154-B495-3C49-B963-F5BC9FCCF5E6}"/>
     <dgm:cxn modelId="{67FA4002-99B3-ED44-A1F3-8CF1AB6960AF}" type="presOf" srcId="{2209AEEA-5F84-E64F-9EBD-8FF772D27DF8}" destId="{7E6C81D4-705E-6B42-A657-E351F81CCFF3}" srcOrd="0" destOrd="0" presId="urn:microsoft.com/office/officeart/2005/8/layout/hList1"/>
@@ -15122,8 +16329,8 @@
     <dgm:cxn modelId="{BF33067C-B186-A549-9940-D1840D615458}" srcId="{2209AEEA-5F84-E64F-9EBD-8FF772D27DF8}" destId="{0C113674-F92A-DB4A-95DF-2E5D01B51808}" srcOrd="0" destOrd="0" parTransId="{B9BAA6C7-87A5-744C-ABB8-8B0E85BAB237}" sibTransId="{4629FA03-8E76-1644-92CF-0F98C3FF0823}"/>
     <dgm:cxn modelId="{8A045F55-BFAF-E94F-AA26-116B6D456DC4}" type="presOf" srcId="{2209AEEA-5F84-E64F-9EBD-8FF772D27DF8}" destId="{7E6C81D4-705E-6B42-A657-E351F81CCFF3}" srcOrd="0" destOrd="0" presId="urn:microsoft.com/office/officeart/2005/8/layout/hList1"/>
     <dgm:cxn modelId="{D6570CFD-9330-3848-8434-F6F4D57DFB81}" type="presOf" srcId="{0C113674-F92A-DB4A-95DF-2E5D01B51808}" destId="{EBF8DBF3-6E5F-5847-A68E-96B2A92CD659}" srcOrd="0" destOrd="0" presId="urn:microsoft.com/office/officeart/2005/8/layout/hList1"/>
+    <dgm:cxn modelId="{7AB9D239-6845-5043-BB35-456296A54BAE}" type="presOf" srcId="{70A5E778-AFCA-A946-B6B7-E9018C237695}" destId="{CB7460AF-4F25-BD4E-960C-96B640F3AA05}" srcOrd="0" destOrd="0" presId="urn:microsoft.com/office/officeart/2005/8/layout/hList1"/>
     <dgm:cxn modelId="{BF661864-A4AE-C24E-8C24-EA0EF2930AC5}" srcId="{70A5E778-AFCA-A946-B6B7-E9018C237695}" destId="{2209AEEA-5F84-E64F-9EBD-8FF772D27DF8}" srcOrd="0" destOrd="0" parTransId="{0BA36C0C-9D9C-6645-A703-125733D3F321}" sibTransId="{EA937E8A-C8D0-3E4B-8C0E-14BE6580222D}"/>
-    <dgm:cxn modelId="{7AB9D239-6845-5043-BB35-456296A54BAE}" type="presOf" srcId="{70A5E778-AFCA-A946-B6B7-E9018C237695}" destId="{CB7460AF-4F25-BD4E-960C-96B640F3AA05}" srcOrd="0" destOrd="0" presId="urn:microsoft.com/office/officeart/2005/8/layout/hList1"/>
     <dgm:cxn modelId="{49B48215-6B61-2D4E-9008-DBE0EC201B49}" type="presParOf" srcId="{CB7460AF-4F25-BD4E-960C-96B640F3AA05}" destId="{B17656AB-CE6F-3840-95E0-D1E085C4626A}" srcOrd="0" destOrd="0" presId="urn:microsoft.com/office/officeart/2005/8/layout/hList1"/>
     <dgm:cxn modelId="{F04A69AD-5B81-C14A-8A79-9AE8D821B3D0}" type="presParOf" srcId="{B17656AB-CE6F-3840-95E0-D1E085C4626A}" destId="{7E6C81D4-705E-6B42-A657-E351F81CCFF3}" srcOrd="0" destOrd="0" presId="urn:microsoft.com/office/officeart/2005/8/layout/hList1"/>
     <dgm:cxn modelId="{5DBEC887-6174-FE49-AC89-BF44A3D63367}" type="presParOf" srcId="{B17656AB-CE6F-3840-95E0-D1E085C4626A}" destId="{EBF8DBF3-6E5F-5847-A68E-96B2A92CD659}" srcOrd="1" destOrd="0" presId="urn:microsoft.com/office/officeart/2005/8/layout/hList1"/>
@@ -15214,14 +16421,14 @@
       </dgm:t>
     </dgm:pt>
     <dgm:pt modelId="{8B5D1120-60E9-C142-A036-C99225282765}">
-      <dgm:prSet/>
+      <dgm:prSet custT="1"/>
       <dgm:spPr/>
       <dgm:t>
         <a:bodyPr/>
         <a:lstStyle/>
         <a:p>
           <a:r>
-            <a:rPr lang="en-US" dirty="0" smtClean="0"/>
+            <a:rPr lang="en-US" sz="3800" dirty="0" smtClean="0"/>
             <a:t>Conducting surveys of standardized test takers and gauged interest</a:t>
           </a:r>
         </a:p>
@@ -15250,14 +16457,14 @@
       </dgm:t>
     </dgm:pt>
     <dgm:pt modelId="{0C113674-F92A-DB4A-95DF-2E5D01B51808}">
-      <dgm:prSet/>
+      <dgm:prSet custT="1"/>
       <dgm:spPr/>
       <dgm:t>
         <a:bodyPr/>
         <a:lstStyle/>
         <a:p>
           <a:r>
-            <a:rPr lang="en-US" dirty="0" smtClean="0"/>
+            <a:rPr lang="en-US" sz="3800" dirty="0" smtClean="0"/>
             <a:t>Revision 1.0</a:t>
           </a:r>
         </a:p>
@@ -15286,53 +16493,76 @@
       </dgm:t>
     </dgm:pt>
     <dgm:pt modelId="{B3C5A3C5-81BD-2A45-B06F-784CF8D587BA}">
+      <dgm:prSet custT="1"/>
+      <dgm:spPr/>
+      <dgm:t>
+        <a:bodyPr/>
+        <a:lstStyle/>
+        <a:p>
+          <a:r>
+            <a:rPr lang="en-US" sz="3800" dirty="0" smtClean="0"/>
+            <a:t>GUI development</a:t>
+          </a:r>
+        </a:p>
+      </dgm:t>
+    </dgm:pt>
+    <dgm:pt modelId="{6537A68D-A715-0F46-BCA2-631A80E966D1}" type="parTrans" cxnId="{7F7B51F0-4E6A-B348-AB3C-5F30ADA5567F}">
       <dgm:prSet/>
       <dgm:spPr/>
       <dgm:t>
         <a:bodyPr/>
         <a:lstStyle/>
         <a:p>
-          <a:r>
-            <a:rPr lang="en-US" dirty="0" smtClean="0"/>
-            <a:t>GUI development</a:t>
-          </a:r>
+          <a:endParaRPr lang="en-US"/>
         </a:p>
       </dgm:t>
     </dgm:pt>
-    <dgm:pt modelId="{6537A68D-A715-0F46-BCA2-631A80E966D1}" type="parTrans" cxnId="{7F7B51F0-4E6A-B348-AB3C-5F30ADA5567F}">
-      <dgm:prSet/>
-      <dgm:spPr/>
-    </dgm:pt>
     <dgm:pt modelId="{039F6129-28F6-FF48-91E4-00CC5948008F}" type="sibTrans" cxnId="{7F7B51F0-4E6A-B348-AB3C-5F30ADA5567F}">
-      <dgm:prSet/>
-      <dgm:spPr/>
-    </dgm:pt>
-    <dgm:pt modelId="{6B1BCCB4-1FAC-9A4C-9579-25EF3D3E60DF}">
       <dgm:prSet/>
       <dgm:spPr/>
       <dgm:t>
         <a:bodyPr/>
         <a:lstStyle/>
         <a:p>
+          <a:endParaRPr lang="en-US"/>
+        </a:p>
+      </dgm:t>
+    </dgm:pt>
+    <dgm:pt modelId="{6B1BCCB4-1FAC-9A4C-9579-25EF3D3E60DF}">
+      <dgm:prSet custT="1"/>
+      <dgm:spPr/>
+      <dgm:t>
+        <a:bodyPr/>
+        <a:lstStyle/>
+        <a:p>
           <a:r>
-            <a:rPr lang="en-US" dirty="0" smtClean="0"/>
-            <a:t>Website </a:t>
+            <a:rPr lang="en-US" sz="3800" dirty="0" smtClean="0"/>
+            <a:t>Website to highlight strengths</a:t>
           </a:r>
-          <a:r>
-            <a:rPr lang="en-US" dirty="0" smtClean="0"/>
-            <a:t>to highlight strengths</a:t>
-          </a:r>
-          <a:endParaRPr lang="en-US" dirty="0" smtClean="0"/>
         </a:p>
       </dgm:t>
     </dgm:pt>
     <dgm:pt modelId="{5C2E8CE3-FA59-F344-9A08-80A34BC24D2B}" type="parTrans" cxnId="{4CA28881-18E5-6B4E-9B20-04C7C1202DE8}">
       <dgm:prSet/>
       <dgm:spPr/>
+      <dgm:t>
+        <a:bodyPr/>
+        <a:lstStyle/>
+        <a:p>
+          <a:endParaRPr lang="en-US"/>
+        </a:p>
+      </dgm:t>
     </dgm:pt>
     <dgm:pt modelId="{E4B4DDF3-44E9-6142-BCFE-B5AAA2A62366}" type="sibTrans" cxnId="{4CA28881-18E5-6B4E-9B20-04C7C1202DE8}">
       <dgm:prSet/>
       <dgm:spPr/>
+      <dgm:t>
+        <a:bodyPr/>
+        <a:lstStyle/>
+        <a:p>
+          <a:endParaRPr lang="en-US"/>
+        </a:p>
+      </dgm:t>
     </dgm:pt>
     <dgm:pt modelId="{CB7460AF-4F25-BD4E-960C-96B640F3AA05}" type="pres">
       <dgm:prSet presAssocID="{70A5E778-AFCA-A946-B6B7-E9018C237695}" presName="Name0" presStyleCnt="0">
@@ -15718,7 +16948,7 @@
                 </a:solidFill>
               </a:ln>
             </a:rPr>
-            <a:t>Store Data</a:t>
+            <a:t>Our Pillars</a:t>
           </a:r>
           <a:endParaRPr lang="en-US" sz="3600" dirty="0">
             <a:ln>
@@ -16113,30 +17343,30 @@
     </dgm:pt>
   </dgm:ptLst>
   <dgm:cxnLst>
+    <dgm:cxn modelId="{1053FEAF-BD96-3249-9FA0-514B8A57CCA9}" type="presOf" srcId="{10410FBB-2576-8C40-A58C-AB25EB573677}" destId="{EBF8DBF3-6E5F-5847-A68E-96B2A92CD659}" srcOrd="0" destOrd="4" presId="urn:microsoft.com/office/officeart/2005/8/layout/hList1"/>
+    <dgm:cxn modelId="{7D1E3701-DD56-2E48-A6E1-107E88892C11}" type="presOf" srcId="{93E094C9-DA5B-6F49-BC95-7851E6C5C530}" destId="{EBF8DBF3-6E5F-5847-A68E-96B2A92CD659}" srcOrd="0" destOrd="7" presId="urn:microsoft.com/office/officeart/2005/8/layout/hList1"/>
     <dgm:cxn modelId="{1A6CFF73-36C7-2D44-9B63-4F1E0ECBBD86}" srcId="{2209AEEA-5F84-E64F-9EBD-8FF772D27DF8}" destId="{D1F92C95-CFF0-9F4A-B33A-2E110BADCD67}" srcOrd="6" destOrd="0" parTransId="{9804EC8D-0F99-8742-B1BC-7B84EE529766}" sibTransId="{9B26A82C-852C-5244-9054-12C94E60B5FB}"/>
-    <dgm:cxn modelId="{0E1C4437-5646-4140-91F7-3F76CCB9C8BE}" type="presOf" srcId="{19D708D6-D27D-3A4B-886A-DB7B0D510F2C}" destId="{EBF8DBF3-6E5F-5847-A68E-96B2A92CD659}" srcOrd="0" destOrd="2" presId="urn:microsoft.com/office/officeart/2005/8/layout/hList1"/>
+    <dgm:cxn modelId="{CA7E6112-0A70-7A44-8266-4BC5AA04815D}" type="presOf" srcId="{2209AEEA-5F84-E64F-9EBD-8FF772D27DF8}" destId="{7E6C81D4-705E-6B42-A657-E351F81CCFF3}" srcOrd="0" destOrd="0" presId="urn:microsoft.com/office/officeart/2005/8/layout/hList1"/>
+    <dgm:cxn modelId="{CA17C03F-D107-DE4B-94AB-B51F6AA06372}" type="presOf" srcId="{70A5E778-AFCA-A946-B6B7-E9018C237695}" destId="{CB7460AF-4F25-BD4E-960C-96B640F3AA05}" srcOrd="0" destOrd="0" presId="urn:microsoft.com/office/officeart/2005/8/layout/hList1"/>
     <dgm:cxn modelId="{BF661864-A4AE-C24E-8C24-EA0EF2930AC5}" srcId="{70A5E778-AFCA-A946-B6B7-E9018C237695}" destId="{2209AEEA-5F84-E64F-9EBD-8FF772D27DF8}" srcOrd="0" destOrd="0" parTransId="{0BA36C0C-9D9C-6645-A703-125733D3F321}" sibTransId="{EA937E8A-C8D0-3E4B-8C0E-14BE6580222D}"/>
     <dgm:cxn modelId="{28543334-FB22-D449-9748-CAC6B818BC69}" srcId="{2209AEEA-5F84-E64F-9EBD-8FF772D27DF8}" destId="{1A57E6ED-CEBB-3C46-8F99-7D04431D0C52}" srcOrd="3" destOrd="0" parTransId="{DA92A563-5C1B-BE4D-8737-0B98ABC82931}" sibTransId="{F22B4315-3F2C-0E4A-96F0-D69EC6A590E1}"/>
-    <dgm:cxn modelId="{791224CE-C319-5844-9B19-A234249B1C35}" type="presOf" srcId="{EDDA4A65-D04B-224D-B4E4-0DE423E1DCF9}" destId="{EBF8DBF3-6E5F-5847-A68E-96B2A92CD659}" srcOrd="0" destOrd="0" presId="urn:microsoft.com/office/officeart/2005/8/layout/hList1"/>
+    <dgm:cxn modelId="{71B42E48-BE7A-634C-8715-D4D626E6CFA0}" type="presOf" srcId="{1A57E6ED-CEBB-3C46-8F99-7D04431D0C52}" destId="{EBF8DBF3-6E5F-5847-A68E-96B2A92CD659}" srcOrd="0" destOrd="3" presId="urn:microsoft.com/office/officeart/2005/8/layout/hList1"/>
     <dgm:cxn modelId="{4D568ADB-1919-1344-970F-1B28E2780C98}" srcId="{2209AEEA-5F84-E64F-9EBD-8FF772D27DF8}" destId="{19D708D6-D27D-3A4B-886A-DB7B0D510F2C}" srcOrd="2" destOrd="0" parTransId="{C286A733-AF5C-6848-95CF-E93FC133EE08}" sibTransId="{E3E3F5CD-4260-FA4D-8782-CB3397950BEC}"/>
-    <dgm:cxn modelId="{E23B7ACD-1DFB-EF47-B92C-1099034D93B5}" type="presOf" srcId="{1A57E6ED-CEBB-3C46-8F99-7D04431D0C52}" destId="{EBF8DBF3-6E5F-5847-A68E-96B2A92CD659}" srcOrd="0" destOrd="3" presId="urn:microsoft.com/office/officeart/2005/8/layout/hList1"/>
-    <dgm:cxn modelId="{E8CED718-8780-4549-88A8-AD40DF7B5D99}" type="presOf" srcId="{93E094C9-DA5B-6F49-BC95-7851E6C5C530}" destId="{EBF8DBF3-6E5F-5847-A68E-96B2A92CD659}" srcOrd="0" destOrd="7" presId="urn:microsoft.com/office/officeart/2005/8/layout/hList1"/>
+    <dgm:cxn modelId="{5E1EB648-0E05-204A-8F42-CF52B415FC50}" type="presOf" srcId="{749BBB69-76B8-6349-8047-68683438B47A}" destId="{EBF8DBF3-6E5F-5847-A68E-96B2A92CD659}" srcOrd="0" destOrd="5" presId="urn:microsoft.com/office/officeart/2005/8/layout/hList1"/>
+    <dgm:cxn modelId="{E2BCE2C6-79CC-EA4C-A745-278CD8643390}" type="presOf" srcId="{D1F92C95-CFF0-9F4A-B33A-2E110BADCD67}" destId="{EBF8DBF3-6E5F-5847-A68E-96B2A92CD659}" srcOrd="0" destOrd="6" presId="urn:microsoft.com/office/officeart/2005/8/layout/hList1"/>
     <dgm:cxn modelId="{947A11EF-6AB9-4544-9090-34B4957F3133}" srcId="{2209AEEA-5F84-E64F-9EBD-8FF772D27DF8}" destId="{10410FBB-2576-8C40-A58C-AB25EB573677}" srcOrd="4" destOrd="0" parTransId="{352CB9BC-710C-914A-BED6-D5E1EC8BE968}" sibTransId="{AE660217-24EA-D64B-916C-D29DE107F60D}"/>
-    <dgm:cxn modelId="{1BD023D4-3CBD-D844-9043-7EC65E80348D}" type="presOf" srcId="{0147E501-E825-5446-BF3F-C5170975A319}" destId="{EBF8DBF3-6E5F-5847-A68E-96B2A92CD659}" srcOrd="0" destOrd="8" presId="urn:microsoft.com/office/officeart/2005/8/layout/hList1"/>
-    <dgm:cxn modelId="{397B7B44-30EA-7D41-B313-EAD2D7685EF3}" type="presOf" srcId="{70A5E778-AFCA-A946-B6B7-E9018C237695}" destId="{CB7460AF-4F25-BD4E-960C-96B640F3AA05}" srcOrd="0" destOrd="0" presId="urn:microsoft.com/office/officeart/2005/8/layout/hList1"/>
     <dgm:cxn modelId="{A0CDDB70-AD7C-944C-ACF6-1DCD3F342530}" srcId="{2209AEEA-5F84-E64F-9EBD-8FF772D27DF8}" destId="{EDDA4A65-D04B-224D-B4E4-0DE423E1DCF9}" srcOrd="0" destOrd="0" parTransId="{1288CC64-A9EB-CC4F-A8E4-1EE28C097D7A}" sibTransId="{A931BE9D-D3BD-0344-B8ED-7AB03B82E613}"/>
     <dgm:cxn modelId="{4CB615A8-7F15-A74E-8A3D-CE5A5A104012}" srcId="{2209AEEA-5F84-E64F-9EBD-8FF772D27DF8}" destId="{749BBB69-76B8-6349-8047-68683438B47A}" srcOrd="5" destOrd="0" parTransId="{E40F8621-1CC0-6F47-9857-AFB0DDD5EBF6}" sibTransId="{A5271B73-2A2F-A94F-8B57-58D34F0B4FCE}"/>
     <dgm:cxn modelId="{6B45AE64-D9FB-0140-95F0-B25F0B2CBC06}" srcId="{2209AEEA-5F84-E64F-9EBD-8FF772D27DF8}" destId="{93E094C9-DA5B-6F49-BC95-7851E6C5C530}" srcOrd="7" destOrd="0" parTransId="{C3BB2670-AB4F-4C47-8A9D-9B2DF804B807}" sibTransId="{B189A5C0-08A1-044A-822A-C45BB8C973FA}"/>
-    <dgm:cxn modelId="{539E65E0-E303-7041-A920-2F68B2AFDBEE}" type="presOf" srcId="{749BBB69-76B8-6349-8047-68683438B47A}" destId="{EBF8DBF3-6E5F-5847-A68E-96B2A92CD659}" srcOrd="0" destOrd="5" presId="urn:microsoft.com/office/officeart/2005/8/layout/hList1"/>
-    <dgm:cxn modelId="{A37F5184-00B3-3848-9177-49FD4563483F}" type="presOf" srcId="{2209AEEA-5F84-E64F-9EBD-8FF772D27DF8}" destId="{7E6C81D4-705E-6B42-A657-E351F81CCFF3}" srcOrd="0" destOrd="0" presId="urn:microsoft.com/office/officeart/2005/8/layout/hList1"/>
-    <dgm:cxn modelId="{0179D9A5-B756-F64C-B518-09E8B7BA3AFB}" type="presOf" srcId="{5ACD7E5B-B339-EB4A-AD50-AD20C86800DA}" destId="{EBF8DBF3-6E5F-5847-A68E-96B2A92CD659}" srcOrd="0" destOrd="1" presId="urn:microsoft.com/office/officeart/2005/8/layout/hList1"/>
-    <dgm:cxn modelId="{CB42AF44-D50D-E74A-8D41-581EF940F11E}" type="presOf" srcId="{10410FBB-2576-8C40-A58C-AB25EB573677}" destId="{EBF8DBF3-6E5F-5847-A68E-96B2A92CD659}" srcOrd="0" destOrd="4" presId="urn:microsoft.com/office/officeart/2005/8/layout/hList1"/>
-    <dgm:cxn modelId="{A88A4F7F-C548-1F4F-A013-D131D7F82B17}" type="presOf" srcId="{D1F92C95-CFF0-9F4A-B33A-2E110BADCD67}" destId="{EBF8DBF3-6E5F-5847-A68E-96B2A92CD659}" srcOrd="0" destOrd="6" presId="urn:microsoft.com/office/officeart/2005/8/layout/hList1"/>
+    <dgm:cxn modelId="{3A45B2E9-F62F-7546-8D25-CA72224CC086}" type="presOf" srcId="{5ACD7E5B-B339-EB4A-AD50-AD20C86800DA}" destId="{EBF8DBF3-6E5F-5847-A68E-96B2A92CD659}" srcOrd="0" destOrd="1" presId="urn:microsoft.com/office/officeart/2005/8/layout/hList1"/>
+    <dgm:cxn modelId="{54745F5C-418C-8B4B-9C2E-9CE8A8954AD7}" type="presOf" srcId="{EDDA4A65-D04B-224D-B4E4-0DE423E1DCF9}" destId="{EBF8DBF3-6E5F-5847-A68E-96B2A92CD659}" srcOrd="0" destOrd="0" presId="urn:microsoft.com/office/officeart/2005/8/layout/hList1"/>
+    <dgm:cxn modelId="{0A86CDFA-859F-514E-BA9C-0C85F0D70460}" type="presOf" srcId="{0147E501-E825-5446-BF3F-C5170975A319}" destId="{EBF8DBF3-6E5F-5847-A68E-96B2A92CD659}" srcOrd="0" destOrd="8" presId="urn:microsoft.com/office/officeart/2005/8/layout/hList1"/>
     <dgm:cxn modelId="{E399124C-EE63-0340-94C6-87C7AEEAF923}" srcId="{2209AEEA-5F84-E64F-9EBD-8FF772D27DF8}" destId="{0147E501-E825-5446-BF3F-C5170975A319}" srcOrd="8" destOrd="0" parTransId="{09BE2E53-BF92-6241-88E5-5DB9BCFE7E9D}" sibTransId="{50B296DE-FD30-AC4B-8E06-1ADD2399D396}"/>
+    <dgm:cxn modelId="{222EC1D5-0390-9C49-944C-3F4CF916835A}" type="presOf" srcId="{19D708D6-D27D-3A4B-886A-DB7B0D510F2C}" destId="{EBF8DBF3-6E5F-5847-A68E-96B2A92CD659}" srcOrd="0" destOrd="2" presId="urn:microsoft.com/office/officeart/2005/8/layout/hList1"/>
     <dgm:cxn modelId="{10F00651-17C0-C549-A2AD-37880B65C920}" srcId="{2209AEEA-5F84-E64F-9EBD-8FF772D27DF8}" destId="{5ACD7E5B-B339-EB4A-AD50-AD20C86800DA}" srcOrd="1" destOrd="0" parTransId="{4A9186E9-0099-E34A-A0E9-08AFFC91B1C7}" sibTransId="{186D8D00-8BFB-E346-B2F4-BE068FB07C0C}"/>
-    <dgm:cxn modelId="{4ABFDCC8-3BA2-3A42-BC41-E26755B5F088}" type="presParOf" srcId="{CB7460AF-4F25-BD4E-960C-96B640F3AA05}" destId="{B17656AB-CE6F-3840-95E0-D1E085C4626A}" srcOrd="0" destOrd="0" presId="urn:microsoft.com/office/officeart/2005/8/layout/hList1"/>
-    <dgm:cxn modelId="{9EF79472-F72E-B24F-89BF-5A279C99442D}" type="presParOf" srcId="{B17656AB-CE6F-3840-95E0-D1E085C4626A}" destId="{7E6C81D4-705E-6B42-A657-E351F81CCFF3}" srcOrd="0" destOrd="0" presId="urn:microsoft.com/office/officeart/2005/8/layout/hList1"/>
-    <dgm:cxn modelId="{E1A34017-04EB-4B44-AF51-EF6A2B597262}" type="presParOf" srcId="{B17656AB-CE6F-3840-95E0-D1E085C4626A}" destId="{EBF8DBF3-6E5F-5847-A68E-96B2A92CD659}" srcOrd="1" destOrd="0" presId="urn:microsoft.com/office/officeart/2005/8/layout/hList1"/>
+    <dgm:cxn modelId="{23810868-AFCB-364B-AD7A-0C14AFD71CD4}" type="presParOf" srcId="{CB7460AF-4F25-BD4E-960C-96B640F3AA05}" destId="{B17656AB-CE6F-3840-95E0-D1E085C4626A}" srcOrd="0" destOrd="0" presId="urn:microsoft.com/office/officeart/2005/8/layout/hList1"/>
+    <dgm:cxn modelId="{8F9DBDDE-83F6-364C-A709-1EEAF82BF7E7}" type="presParOf" srcId="{B17656AB-CE6F-3840-95E0-D1E085C4626A}" destId="{7E6C81D4-705E-6B42-A657-E351F81CCFF3}" srcOrd="0" destOrd="0" presId="urn:microsoft.com/office/officeart/2005/8/layout/hList1"/>
+    <dgm:cxn modelId="{28B8BC77-B8FC-D241-B14B-F081E41EEAFE}" type="presParOf" srcId="{B17656AB-CE6F-3840-95E0-D1E085C4626A}" destId="{EBF8DBF3-6E5F-5847-A68E-96B2A92CD659}" srcOrd="1" destOrd="0" presId="urn:microsoft.com/office/officeart/2005/8/layout/hList1"/>
   </dgm:cxnLst>
   <dgm:bg/>
   <dgm:whole/>
@@ -16443,7 +17673,7 @@
                 </a:solidFill>
               </a:ln>
             </a:rPr>
-            <a:t>Powerful Algorithms</a:t>
+            <a:t>Store Data</a:t>
           </a:r>
           <a:endParaRPr lang="en-US" sz="3600" kern="1200" dirty="0">
             <a:ln>
@@ -16739,7 +17969,7 @@
                 </a:solidFill>
               </a:ln>
             </a:rPr>
-            <a:t>Simple Interface</a:t>
+            <a:t>Powerful Algorithms</a:t>
           </a:r>
           <a:endParaRPr lang="en-US" sz="3600" kern="1200" dirty="0">
             <a:ln>
@@ -16956,6 +18186,302 @@
 </file>
 
 <file path=ppt/diagrams/drawing12.xml><?xml version="1.0" encoding="utf-8"?>
+<dsp:drawing xmlns:dgm="http://schemas.openxmlformats.org/drawingml/2006/diagram" xmlns:dsp="http://schemas.microsoft.com/office/drawing/2008/diagram" xmlns:a="http://schemas.openxmlformats.org/drawingml/2006/main">
+  <dsp:spTree>
+    <dsp:nvGrpSpPr>
+      <dsp:cNvPr id="0" name=""/>
+      <dsp:cNvGrpSpPr/>
+    </dsp:nvGrpSpPr>
+    <dsp:grpSpPr/>
+    <dsp:sp modelId="{7E6C81D4-705E-6B42-A657-E351F81CCFF3}">
+      <dsp:nvSpPr>
+        <dsp:cNvPr id="0" name=""/>
+        <dsp:cNvSpPr/>
+      </dsp:nvSpPr>
+      <dsp:spPr>
+        <a:xfrm>
+          <a:off x="0" y="7967"/>
+          <a:ext cx="8534400" cy="832079"/>
+        </a:xfrm>
+        <a:prstGeom prst="rect">
+          <a:avLst/>
+        </a:prstGeom>
+        <a:solidFill>
+          <a:schemeClr val="tx2">
+            <a:lumMod val="40000"/>
+            <a:lumOff val="60000"/>
+          </a:schemeClr>
+        </a:solidFill>
+        <a:ln w="9525" cap="flat" cmpd="sng" algn="ctr">
+          <a:solidFill>
+            <a:srgbClr val="8EB4E3"/>
+          </a:solidFill>
+          <a:prstDash val="solid"/>
+        </a:ln>
+        <a:effectLst>
+          <a:outerShdw blurRad="40000" dist="23000" dir="5400000" rotWithShape="0">
+            <a:srgbClr val="000000">
+              <a:alpha val="35000"/>
+            </a:srgbClr>
+          </a:outerShdw>
+        </a:effectLst>
+      </dsp:spPr>
+      <dsp:style>
+        <a:lnRef idx="1">
+          <a:scrgbClr r="0" g="0" b="0"/>
+        </a:lnRef>
+        <a:fillRef idx="3">
+          <a:scrgbClr r="0" g="0" b="0"/>
+        </a:fillRef>
+        <a:effectRef idx="2">
+          <a:scrgbClr r="0" g="0" b="0"/>
+        </a:effectRef>
+        <a:fontRef idx="minor">
+          <a:schemeClr val="lt1"/>
+        </a:fontRef>
+      </dsp:style>
+      <dsp:txBody>
+        <a:bodyPr spcFirstLastPara="0" vert="horz" wrap="square" lIns="256032" tIns="146304" rIns="256032" bIns="146304" numCol="1" spcCol="1270" anchor="ctr" anchorCtr="0">
+          <a:noAutofit/>
+        </a:bodyPr>
+        <a:lstStyle/>
+        <a:p>
+          <a:pPr lvl="0" algn="ctr" defTabSz="1600200">
+            <a:lnSpc>
+              <a:spcPct val="90000"/>
+            </a:lnSpc>
+            <a:spcBef>
+              <a:spcPct val="0"/>
+            </a:spcBef>
+            <a:spcAft>
+              <a:spcPct val="35000"/>
+            </a:spcAft>
+          </a:pPr>
+          <a:r>
+            <a:rPr lang="en-US" sz="3600" kern="1200" dirty="0" smtClean="0">
+              <a:ln>
+                <a:solidFill>
+                  <a:schemeClr val="bg1"/>
+                </a:solidFill>
+              </a:ln>
+            </a:rPr>
+            <a:t>Simple Interface</a:t>
+          </a:r>
+          <a:endParaRPr lang="en-US" sz="3600" kern="1200" dirty="0">
+            <a:ln>
+              <a:solidFill>
+                <a:schemeClr val="bg1"/>
+              </a:solidFill>
+            </a:ln>
+          </a:endParaRPr>
+        </a:p>
+      </dsp:txBody>
+      <dsp:txXfrm>
+        <a:off x="0" y="7967"/>
+        <a:ext cx="8534400" cy="832079"/>
+      </dsp:txXfrm>
+    </dsp:sp>
+    <dsp:sp modelId="{EBF8DBF3-6E5F-5847-A68E-96B2A92CD659}">
+      <dsp:nvSpPr>
+        <dsp:cNvPr id="0" name=""/>
+        <dsp:cNvSpPr/>
+      </dsp:nvSpPr>
+      <dsp:spPr>
+        <a:xfrm>
+          <a:off x="0" y="840047"/>
+          <a:ext cx="8534400" cy="4068089"/>
+        </a:xfrm>
+        <a:prstGeom prst="rect">
+          <a:avLst/>
+        </a:prstGeom>
+        <a:solidFill>
+          <a:schemeClr val="accent1">
+            <a:alpha val="90000"/>
+            <a:tint val="40000"/>
+            <a:hueOff val="0"/>
+            <a:satOff val="0"/>
+            <a:lumOff val="0"/>
+            <a:alphaOff val="0"/>
+          </a:schemeClr>
+        </a:solidFill>
+        <a:ln w="9525" cap="flat" cmpd="sng" algn="ctr">
+          <a:solidFill>
+            <a:schemeClr val="accent1">
+              <a:alpha val="90000"/>
+              <a:tint val="40000"/>
+              <a:hueOff val="0"/>
+              <a:satOff val="0"/>
+              <a:lumOff val="0"/>
+              <a:alphaOff val="0"/>
+            </a:schemeClr>
+          </a:solidFill>
+          <a:prstDash val="solid"/>
+        </a:ln>
+        <a:effectLst/>
+      </dsp:spPr>
+      <dsp:style>
+        <a:lnRef idx="1">
+          <a:scrgbClr r="0" g="0" b="0"/>
+        </a:lnRef>
+        <a:fillRef idx="1">
+          <a:scrgbClr r="0" g="0" b="0"/>
+        </a:fillRef>
+        <a:effectRef idx="0">
+          <a:scrgbClr r="0" g="0" b="0"/>
+        </a:effectRef>
+        <a:fontRef idx="minor"/>
+      </dsp:style>
+      <dsp:txBody>
+        <a:bodyPr spcFirstLastPara="0" vert="horz" wrap="square" lIns="138684" tIns="138684" rIns="184912" bIns="208026" numCol="1" spcCol="1270" anchor="t" anchorCtr="0">
+          <a:noAutofit/>
+        </a:bodyPr>
+        <a:lstStyle/>
+        <a:p>
+          <a:pPr marL="228600" lvl="1" indent="-228600" algn="ctr" defTabSz="1155700">
+            <a:lnSpc>
+              <a:spcPct val="90000"/>
+            </a:lnSpc>
+            <a:spcBef>
+              <a:spcPct val="0"/>
+            </a:spcBef>
+            <a:spcAft>
+              <a:spcPct val="15000"/>
+            </a:spcAft>
+            <a:buChar char="••"/>
+          </a:pPr>
+          <a:endParaRPr lang="en-US" sz="2600" kern="1200" dirty="0" smtClean="0"/>
+        </a:p>
+        <a:p>
+          <a:pPr marL="228600" lvl="1" indent="-228600" algn="ctr" defTabSz="1155700">
+            <a:lnSpc>
+              <a:spcPct val="90000"/>
+            </a:lnSpc>
+            <a:spcBef>
+              <a:spcPct val="0"/>
+            </a:spcBef>
+            <a:spcAft>
+              <a:spcPct val="15000"/>
+            </a:spcAft>
+            <a:buChar char="••"/>
+          </a:pPr>
+          <a:endParaRPr lang="en-US" sz="2600" kern="1200" dirty="0" smtClean="0"/>
+        </a:p>
+        <a:p>
+          <a:pPr marL="228600" lvl="1" indent="-228600" algn="ctr" defTabSz="1155700">
+            <a:lnSpc>
+              <a:spcPct val="90000"/>
+            </a:lnSpc>
+            <a:spcBef>
+              <a:spcPct val="0"/>
+            </a:spcBef>
+            <a:spcAft>
+              <a:spcPct val="15000"/>
+            </a:spcAft>
+            <a:buChar char="••"/>
+          </a:pPr>
+          <a:endParaRPr lang="en-US" sz="2600" kern="1200" dirty="0" smtClean="0"/>
+        </a:p>
+        <a:p>
+          <a:pPr marL="228600" lvl="1" indent="-228600" algn="ctr" defTabSz="1155700">
+            <a:lnSpc>
+              <a:spcPct val="90000"/>
+            </a:lnSpc>
+            <a:spcBef>
+              <a:spcPct val="0"/>
+            </a:spcBef>
+            <a:spcAft>
+              <a:spcPct val="15000"/>
+            </a:spcAft>
+            <a:buChar char="••"/>
+          </a:pPr>
+          <a:endParaRPr lang="en-US" sz="2600" kern="1200" dirty="0" smtClean="0"/>
+        </a:p>
+        <a:p>
+          <a:pPr marL="228600" lvl="1" indent="-228600" algn="ctr" defTabSz="1155700">
+            <a:lnSpc>
+              <a:spcPct val="90000"/>
+            </a:lnSpc>
+            <a:spcBef>
+              <a:spcPct val="0"/>
+            </a:spcBef>
+            <a:spcAft>
+              <a:spcPct val="15000"/>
+            </a:spcAft>
+            <a:buChar char="••"/>
+          </a:pPr>
+          <a:endParaRPr lang="en-US" sz="2600" kern="1200" dirty="0" smtClean="0"/>
+        </a:p>
+        <a:p>
+          <a:pPr marL="228600" lvl="1" indent="-228600" algn="ctr" defTabSz="1155700">
+            <a:lnSpc>
+              <a:spcPct val="90000"/>
+            </a:lnSpc>
+            <a:spcBef>
+              <a:spcPct val="0"/>
+            </a:spcBef>
+            <a:spcAft>
+              <a:spcPct val="15000"/>
+            </a:spcAft>
+            <a:buChar char="••"/>
+          </a:pPr>
+          <a:endParaRPr lang="en-US" sz="2600" kern="1200" dirty="0" smtClean="0"/>
+        </a:p>
+        <a:p>
+          <a:pPr marL="228600" lvl="1" indent="-228600" algn="ctr" defTabSz="1155700">
+            <a:lnSpc>
+              <a:spcPct val="90000"/>
+            </a:lnSpc>
+            <a:spcBef>
+              <a:spcPct val="0"/>
+            </a:spcBef>
+            <a:spcAft>
+              <a:spcPct val="15000"/>
+            </a:spcAft>
+            <a:buChar char="••"/>
+          </a:pPr>
+          <a:endParaRPr lang="en-US" sz="2600" kern="1200" dirty="0" smtClean="0"/>
+        </a:p>
+        <a:p>
+          <a:pPr marL="228600" lvl="1" indent="-228600" algn="ctr" defTabSz="1155700">
+            <a:lnSpc>
+              <a:spcPct val="90000"/>
+            </a:lnSpc>
+            <a:spcBef>
+              <a:spcPct val="0"/>
+            </a:spcBef>
+            <a:spcAft>
+              <a:spcPct val="15000"/>
+            </a:spcAft>
+            <a:buChar char="••"/>
+          </a:pPr>
+          <a:endParaRPr lang="en-US" sz="2600" kern="1200" dirty="0" smtClean="0"/>
+        </a:p>
+        <a:p>
+          <a:pPr marL="228600" lvl="1" indent="-228600" algn="ctr" defTabSz="1155700">
+            <a:lnSpc>
+              <a:spcPct val="90000"/>
+            </a:lnSpc>
+            <a:spcBef>
+              <a:spcPct val="0"/>
+            </a:spcBef>
+            <a:spcAft>
+              <a:spcPct val="15000"/>
+            </a:spcAft>
+            <a:buChar char="••"/>
+          </a:pPr>
+          <a:endParaRPr lang="en-US" sz="2600" kern="1200" dirty="0" smtClean="0"/>
+        </a:p>
+      </dsp:txBody>
+      <dsp:txXfrm>
+        <a:off x="0" y="840047"/>
+        <a:ext cx="8534400" cy="4068089"/>
+      </dsp:txXfrm>
+    </dsp:sp>
+  </dsp:spTree>
+</dsp:drawing>
+</file>
+
+<file path=ppt/diagrams/drawing13.xml><?xml version="1.0" encoding="utf-8"?>
 <dsp:drawing xmlns:dgm="http://schemas.openxmlformats.org/drawingml/2006/diagram" xmlns:dsp="http://schemas.microsoft.com/office/drawing/2008/diagram" xmlns:a="http://schemas.openxmlformats.org/drawingml/2006/main">
   <dsp:spTree>
     <dsp:nvGrpSpPr>
@@ -17339,15 +18865,7 @@
           </a:pPr>
           <a:r>
             <a:rPr lang="en-US" sz="2500" kern="1200" dirty="0" smtClean="0"/>
-            <a:t>Target school score </a:t>
-          </a:r>
-          <a:r>
-            <a:rPr lang="en-US" sz="2500" kern="1200" dirty="0" smtClean="0"/>
-            <a:t>calculator </a:t>
-          </a:r>
-          <a:r>
-            <a:rPr lang="en-US" sz="2500" kern="1200" dirty="0" smtClean="0"/>
-            <a:t>that shows progress in relation to school applicant scores</a:t>
+            <a:t>Target school score calculator that shows progress in relation to school applicant scores</a:t>
           </a:r>
           <a:endParaRPr lang="en-US" sz="2500" kern="1200" dirty="0"/>
         </a:p>
@@ -17370,11 +18888,7 @@
           </a:r>
           <a:r>
             <a:rPr lang="en-US" sz="2500" kern="1200" smtClean="0"/>
-            <a:t>and </a:t>
-          </a:r>
-          <a:r>
-            <a:rPr lang="en-US" sz="2500" kern="1200" smtClean="0"/>
-            <a:t>breaks </a:t>
+            <a:t>and breaks </a:t>
           </a:r>
           <a:r>
             <a:rPr lang="en-US" sz="2500" kern="1200" dirty="0" smtClean="0"/>
@@ -17409,7 +18923,7 @@
 </dsp:drawing>
 </file>
 
-<file path=ppt/diagrams/drawing13.xml><?xml version="1.0" encoding="utf-8"?>
+<file path=ppt/diagrams/drawing14.xml><?xml version="1.0" encoding="utf-8"?>
 <dsp:drawing xmlns:dgm="http://schemas.openxmlformats.org/drawingml/2006/diagram" xmlns:dsp="http://schemas.microsoft.com/office/drawing/2008/diagram" xmlns:a="http://schemas.openxmlformats.org/drawingml/2006/main">
   <dsp:spTree>
     <dsp:nvGrpSpPr>
@@ -17585,7 +19099,7 @@
 </dsp:drawing>
 </file>
 
-<file path=ppt/diagrams/drawing14.xml><?xml version="1.0" encoding="utf-8"?>
+<file path=ppt/diagrams/drawing15.xml><?xml version="1.0" encoding="utf-8"?>
 <dsp:drawing xmlns:dgm="http://schemas.openxmlformats.org/drawingml/2006/diagram" xmlns:dsp="http://schemas.microsoft.com/office/drawing/2008/diagram" xmlns:a="http://schemas.openxmlformats.org/drawingml/2006/main">
   <dsp:spTree>
     <dsp:nvGrpSpPr>
@@ -19887,7 +21401,7 @@
       </dsp:nvSpPr>
       <dsp:spPr>
         <a:xfrm>
-          <a:off x="0" y="39864"/>
+          <a:off x="0" y="93391"/>
           <a:ext cx="8534400" cy="1123200"/>
         </a:xfrm>
         <a:prstGeom prst="rect">
@@ -19964,7 +21478,7 @@
         </a:p>
       </dsp:txBody>
       <dsp:txXfrm>
-        <a:off x="0" y="39864"/>
+        <a:off x="0" y="93391"/>
         <a:ext cx="8534400" cy="1123200"/>
       </dsp:txXfrm>
     </dsp:sp>
@@ -19975,8 +21489,8 @@
       </dsp:nvSpPr>
       <dsp:spPr>
         <a:xfrm>
-          <a:off x="0" y="1163064"/>
-          <a:ext cx="8534400" cy="3532815"/>
+          <a:off x="0" y="1216592"/>
+          <a:ext cx="8534400" cy="3425760"/>
         </a:xfrm>
         <a:prstGeom prst="rect">
           <a:avLst/>
@@ -20019,12 +21533,12 @@
         <a:fontRef idx="minor"/>
       </dsp:style>
       <dsp:txBody>
-        <a:bodyPr spcFirstLastPara="0" vert="horz" wrap="square" lIns="208026" tIns="208026" rIns="277368" bIns="312039" numCol="1" spcCol="1270" anchor="t" anchorCtr="0">
+        <a:bodyPr spcFirstLastPara="0" vert="horz" wrap="square" lIns="202692" tIns="202692" rIns="270256" bIns="304038" numCol="1" spcCol="1270" anchor="t" anchorCtr="0">
           <a:noAutofit/>
         </a:bodyPr>
         <a:lstStyle/>
         <a:p>
-          <a:pPr marL="285750" lvl="1" indent="-285750" algn="l" defTabSz="1733550">
+          <a:pPr marL="285750" lvl="1" indent="-285750" algn="l" defTabSz="1689100">
             <a:lnSpc>
               <a:spcPct val="90000"/>
             </a:lnSpc>
@@ -20037,12 +21551,12 @@
             <a:buChar char="••"/>
           </a:pPr>
           <a:r>
-            <a:rPr lang="en-US" sz="3900" kern="1200" dirty="0" smtClean="0"/>
+            <a:rPr lang="en-US" sz="3800" kern="1200" dirty="0" smtClean="0"/>
             <a:t>Revision 1.0</a:t>
           </a:r>
         </a:p>
         <a:p>
-          <a:pPr marL="285750" lvl="1" indent="-285750" algn="l" defTabSz="1733550">
+          <a:pPr marL="285750" lvl="1" indent="-285750" algn="l" defTabSz="1689100">
             <a:lnSpc>
               <a:spcPct val="90000"/>
             </a:lnSpc>
@@ -20055,12 +21569,12 @@
             <a:buChar char="••"/>
           </a:pPr>
           <a:r>
-            <a:rPr lang="en-US" sz="3900" kern="1200" dirty="0" smtClean="0"/>
+            <a:rPr lang="en-US" sz="3800" kern="1200" dirty="0" smtClean="0"/>
             <a:t>Conducting surveys of standardized test takers and gauged interest</a:t>
           </a:r>
         </a:p>
         <a:p>
-          <a:pPr marL="285750" lvl="1" indent="-285750" algn="l" defTabSz="1733550">
+          <a:pPr marL="285750" lvl="1" indent="-285750" algn="l" defTabSz="1689100">
             <a:lnSpc>
               <a:spcPct val="90000"/>
             </a:lnSpc>
@@ -20073,12 +21587,12 @@
             <a:buChar char="••"/>
           </a:pPr>
           <a:r>
-            <a:rPr lang="en-US" sz="3900" kern="1200" dirty="0" smtClean="0"/>
+            <a:rPr lang="en-US" sz="3800" kern="1200" dirty="0" smtClean="0"/>
             <a:t>GUI development</a:t>
           </a:r>
         </a:p>
         <a:p>
-          <a:pPr marL="285750" lvl="1" indent="-285750" algn="l" defTabSz="1733550">
+          <a:pPr marL="285750" lvl="1" indent="-285750" algn="l" defTabSz="1689100">
             <a:lnSpc>
               <a:spcPct val="90000"/>
             </a:lnSpc>
@@ -20091,19 +21605,14 @@
             <a:buChar char="••"/>
           </a:pPr>
           <a:r>
-            <a:rPr lang="en-US" sz="3900" kern="1200" dirty="0" smtClean="0"/>
-            <a:t>Website </a:t>
+            <a:rPr lang="en-US" sz="3800" kern="1200" dirty="0" smtClean="0"/>
+            <a:t>Website to highlight strengths</a:t>
           </a:r>
-          <a:r>
-            <a:rPr lang="en-US" sz="3900" kern="1200" dirty="0" smtClean="0"/>
-            <a:t>to highlight strengths</a:t>
-          </a:r>
-          <a:endParaRPr lang="en-US" sz="3900" kern="1200" dirty="0" smtClean="0"/>
         </a:p>
       </dsp:txBody>
       <dsp:txXfrm>
-        <a:off x="0" y="1163064"/>
-        <a:ext cx="8534400" cy="3532815"/>
+        <a:off x="0" y="1216592"/>
+        <a:ext cx="8534400" cy="3425760"/>
       </dsp:txXfrm>
     </dsp:sp>
   </dsp:spTree>
@@ -20443,7 +21952,7 @@
                 </a:solidFill>
               </a:ln>
             </a:rPr>
-            <a:t>Store Data</a:t>
+            <a:t>Our Pillars</a:t>
           </a:r>
           <a:endParaRPr lang="en-US" sz="3600" kern="1200" dirty="0">
             <a:ln>
@@ -21745,6 +23254,223 @@
 </file>
 
 <file path=ppt/diagrams/layout14.xml><?xml version="1.0" encoding="utf-8"?>
+<dgm:layoutDef xmlns:dgm="http://schemas.openxmlformats.org/drawingml/2006/diagram" xmlns:a="http://schemas.openxmlformats.org/drawingml/2006/main" uniqueId="urn:microsoft.com/office/officeart/2005/8/layout/hList1">
+  <dgm:title val=""/>
+  <dgm:desc val=""/>
+  <dgm:catLst>
+    <dgm:cat type="list" pri="5000"/>
+    <dgm:cat type="convert" pri="5000"/>
+  </dgm:catLst>
+  <dgm:sampData>
+    <dgm:dataModel>
+      <dgm:ptLst>
+        <dgm:pt modelId="0" type="doc"/>
+        <dgm:pt modelId="1">
+          <dgm:prSet phldr="1"/>
+        </dgm:pt>
+        <dgm:pt modelId="11">
+          <dgm:prSet phldr="1"/>
+        </dgm:pt>
+        <dgm:pt modelId="12">
+          <dgm:prSet phldr="1"/>
+        </dgm:pt>
+        <dgm:pt modelId="2">
+          <dgm:prSet phldr="1"/>
+        </dgm:pt>
+        <dgm:pt modelId="21">
+          <dgm:prSet phldr="1"/>
+        </dgm:pt>
+        <dgm:pt modelId="22">
+          <dgm:prSet phldr="1"/>
+        </dgm:pt>
+        <dgm:pt modelId="3">
+          <dgm:prSet phldr="1"/>
+        </dgm:pt>
+        <dgm:pt modelId="31">
+          <dgm:prSet phldr="1"/>
+        </dgm:pt>
+        <dgm:pt modelId="32">
+          <dgm:prSet phldr="1"/>
+        </dgm:pt>
+      </dgm:ptLst>
+      <dgm:cxnLst>
+        <dgm:cxn modelId="4" srcId="0" destId="1" srcOrd="0" destOrd="0"/>
+        <dgm:cxn modelId="5" srcId="0" destId="2" srcOrd="1" destOrd="0"/>
+        <dgm:cxn modelId="6" srcId="0" destId="3" srcOrd="2" destOrd="0"/>
+        <dgm:cxn modelId="13" srcId="1" destId="11" srcOrd="0" destOrd="0"/>
+        <dgm:cxn modelId="14" srcId="1" destId="12" srcOrd="1" destOrd="0"/>
+        <dgm:cxn modelId="23" srcId="2" destId="21" srcOrd="0" destOrd="0"/>
+        <dgm:cxn modelId="24" srcId="2" destId="22" srcOrd="1" destOrd="0"/>
+        <dgm:cxn modelId="33" srcId="3" destId="31" srcOrd="0" destOrd="0"/>
+        <dgm:cxn modelId="34" srcId="3" destId="32" srcOrd="1" destOrd="0"/>
+      </dgm:cxnLst>
+      <dgm:bg/>
+      <dgm:whole/>
+    </dgm:dataModel>
+  </dgm:sampData>
+  <dgm:styleData>
+    <dgm:dataModel>
+      <dgm:ptLst>
+        <dgm:pt modelId="0" type="doc"/>
+        <dgm:pt modelId="1">
+          <dgm:prSet phldr="1"/>
+        </dgm:pt>
+        <dgm:pt modelId="2">
+          <dgm:prSet phldr="1"/>
+        </dgm:pt>
+      </dgm:ptLst>
+      <dgm:cxnLst>
+        <dgm:cxn modelId="3" srcId="0" destId="1" srcOrd="0" destOrd="0"/>
+        <dgm:cxn modelId="4" srcId="0" destId="2" srcOrd="1" destOrd="0"/>
+      </dgm:cxnLst>
+      <dgm:bg/>
+      <dgm:whole/>
+    </dgm:dataModel>
+  </dgm:styleData>
+  <dgm:clrData>
+    <dgm:dataModel>
+      <dgm:ptLst>
+        <dgm:pt modelId="0" type="doc"/>
+        <dgm:pt modelId="1">
+          <dgm:prSet phldr="1"/>
+        </dgm:pt>
+        <dgm:pt modelId="2">
+          <dgm:prSet phldr="1"/>
+        </dgm:pt>
+        <dgm:pt modelId="3">
+          <dgm:prSet phldr="1"/>
+        </dgm:pt>
+        <dgm:pt modelId="4">
+          <dgm:prSet phldr="1"/>
+        </dgm:pt>
+      </dgm:ptLst>
+      <dgm:cxnLst>
+        <dgm:cxn modelId="5" srcId="0" destId="1" srcOrd="0" destOrd="0"/>
+        <dgm:cxn modelId="6" srcId="0" destId="2" srcOrd="1" destOrd="0"/>
+        <dgm:cxn modelId="7" srcId="0" destId="3" srcOrd="2" destOrd="0"/>
+        <dgm:cxn modelId="8" srcId="0" destId="4" srcOrd="3" destOrd="0"/>
+      </dgm:cxnLst>
+      <dgm:bg/>
+      <dgm:whole/>
+    </dgm:dataModel>
+  </dgm:clrData>
+  <dgm:layoutNode name="Name0">
+    <dgm:varLst>
+      <dgm:dir/>
+      <dgm:animLvl val="lvl"/>
+      <dgm:resizeHandles val="exact"/>
+    </dgm:varLst>
+    <dgm:choose name="Name1">
+      <dgm:if name="Name2" func="var" arg="dir" op="equ" val="norm">
+        <dgm:alg type="lin"/>
+      </dgm:if>
+      <dgm:else name="Name3">
+        <dgm:alg type="lin">
+          <dgm:param type="linDir" val="fromR"/>
+        </dgm:alg>
+      </dgm:else>
+    </dgm:choose>
+    <dgm:shape xmlns:r="http://schemas.openxmlformats.org/officeDocument/2006/relationships" r:blip="">
+      <dgm:adjLst/>
+    </dgm:shape>
+    <dgm:presOf/>
+    <dgm:constrLst>
+      <dgm:constr type="h" for="ch" forName="composite" refType="h"/>
+      <dgm:constr type="w" for="ch" forName="composite" refType="w"/>
+      <dgm:constr type="w" for="des" forName="parTx"/>
+      <dgm:constr type="h" for="des" forName="parTx" op="equ"/>
+      <dgm:constr type="w" for="des" forName="desTx"/>
+      <dgm:constr type="h" for="des" forName="desTx" op="equ"/>
+      <dgm:constr type="primFontSz" for="des" forName="parTx" val="65"/>
+      <dgm:constr type="secFontSz" for="des" forName="desTx" refType="primFontSz" refFor="des" refForName="parTx" op="equ"/>
+      <dgm:constr type="h" for="des" forName="parTx" refType="primFontSz" refFor="des" refForName="parTx" fact="0.8"/>
+      <dgm:constr type="h" for="des" forName="desTx" refType="primFontSz" refFor="des" refForName="parTx" fact="1.22"/>
+      <dgm:constr type="w" for="ch" forName="space" refType="w" refFor="ch" refForName="composite" op="equ" fact="0.14"/>
+    </dgm:constrLst>
+    <dgm:ruleLst>
+      <dgm:rule type="w" for="ch" forName="composite" val="0" fact="NaN" max="NaN"/>
+      <dgm:rule type="primFontSz" for="des" forName="parTx" val="5" fact="NaN" max="NaN"/>
+    </dgm:ruleLst>
+    <dgm:forEach name="Name4" axis="ch" ptType="node">
+      <dgm:layoutNode name="composite">
+        <dgm:alg type="composite"/>
+        <dgm:shape xmlns:r="http://schemas.openxmlformats.org/officeDocument/2006/relationships" r:blip="">
+          <dgm:adjLst/>
+        </dgm:shape>
+        <dgm:presOf/>
+        <dgm:constrLst>
+          <dgm:constr type="l" for="ch" forName="parTx"/>
+          <dgm:constr type="w" for="ch" forName="parTx" refType="w"/>
+          <dgm:constr type="t" for="ch" forName="parTx"/>
+          <dgm:constr type="l" for="ch" forName="desTx"/>
+          <dgm:constr type="w" for="ch" forName="desTx" refType="w" refFor="ch" refForName="parTx"/>
+          <dgm:constr type="t" for="ch" forName="desTx" refType="h" refFor="ch" refForName="parTx"/>
+        </dgm:constrLst>
+        <dgm:ruleLst>
+          <dgm:rule type="h" val="INF" fact="NaN" max="NaN"/>
+        </dgm:ruleLst>
+        <dgm:layoutNode name="parTx" styleLbl="alignNode1">
+          <dgm:varLst>
+            <dgm:chMax val="0"/>
+            <dgm:chPref val="0"/>
+            <dgm:bulletEnabled val="1"/>
+          </dgm:varLst>
+          <dgm:alg type="tx"/>
+          <dgm:shape xmlns:r="http://schemas.openxmlformats.org/officeDocument/2006/relationships" type="rect" r:blip="">
+            <dgm:adjLst/>
+          </dgm:shape>
+          <dgm:presOf axis="self" ptType="node"/>
+          <dgm:constrLst>
+            <dgm:constr type="h" refType="w" op="lte" fact="0.4"/>
+            <dgm:constr type="h"/>
+            <dgm:constr type="tMarg" refType="primFontSz" fact="0.32"/>
+            <dgm:constr type="bMarg" refType="primFontSz" fact="0.32"/>
+          </dgm:constrLst>
+          <dgm:ruleLst>
+            <dgm:rule type="h" val="INF" fact="NaN" max="NaN"/>
+          </dgm:ruleLst>
+        </dgm:layoutNode>
+        <dgm:layoutNode name="desTx" styleLbl="alignAccFollowNode1">
+          <dgm:varLst>
+            <dgm:bulletEnabled val="1"/>
+          </dgm:varLst>
+          <dgm:alg type="tx">
+            <dgm:param type="stBulletLvl" val="1"/>
+          </dgm:alg>
+          <dgm:shape xmlns:r="http://schemas.openxmlformats.org/officeDocument/2006/relationships" type="rect" r:blip="">
+            <dgm:adjLst/>
+          </dgm:shape>
+          <dgm:presOf axis="des" ptType="node"/>
+          <dgm:constrLst>
+            <dgm:constr type="secFontSz" val="65"/>
+            <dgm:constr type="primFontSz" refType="secFontSz"/>
+            <dgm:constr type="h"/>
+            <dgm:constr type="lMarg" refType="primFontSz" fact="0.42"/>
+            <dgm:constr type="tMarg" refType="primFontSz" fact="0.42"/>
+            <dgm:constr type="bMarg" refType="primFontSz" fact="0.63"/>
+          </dgm:constrLst>
+          <dgm:ruleLst>
+            <dgm:rule type="h" val="INF" fact="NaN" max="NaN"/>
+          </dgm:ruleLst>
+        </dgm:layoutNode>
+      </dgm:layoutNode>
+      <dgm:forEach name="Name5" axis="followSib" ptType="sibTrans" cnt="1">
+        <dgm:layoutNode name="space">
+          <dgm:alg type="sp"/>
+          <dgm:shape xmlns:r="http://schemas.openxmlformats.org/officeDocument/2006/relationships" r:blip="">
+            <dgm:adjLst/>
+          </dgm:shape>
+          <dgm:presOf/>
+          <dgm:constrLst/>
+          <dgm:ruleLst/>
+        </dgm:layoutNode>
+      </dgm:forEach>
+    </dgm:forEach>
+  </dgm:layoutNode>
+</dgm:layoutDef>
+</file>
+
+<file path=ppt/diagrams/layout15.xml><?xml version="1.0" encoding="utf-8"?>
 <dgm:layoutDef xmlns:dgm="http://schemas.openxmlformats.org/drawingml/2006/diagram" xmlns:a="http://schemas.openxmlformats.org/drawingml/2006/main" uniqueId="urn:microsoft.com/office/officeart/2005/8/layout/hList1">
   <dgm:title val=""/>
   <dgm:desc val=""/>
@@ -29901,6 +31627,1040 @@
 </dgm:styleDef>
 </file>
 
+<file path=ppt/diagrams/quickStyle15.xml><?xml version="1.0" encoding="utf-8"?>
+<dgm:styleDef xmlns:dgm="http://schemas.openxmlformats.org/drawingml/2006/diagram" xmlns:a="http://schemas.openxmlformats.org/drawingml/2006/main" uniqueId="urn:microsoft.com/office/officeart/2005/8/quickstyle/simple4">
+  <dgm:title val=""/>
+  <dgm:desc val=""/>
+  <dgm:catLst>
+    <dgm:cat type="simple" pri="10400"/>
+  </dgm:catLst>
+  <dgm:scene3d>
+    <a:camera prst="orthographicFront"/>
+    <a:lightRig rig="threePt" dir="t"/>
+  </dgm:scene3d>
+  <dgm:styleLbl name="node0">
+    <dgm:scene3d>
+      <a:camera prst="orthographicFront"/>
+      <a:lightRig rig="threePt" dir="t"/>
+    </dgm:scene3d>
+    <dgm:sp3d/>
+    <dgm:txPr/>
+    <dgm:style>
+      <a:lnRef idx="0">
+        <a:scrgbClr r="0" g="0" b="0"/>
+      </a:lnRef>
+      <a:fillRef idx="3">
+        <a:scrgbClr r="0" g="0" b="0"/>
+      </a:fillRef>
+      <a:effectRef idx="2">
+        <a:scrgbClr r="0" g="0" b="0"/>
+      </a:effectRef>
+      <a:fontRef idx="minor">
+        <a:schemeClr val="lt1"/>
+      </a:fontRef>
+    </dgm:style>
+  </dgm:styleLbl>
+  <dgm:styleLbl name="lnNode1">
+    <dgm:scene3d>
+      <a:camera prst="orthographicFront"/>
+      <a:lightRig rig="threePt" dir="t"/>
+    </dgm:scene3d>
+    <dgm:sp3d/>
+    <dgm:txPr/>
+    <dgm:style>
+      <a:lnRef idx="1">
+        <a:scrgbClr r="0" g="0" b="0"/>
+      </a:lnRef>
+      <a:fillRef idx="3">
+        <a:scrgbClr r="0" g="0" b="0"/>
+      </a:fillRef>
+      <a:effectRef idx="2">
+        <a:scrgbClr r="0" g="0" b="0"/>
+      </a:effectRef>
+      <a:fontRef idx="minor">
+        <a:schemeClr val="lt1"/>
+      </a:fontRef>
+    </dgm:style>
+  </dgm:styleLbl>
+  <dgm:styleLbl name="vennNode1">
+    <dgm:scene3d>
+      <a:camera prst="orthographicFront"/>
+      <a:lightRig rig="threePt" dir="t"/>
+    </dgm:scene3d>
+    <dgm:sp3d/>
+    <dgm:txPr/>
+    <dgm:style>
+      <a:lnRef idx="0">
+        <a:scrgbClr r="0" g="0" b="0"/>
+      </a:lnRef>
+      <a:fillRef idx="3">
+        <a:scrgbClr r="0" g="0" b="0"/>
+      </a:fillRef>
+      <a:effectRef idx="0">
+        <a:scrgbClr r="0" g="0" b="0"/>
+      </a:effectRef>
+      <a:fontRef idx="minor">
+        <a:schemeClr val="tx1"/>
+      </a:fontRef>
+    </dgm:style>
+  </dgm:styleLbl>
+  <dgm:styleLbl name="alignNode1">
+    <dgm:scene3d>
+      <a:camera prst="orthographicFront"/>
+      <a:lightRig rig="threePt" dir="t"/>
+    </dgm:scene3d>
+    <dgm:sp3d/>
+    <dgm:txPr/>
+    <dgm:style>
+      <a:lnRef idx="1">
+        <a:scrgbClr r="0" g="0" b="0"/>
+      </a:lnRef>
+      <a:fillRef idx="3">
+        <a:scrgbClr r="0" g="0" b="0"/>
+      </a:fillRef>
+      <a:effectRef idx="2">
+        <a:scrgbClr r="0" g="0" b="0"/>
+      </a:effectRef>
+      <a:fontRef idx="minor">
+        <a:schemeClr val="lt1"/>
+      </a:fontRef>
+    </dgm:style>
+  </dgm:styleLbl>
+  <dgm:styleLbl name="node1">
+    <dgm:scene3d>
+      <a:camera prst="orthographicFront"/>
+      <a:lightRig rig="threePt" dir="t"/>
+    </dgm:scene3d>
+    <dgm:sp3d/>
+    <dgm:txPr/>
+    <dgm:style>
+      <a:lnRef idx="0">
+        <a:scrgbClr r="0" g="0" b="0"/>
+      </a:lnRef>
+      <a:fillRef idx="3">
+        <a:scrgbClr r="0" g="0" b="0"/>
+      </a:fillRef>
+      <a:effectRef idx="2">
+        <a:scrgbClr r="0" g="0" b="0"/>
+      </a:effectRef>
+      <a:fontRef idx="minor">
+        <a:schemeClr val="lt1"/>
+      </a:fontRef>
+    </dgm:style>
+  </dgm:styleLbl>
+  <dgm:styleLbl name="node2">
+    <dgm:scene3d>
+      <a:camera prst="orthographicFront"/>
+      <a:lightRig rig="threePt" dir="t"/>
+    </dgm:scene3d>
+    <dgm:sp3d/>
+    <dgm:txPr/>
+    <dgm:style>
+      <a:lnRef idx="0">
+        <a:scrgbClr r="0" g="0" b="0"/>
+      </a:lnRef>
+      <a:fillRef idx="3">
+        <a:scrgbClr r="0" g="0" b="0"/>
+      </a:fillRef>
+      <a:effectRef idx="2">
+        <a:scrgbClr r="0" g="0" b="0"/>
+      </a:effectRef>
+      <a:fontRef idx="minor">
+        <a:schemeClr val="lt1"/>
+      </a:fontRef>
+    </dgm:style>
+  </dgm:styleLbl>
+  <dgm:styleLbl name="node3">
+    <dgm:scene3d>
+      <a:camera prst="orthographicFront"/>
+      <a:lightRig rig="threePt" dir="t"/>
+    </dgm:scene3d>
+    <dgm:sp3d/>
+    <dgm:txPr/>
+    <dgm:style>
+      <a:lnRef idx="0">
+        <a:scrgbClr r="0" g="0" b="0"/>
+      </a:lnRef>
+      <a:fillRef idx="3">
+        <a:scrgbClr r="0" g="0" b="0"/>
+      </a:fillRef>
+      <a:effectRef idx="2">
+        <a:scrgbClr r="0" g="0" b="0"/>
+      </a:effectRef>
+      <a:fontRef idx="minor">
+        <a:schemeClr val="lt1"/>
+      </a:fontRef>
+    </dgm:style>
+  </dgm:styleLbl>
+  <dgm:styleLbl name="node4">
+    <dgm:scene3d>
+      <a:camera prst="orthographicFront"/>
+      <a:lightRig rig="threePt" dir="t"/>
+    </dgm:scene3d>
+    <dgm:sp3d/>
+    <dgm:txPr/>
+    <dgm:style>
+      <a:lnRef idx="0">
+        <a:scrgbClr r="0" g="0" b="0"/>
+      </a:lnRef>
+      <a:fillRef idx="3">
+        <a:scrgbClr r="0" g="0" b="0"/>
+      </a:fillRef>
+      <a:effectRef idx="2">
+        <a:scrgbClr r="0" g="0" b="0"/>
+      </a:effectRef>
+      <a:fontRef idx="minor">
+        <a:schemeClr val="lt1"/>
+      </a:fontRef>
+    </dgm:style>
+  </dgm:styleLbl>
+  <dgm:styleLbl name="fgImgPlace1">
+    <dgm:scene3d>
+      <a:camera prst="orthographicFront"/>
+      <a:lightRig rig="threePt" dir="t"/>
+    </dgm:scene3d>
+    <dgm:sp3d/>
+    <dgm:txPr/>
+    <dgm:style>
+      <a:lnRef idx="0">
+        <a:scrgbClr r="0" g="0" b="0"/>
+      </a:lnRef>
+      <a:fillRef idx="1">
+        <a:scrgbClr r="0" g="0" b="0"/>
+      </a:fillRef>
+      <a:effectRef idx="2">
+        <a:scrgbClr r="0" g="0" b="0"/>
+      </a:effectRef>
+      <a:fontRef idx="minor"/>
+    </dgm:style>
+  </dgm:styleLbl>
+  <dgm:styleLbl name="alignImgPlace1">
+    <dgm:scene3d>
+      <a:camera prst="orthographicFront"/>
+      <a:lightRig rig="threePt" dir="t"/>
+    </dgm:scene3d>
+    <dgm:sp3d/>
+    <dgm:txPr/>
+    <dgm:style>
+      <a:lnRef idx="0">
+        <a:scrgbClr r="0" g="0" b="0"/>
+      </a:lnRef>
+      <a:fillRef idx="1">
+        <a:scrgbClr r="0" g="0" b="0"/>
+      </a:fillRef>
+      <a:effectRef idx="2">
+        <a:scrgbClr r="0" g="0" b="0"/>
+      </a:effectRef>
+      <a:fontRef idx="minor"/>
+    </dgm:style>
+  </dgm:styleLbl>
+  <dgm:styleLbl name="bgImgPlace1">
+    <dgm:scene3d>
+      <a:camera prst="orthographicFront"/>
+      <a:lightRig rig="threePt" dir="t"/>
+    </dgm:scene3d>
+    <dgm:sp3d/>
+    <dgm:txPr/>
+    <dgm:style>
+      <a:lnRef idx="0">
+        <a:scrgbClr r="0" g="0" b="0"/>
+      </a:lnRef>
+      <a:fillRef idx="1">
+        <a:scrgbClr r="0" g="0" b="0"/>
+      </a:fillRef>
+      <a:effectRef idx="2">
+        <a:scrgbClr r="0" g="0" b="0"/>
+      </a:effectRef>
+      <a:fontRef idx="minor"/>
+    </dgm:style>
+  </dgm:styleLbl>
+  <dgm:styleLbl name="sibTrans2D1">
+    <dgm:scene3d>
+      <a:camera prst="orthographicFront"/>
+      <a:lightRig rig="threePt" dir="t"/>
+    </dgm:scene3d>
+    <dgm:sp3d/>
+    <dgm:txPr/>
+    <dgm:style>
+      <a:lnRef idx="0">
+        <a:scrgbClr r="0" g="0" b="0"/>
+      </a:lnRef>
+      <a:fillRef idx="3">
+        <a:scrgbClr r="0" g="0" b="0"/>
+      </a:fillRef>
+      <a:effectRef idx="2">
+        <a:scrgbClr r="0" g="0" b="0"/>
+      </a:effectRef>
+      <a:fontRef idx="minor">
+        <a:schemeClr val="lt1"/>
+      </a:fontRef>
+    </dgm:style>
+  </dgm:styleLbl>
+  <dgm:styleLbl name="fgSibTrans2D1">
+    <dgm:scene3d>
+      <a:camera prst="orthographicFront"/>
+      <a:lightRig rig="threePt" dir="t"/>
+    </dgm:scene3d>
+    <dgm:sp3d/>
+    <dgm:txPr/>
+    <dgm:style>
+      <a:lnRef idx="0">
+        <a:scrgbClr r="0" g="0" b="0"/>
+      </a:lnRef>
+      <a:fillRef idx="3">
+        <a:scrgbClr r="0" g="0" b="0"/>
+      </a:fillRef>
+      <a:effectRef idx="2">
+        <a:scrgbClr r="0" g="0" b="0"/>
+      </a:effectRef>
+      <a:fontRef idx="minor">
+        <a:schemeClr val="lt1"/>
+      </a:fontRef>
+    </dgm:style>
+  </dgm:styleLbl>
+  <dgm:styleLbl name="bgSibTrans2D1">
+    <dgm:scene3d>
+      <a:camera prst="orthographicFront"/>
+      <a:lightRig rig="threePt" dir="t"/>
+    </dgm:scene3d>
+    <dgm:sp3d/>
+    <dgm:txPr/>
+    <dgm:style>
+      <a:lnRef idx="0">
+        <a:scrgbClr r="0" g="0" b="0"/>
+      </a:lnRef>
+      <a:fillRef idx="3">
+        <a:scrgbClr r="0" g="0" b="0"/>
+      </a:fillRef>
+      <a:effectRef idx="2">
+        <a:scrgbClr r="0" g="0" b="0"/>
+      </a:effectRef>
+      <a:fontRef idx="minor">
+        <a:schemeClr val="lt1"/>
+      </a:fontRef>
+    </dgm:style>
+  </dgm:styleLbl>
+  <dgm:styleLbl name="sibTrans1D1">
+    <dgm:scene3d>
+      <a:camera prst="orthographicFront"/>
+      <a:lightRig rig="threePt" dir="t"/>
+    </dgm:scene3d>
+    <dgm:sp3d/>
+    <dgm:txPr/>
+    <dgm:style>
+      <a:lnRef idx="1">
+        <a:scrgbClr r="0" g="0" b="0"/>
+      </a:lnRef>
+      <a:fillRef idx="0">
+        <a:scrgbClr r="0" g="0" b="0"/>
+      </a:fillRef>
+      <a:effectRef idx="0">
+        <a:scrgbClr r="0" g="0" b="0"/>
+      </a:effectRef>
+      <a:fontRef idx="minor"/>
+    </dgm:style>
+  </dgm:styleLbl>
+  <dgm:styleLbl name="callout">
+    <dgm:scene3d>
+      <a:camera prst="orthographicFront"/>
+      <a:lightRig rig="threePt" dir="t"/>
+    </dgm:scene3d>
+    <dgm:sp3d/>
+    <dgm:txPr/>
+    <dgm:style>
+      <a:lnRef idx="2">
+        <a:scrgbClr r="0" g="0" b="0"/>
+      </a:lnRef>
+      <a:fillRef idx="1">
+        <a:scrgbClr r="0" g="0" b="0"/>
+      </a:fillRef>
+      <a:effectRef idx="1">
+        <a:scrgbClr r="0" g="0" b="0"/>
+      </a:effectRef>
+      <a:fontRef idx="minor"/>
+    </dgm:style>
+  </dgm:styleLbl>
+  <dgm:styleLbl name="asst0">
+    <dgm:scene3d>
+      <a:camera prst="orthographicFront"/>
+      <a:lightRig rig="threePt" dir="t"/>
+    </dgm:scene3d>
+    <dgm:sp3d/>
+    <dgm:txPr/>
+    <dgm:style>
+      <a:lnRef idx="0">
+        <a:scrgbClr r="0" g="0" b="0"/>
+      </a:lnRef>
+      <a:fillRef idx="3">
+        <a:scrgbClr r="0" g="0" b="0"/>
+      </a:fillRef>
+      <a:effectRef idx="2">
+        <a:scrgbClr r="0" g="0" b="0"/>
+      </a:effectRef>
+      <a:fontRef idx="minor">
+        <a:schemeClr val="lt1"/>
+      </a:fontRef>
+    </dgm:style>
+  </dgm:styleLbl>
+  <dgm:styleLbl name="asst1">
+    <dgm:scene3d>
+      <a:camera prst="orthographicFront"/>
+      <a:lightRig rig="threePt" dir="t"/>
+    </dgm:scene3d>
+    <dgm:sp3d/>
+    <dgm:txPr/>
+    <dgm:style>
+      <a:lnRef idx="0">
+        <a:scrgbClr r="0" g="0" b="0"/>
+      </a:lnRef>
+      <a:fillRef idx="3">
+        <a:scrgbClr r="0" g="0" b="0"/>
+      </a:fillRef>
+      <a:effectRef idx="2">
+        <a:scrgbClr r="0" g="0" b="0"/>
+      </a:effectRef>
+      <a:fontRef idx="minor">
+        <a:schemeClr val="lt1"/>
+      </a:fontRef>
+    </dgm:style>
+  </dgm:styleLbl>
+  <dgm:styleLbl name="asst2">
+    <dgm:scene3d>
+      <a:camera prst="orthographicFront"/>
+      <a:lightRig rig="threePt" dir="t"/>
+    </dgm:scene3d>
+    <dgm:sp3d/>
+    <dgm:txPr/>
+    <dgm:style>
+      <a:lnRef idx="0">
+        <a:scrgbClr r="0" g="0" b="0"/>
+      </a:lnRef>
+      <a:fillRef idx="3">
+        <a:scrgbClr r="0" g="0" b="0"/>
+      </a:fillRef>
+      <a:effectRef idx="2">
+        <a:scrgbClr r="0" g="0" b="0"/>
+      </a:effectRef>
+      <a:fontRef idx="minor">
+        <a:schemeClr val="lt1"/>
+      </a:fontRef>
+    </dgm:style>
+  </dgm:styleLbl>
+  <dgm:styleLbl name="asst3">
+    <dgm:scene3d>
+      <a:camera prst="orthographicFront"/>
+      <a:lightRig rig="threePt" dir="t"/>
+    </dgm:scene3d>
+    <dgm:sp3d/>
+    <dgm:txPr/>
+    <dgm:style>
+      <a:lnRef idx="0">
+        <a:scrgbClr r="0" g="0" b="0"/>
+      </a:lnRef>
+      <a:fillRef idx="3">
+        <a:scrgbClr r="0" g="0" b="0"/>
+      </a:fillRef>
+      <a:effectRef idx="2">
+        <a:scrgbClr r="0" g="0" b="0"/>
+      </a:effectRef>
+      <a:fontRef idx="minor">
+        <a:schemeClr val="lt1"/>
+      </a:fontRef>
+    </dgm:style>
+  </dgm:styleLbl>
+  <dgm:styleLbl name="asst4">
+    <dgm:scene3d>
+      <a:camera prst="orthographicFront"/>
+      <a:lightRig rig="threePt" dir="t"/>
+    </dgm:scene3d>
+    <dgm:sp3d/>
+    <dgm:txPr/>
+    <dgm:style>
+      <a:lnRef idx="0">
+        <a:scrgbClr r="0" g="0" b="0"/>
+      </a:lnRef>
+      <a:fillRef idx="3">
+        <a:scrgbClr r="0" g="0" b="0"/>
+      </a:fillRef>
+      <a:effectRef idx="2">
+        <a:scrgbClr r="0" g="0" b="0"/>
+      </a:effectRef>
+      <a:fontRef idx="minor">
+        <a:schemeClr val="lt1"/>
+      </a:fontRef>
+    </dgm:style>
+  </dgm:styleLbl>
+  <dgm:styleLbl name="parChTrans2D1">
+    <dgm:scene3d>
+      <a:camera prst="orthographicFront"/>
+      <a:lightRig rig="threePt" dir="t"/>
+    </dgm:scene3d>
+    <dgm:sp3d/>
+    <dgm:txPr/>
+    <dgm:style>
+      <a:lnRef idx="0">
+        <a:scrgbClr r="0" g="0" b="0"/>
+      </a:lnRef>
+      <a:fillRef idx="3">
+        <a:scrgbClr r="0" g="0" b="0"/>
+      </a:fillRef>
+      <a:effectRef idx="2">
+        <a:scrgbClr r="0" g="0" b="0"/>
+      </a:effectRef>
+      <a:fontRef idx="minor">
+        <a:schemeClr val="lt1"/>
+      </a:fontRef>
+    </dgm:style>
+  </dgm:styleLbl>
+  <dgm:styleLbl name="parChTrans2D2">
+    <dgm:scene3d>
+      <a:camera prst="orthographicFront"/>
+      <a:lightRig rig="threePt" dir="t"/>
+    </dgm:scene3d>
+    <dgm:sp3d/>
+    <dgm:txPr/>
+    <dgm:style>
+      <a:lnRef idx="0">
+        <a:scrgbClr r="0" g="0" b="0"/>
+      </a:lnRef>
+      <a:fillRef idx="3">
+        <a:scrgbClr r="0" g="0" b="0"/>
+      </a:fillRef>
+      <a:effectRef idx="2">
+        <a:scrgbClr r="0" g="0" b="0"/>
+      </a:effectRef>
+      <a:fontRef idx="minor">
+        <a:schemeClr val="lt1"/>
+      </a:fontRef>
+    </dgm:style>
+  </dgm:styleLbl>
+  <dgm:styleLbl name="parChTrans2D3">
+    <dgm:scene3d>
+      <a:camera prst="orthographicFront"/>
+      <a:lightRig rig="threePt" dir="t"/>
+    </dgm:scene3d>
+    <dgm:sp3d/>
+    <dgm:txPr/>
+    <dgm:style>
+      <a:lnRef idx="1">
+        <a:scrgbClr r="0" g="0" b="0"/>
+      </a:lnRef>
+      <a:fillRef idx="3">
+        <a:scrgbClr r="0" g="0" b="0"/>
+      </a:fillRef>
+      <a:effectRef idx="2">
+        <a:scrgbClr r="0" g="0" b="0"/>
+      </a:effectRef>
+      <a:fontRef idx="minor">
+        <a:schemeClr val="lt1"/>
+      </a:fontRef>
+    </dgm:style>
+  </dgm:styleLbl>
+  <dgm:styleLbl name="parChTrans2D4">
+    <dgm:scene3d>
+      <a:camera prst="orthographicFront"/>
+      <a:lightRig rig="threePt" dir="t"/>
+    </dgm:scene3d>
+    <dgm:sp3d/>
+    <dgm:txPr/>
+    <dgm:style>
+      <a:lnRef idx="1">
+        <a:scrgbClr r="0" g="0" b="0"/>
+      </a:lnRef>
+      <a:fillRef idx="3">
+        <a:scrgbClr r="0" g="0" b="0"/>
+      </a:fillRef>
+      <a:effectRef idx="2">
+        <a:scrgbClr r="0" g="0" b="0"/>
+      </a:effectRef>
+      <a:fontRef idx="minor">
+        <a:schemeClr val="lt1"/>
+      </a:fontRef>
+    </dgm:style>
+  </dgm:styleLbl>
+  <dgm:styleLbl name="parChTrans1D1">
+    <dgm:scene3d>
+      <a:camera prst="orthographicFront"/>
+      <a:lightRig rig="threePt" dir="t"/>
+    </dgm:scene3d>
+    <dgm:sp3d/>
+    <dgm:txPr/>
+    <dgm:style>
+      <a:lnRef idx="1">
+        <a:scrgbClr r="0" g="0" b="0"/>
+      </a:lnRef>
+      <a:fillRef idx="0">
+        <a:scrgbClr r="0" g="0" b="0"/>
+      </a:fillRef>
+      <a:effectRef idx="0">
+        <a:scrgbClr r="0" g="0" b="0"/>
+      </a:effectRef>
+      <a:fontRef idx="minor"/>
+    </dgm:style>
+  </dgm:styleLbl>
+  <dgm:styleLbl name="parChTrans1D2">
+    <dgm:scene3d>
+      <a:camera prst="orthographicFront"/>
+      <a:lightRig rig="threePt" dir="t"/>
+    </dgm:scene3d>
+    <dgm:sp3d/>
+    <dgm:txPr/>
+    <dgm:style>
+      <a:lnRef idx="1">
+        <a:scrgbClr r="0" g="0" b="0"/>
+      </a:lnRef>
+      <a:fillRef idx="0">
+        <a:scrgbClr r="0" g="0" b="0"/>
+      </a:fillRef>
+      <a:effectRef idx="0">
+        <a:scrgbClr r="0" g="0" b="0"/>
+      </a:effectRef>
+      <a:fontRef idx="minor"/>
+    </dgm:style>
+  </dgm:styleLbl>
+  <dgm:styleLbl name="parChTrans1D3">
+    <dgm:scene3d>
+      <a:camera prst="orthographicFront"/>
+      <a:lightRig rig="threePt" dir="t"/>
+    </dgm:scene3d>
+    <dgm:sp3d/>
+    <dgm:txPr/>
+    <dgm:style>
+      <a:lnRef idx="1">
+        <a:scrgbClr r="0" g="0" b="0"/>
+      </a:lnRef>
+      <a:fillRef idx="0">
+        <a:scrgbClr r="0" g="0" b="0"/>
+      </a:fillRef>
+      <a:effectRef idx="0">
+        <a:scrgbClr r="0" g="0" b="0"/>
+      </a:effectRef>
+      <a:fontRef idx="minor"/>
+    </dgm:style>
+  </dgm:styleLbl>
+  <dgm:styleLbl name="parChTrans1D4">
+    <dgm:scene3d>
+      <a:camera prst="orthographicFront"/>
+      <a:lightRig rig="threePt" dir="t"/>
+    </dgm:scene3d>
+    <dgm:sp3d/>
+    <dgm:txPr/>
+    <dgm:style>
+      <a:lnRef idx="1">
+        <a:scrgbClr r="0" g="0" b="0"/>
+      </a:lnRef>
+      <a:fillRef idx="0">
+        <a:scrgbClr r="0" g="0" b="0"/>
+      </a:fillRef>
+      <a:effectRef idx="0">
+        <a:scrgbClr r="0" g="0" b="0"/>
+      </a:effectRef>
+      <a:fontRef idx="minor"/>
+    </dgm:style>
+  </dgm:styleLbl>
+  <dgm:styleLbl name="fgAcc1">
+    <dgm:scene3d>
+      <a:camera prst="orthographicFront"/>
+      <a:lightRig rig="threePt" dir="t"/>
+    </dgm:scene3d>
+    <dgm:sp3d/>
+    <dgm:txPr/>
+    <dgm:style>
+      <a:lnRef idx="1">
+        <a:scrgbClr r="0" g="0" b="0"/>
+      </a:lnRef>
+      <a:fillRef idx="1">
+        <a:scrgbClr r="0" g="0" b="0"/>
+      </a:fillRef>
+      <a:effectRef idx="0">
+        <a:scrgbClr r="0" g="0" b="0"/>
+      </a:effectRef>
+      <a:fontRef idx="minor"/>
+    </dgm:style>
+  </dgm:styleLbl>
+  <dgm:styleLbl name="conFgAcc1">
+    <dgm:scene3d>
+      <a:camera prst="orthographicFront"/>
+      <a:lightRig rig="threePt" dir="t"/>
+    </dgm:scene3d>
+    <dgm:sp3d/>
+    <dgm:txPr/>
+    <dgm:style>
+      <a:lnRef idx="1">
+        <a:scrgbClr r="0" g="0" b="0"/>
+      </a:lnRef>
+      <a:fillRef idx="1">
+        <a:scrgbClr r="0" g="0" b="0"/>
+      </a:fillRef>
+      <a:effectRef idx="0">
+        <a:scrgbClr r="0" g="0" b="0"/>
+      </a:effectRef>
+      <a:fontRef idx="minor"/>
+    </dgm:style>
+  </dgm:styleLbl>
+  <dgm:styleLbl name="alignAcc1">
+    <dgm:scene3d>
+      <a:camera prst="orthographicFront"/>
+      <a:lightRig rig="threePt" dir="t"/>
+    </dgm:scene3d>
+    <dgm:sp3d/>
+    <dgm:txPr/>
+    <dgm:style>
+      <a:lnRef idx="1">
+        <a:scrgbClr r="0" g="0" b="0"/>
+      </a:lnRef>
+      <a:fillRef idx="1">
+        <a:scrgbClr r="0" g="0" b="0"/>
+      </a:fillRef>
+      <a:effectRef idx="0">
+        <a:scrgbClr r="0" g="0" b="0"/>
+      </a:effectRef>
+      <a:fontRef idx="minor"/>
+    </dgm:style>
+  </dgm:styleLbl>
+  <dgm:styleLbl name="trAlignAcc1">
+    <dgm:scene3d>
+      <a:camera prst="orthographicFront"/>
+      <a:lightRig rig="threePt" dir="t"/>
+    </dgm:scene3d>
+    <dgm:sp3d/>
+    <dgm:txPr/>
+    <dgm:style>
+      <a:lnRef idx="1">
+        <a:scrgbClr r="0" g="0" b="0"/>
+      </a:lnRef>
+      <a:fillRef idx="1">
+        <a:scrgbClr r="0" g="0" b="0"/>
+      </a:fillRef>
+      <a:effectRef idx="0">
+        <a:scrgbClr r="0" g="0" b="0"/>
+      </a:effectRef>
+      <a:fontRef idx="minor"/>
+    </dgm:style>
+  </dgm:styleLbl>
+  <dgm:styleLbl name="bgAcc1">
+    <dgm:scene3d>
+      <a:camera prst="orthographicFront"/>
+      <a:lightRig rig="threePt" dir="t"/>
+    </dgm:scene3d>
+    <dgm:sp3d/>
+    <dgm:txPr/>
+    <dgm:style>
+      <a:lnRef idx="1">
+        <a:scrgbClr r="0" g="0" b="0"/>
+      </a:lnRef>
+      <a:fillRef idx="1">
+        <a:scrgbClr r="0" g="0" b="0"/>
+      </a:fillRef>
+      <a:effectRef idx="0">
+        <a:scrgbClr r="0" g="0" b="0"/>
+      </a:effectRef>
+      <a:fontRef idx="minor"/>
+    </dgm:style>
+  </dgm:styleLbl>
+  <dgm:styleLbl name="solidFgAcc1">
+    <dgm:scene3d>
+      <a:camera prst="orthographicFront"/>
+      <a:lightRig rig="threePt" dir="t"/>
+    </dgm:scene3d>
+    <dgm:sp3d/>
+    <dgm:txPr/>
+    <dgm:style>
+      <a:lnRef idx="1">
+        <a:scrgbClr r="0" g="0" b="0"/>
+      </a:lnRef>
+      <a:fillRef idx="1">
+        <a:scrgbClr r="0" g="0" b="0"/>
+      </a:fillRef>
+      <a:effectRef idx="0">
+        <a:scrgbClr r="0" g="0" b="0"/>
+      </a:effectRef>
+      <a:fontRef idx="minor"/>
+    </dgm:style>
+  </dgm:styleLbl>
+  <dgm:styleLbl name="solidAlignAcc1">
+    <dgm:scene3d>
+      <a:camera prst="orthographicFront"/>
+      <a:lightRig rig="threePt" dir="t"/>
+    </dgm:scene3d>
+    <dgm:sp3d/>
+    <dgm:txPr/>
+    <dgm:style>
+      <a:lnRef idx="1">
+        <a:scrgbClr r="0" g="0" b="0"/>
+      </a:lnRef>
+      <a:fillRef idx="1">
+        <a:scrgbClr r="0" g="0" b="0"/>
+      </a:fillRef>
+      <a:effectRef idx="0">
+        <a:scrgbClr r="0" g="0" b="0"/>
+      </a:effectRef>
+      <a:fontRef idx="minor"/>
+    </dgm:style>
+  </dgm:styleLbl>
+  <dgm:styleLbl name="solidBgAcc1">
+    <dgm:scene3d>
+      <a:camera prst="orthographicFront"/>
+      <a:lightRig rig="threePt" dir="t"/>
+    </dgm:scene3d>
+    <dgm:sp3d/>
+    <dgm:txPr/>
+    <dgm:style>
+      <a:lnRef idx="1">
+        <a:scrgbClr r="0" g="0" b="0"/>
+      </a:lnRef>
+      <a:fillRef idx="1">
+        <a:scrgbClr r="0" g="0" b="0"/>
+      </a:fillRef>
+      <a:effectRef idx="0">
+        <a:scrgbClr r="0" g="0" b="0"/>
+      </a:effectRef>
+      <a:fontRef idx="minor"/>
+    </dgm:style>
+  </dgm:styleLbl>
+  <dgm:styleLbl name="fgAccFollowNode1">
+    <dgm:scene3d>
+      <a:camera prst="orthographicFront"/>
+      <a:lightRig rig="threePt" dir="t"/>
+    </dgm:scene3d>
+    <dgm:sp3d/>
+    <dgm:txPr/>
+    <dgm:style>
+      <a:lnRef idx="1">
+        <a:scrgbClr r="0" g="0" b="0"/>
+      </a:lnRef>
+      <a:fillRef idx="1">
+        <a:scrgbClr r="0" g="0" b="0"/>
+      </a:fillRef>
+      <a:effectRef idx="0">
+        <a:scrgbClr r="0" g="0" b="0"/>
+      </a:effectRef>
+      <a:fontRef idx="minor"/>
+    </dgm:style>
+  </dgm:styleLbl>
+  <dgm:styleLbl name="alignAccFollowNode1">
+    <dgm:scene3d>
+      <a:camera prst="orthographicFront"/>
+      <a:lightRig rig="threePt" dir="t"/>
+    </dgm:scene3d>
+    <dgm:sp3d/>
+    <dgm:txPr/>
+    <dgm:style>
+      <a:lnRef idx="1">
+        <a:scrgbClr r="0" g="0" b="0"/>
+      </a:lnRef>
+      <a:fillRef idx="1">
+        <a:scrgbClr r="0" g="0" b="0"/>
+      </a:fillRef>
+      <a:effectRef idx="0">
+        <a:scrgbClr r="0" g="0" b="0"/>
+      </a:effectRef>
+      <a:fontRef idx="minor"/>
+    </dgm:style>
+  </dgm:styleLbl>
+  <dgm:styleLbl name="bgAccFollowNode1">
+    <dgm:scene3d>
+      <a:camera prst="orthographicFront"/>
+      <a:lightRig rig="threePt" dir="t"/>
+    </dgm:scene3d>
+    <dgm:sp3d/>
+    <dgm:txPr/>
+    <dgm:style>
+      <a:lnRef idx="1">
+        <a:scrgbClr r="0" g="0" b="0"/>
+      </a:lnRef>
+      <a:fillRef idx="1">
+        <a:scrgbClr r="0" g="0" b="0"/>
+      </a:fillRef>
+      <a:effectRef idx="0">
+        <a:scrgbClr r="0" g="0" b="0"/>
+      </a:effectRef>
+      <a:fontRef idx="minor"/>
+    </dgm:style>
+  </dgm:styleLbl>
+  <dgm:styleLbl name="fgAcc0">
+    <dgm:scene3d>
+      <a:camera prst="orthographicFront"/>
+      <a:lightRig rig="threePt" dir="t"/>
+    </dgm:scene3d>
+    <dgm:sp3d/>
+    <dgm:txPr/>
+    <dgm:style>
+      <a:lnRef idx="1">
+        <a:scrgbClr r="0" g="0" b="0"/>
+      </a:lnRef>
+      <a:fillRef idx="1">
+        <a:scrgbClr r="0" g="0" b="0"/>
+      </a:fillRef>
+      <a:effectRef idx="0">
+        <a:scrgbClr r="0" g="0" b="0"/>
+      </a:effectRef>
+      <a:fontRef idx="minor"/>
+    </dgm:style>
+  </dgm:styleLbl>
+  <dgm:styleLbl name="fgAcc2">
+    <dgm:scene3d>
+      <a:camera prst="orthographicFront"/>
+      <a:lightRig rig="threePt" dir="t"/>
+    </dgm:scene3d>
+    <dgm:sp3d/>
+    <dgm:txPr/>
+    <dgm:style>
+      <a:lnRef idx="1">
+        <a:scrgbClr r="0" g="0" b="0"/>
+      </a:lnRef>
+      <a:fillRef idx="1">
+        <a:scrgbClr r="0" g="0" b="0"/>
+      </a:fillRef>
+      <a:effectRef idx="0">
+        <a:scrgbClr r="0" g="0" b="0"/>
+      </a:effectRef>
+      <a:fontRef idx="minor"/>
+    </dgm:style>
+  </dgm:styleLbl>
+  <dgm:styleLbl name="fgAcc3">
+    <dgm:scene3d>
+      <a:camera prst="orthographicFront"/>
+      <a:lightRig rig="threePt" dir="t"/>
+    </dgm:scene3d>
+    <dgm:sp3d/>
+    <dgm:txPr/>
+    <dgm:style>
+      <a:lnRef idx="1">
+        <a:scrgbClr r="0" g="0" b="0"/>
+      </a:lnRef>
+      <a:fillRef idx="1">
+        <a:scrgbClr r="0" g="0" b="0"/>
+      </a:fillRef>
+      <a:effectRef idx="0">
+        <a:scrgbClr r="0" g="0" b="0"/>
+      </a:effectRef>
+      <a:fontRef idx="minor"/>
+    </dgm:style>
+  </dgm:styleLbl>
+  <dgm:styleLbl name="fgAcc4">
+    <dgm:scene3d>
+      <a:camera prst="orthographicFront"/>
+      <a:lightRig rig="threePt" dir="t"/>
+    </dgm:scene3d>
+    <dgm:sp3d/>
+    <dgm:txPr/>
+    <dgm:style>
+      <a:lnRef idx="1">
+        <a:scrgbClr r="0" g="0" b="0"/>
+      </a:lnRef>
+      <a:fillRef idx="1">
+        <a:scrgbClr r="0" g="0" b="0"/>
+      </a:fillRef>
+      <a:effectRef idx="0">
+        <a:scrgbClr r="0" g="0" b="0"/>
+      </a:effectRef>
+      <a:fontRef idx="minor"/>
+    </dgm:style>
+  </dgm:styleLbl>
+  <dgm:styleLbl name="bgShp">
+    <dgm:scene3d>
+      <a:camera prst="orthographicFront"/>
+      <a:lightRig rig="threePt" dir="t"/>
+    </dgm:scene3d>
+    <dgm:sp3d/>
+    <dgm:txPr/>
+    <dgm:style>
+      <a:lnRef idx="0">
+        <a:scrgbClr r="0" g="0" b="0"/>
+      </a:lnRef>
+      <a:fillRef idx="1">
+        <a:scrgbClr r="0" g="0" b="0"/>
+      </a:fillRef>
+      <a:effectRef idx="2">
+        <a:scrgbClr r="0" g="0" b="0"/>
+      </a:effectRef>
+      <a:fontRef idx="minor"/>
+    </dgm:style>
+  </dgm:styleLbl>
+  <dgm:styleLbl name="dkBgShp">
+    <dgm:scene3d>
+      <a:camera prst="orthographicFront"/>
+      <a:lightRig rig="threePt" dir="t"/>
+    </dgm:scene3d>
+    <dgm:sp3d/>
+    <dgm:txPr/>
+    <dgm:style>
+      <a:lnRef idx="0">
+        <a:scrgbClr r="0" g="0" b="0"/>
+      </a:lnRef>
+      <a:fillRef idx="1">
+        <a:scrgbClr r="0" g="0" b="0"/>
+      </a:fillRef>
+      <a:effectRef idx="2">
+        <a:scrgbClr r="0" g="0" b="0"/>
+      </a:effectRef>
+      <a:fontRef idx="minor"/>
+    </dgm:style>
+  </dgm:styleLbl>
+  <dgm:styleLbl name="trBgShp">
+    <dgm:scene3d>
+      <a:camera prst="orthographicFront"/>
+      <a:lightRig rig="threePt" dir="t"/>
+    </dgm:scene3d>
+    <dgm:sp3d/>
+    <dgm:txPr/>
+    <dgm:style>
+      <a:lnRef idx="0">
+        <a:scrgbClr r="0" g="0" b="0"/>
+      </a:lnRef>
+      <a:fillRef idx="1">
+        <a:scrgbClr r="0" g="0" b="0"/>
+      </a:fillRef>
+      <a:effectRef idx="0">
+        <a:scrgbClr r="0" g="0" b="0"/>
+      </a:effectRef>
+      <a:fontRef idx="minor"/>
+    </dgm:style>
+  </dgm:styleLbl>
+  <dgm:styleLbl name="fgShp">
+    <dgm:scene3d>
+      <a:camera prst="orthographicFront"/>
+      <a:lightRig rig="threePt" dir="t"/>
+    </dgm:scene3d>
+    <dgm:sp3d/>
+    <dgm:txPr/>
+    <dgm:style>
+      <a:lnRef idx="0">
+        <a:scrgbClr r="0" g="0" b="0"/>
+      </a:lnRef>
+      <a:fillRef idx="3">
+        <a:scrgbClr r="0" g="0" b="0"/>
+      </a:fillRef>
+      <a:effectRef idx="2">
+        <a:scrgbClr r="0" g="0" b="0"/>
+      </a:effectRef>
+      <a:fontRef idx="minor"/>
+    </dgm:style>
+  </dgm:styleLbl>
+  <dgm:styleLbl name="revTx">
+    <dgm:scene3d>
+      <a:camera prst="orthographicFront"/>
+      <a:lightRig rig="threePt" dir="t"/>
+    </dgm:scene3d>
+    <dgm:sp3d/>
+    <dgm:txPr/>
+    <dgm:style>
+      <a:lnRef idx="0">
+        <a:scrgbClr r="0" g="0" b="0"/>
+      </a:lnRef>
+      <a:fillRef idx="0">
+        <a:scrgbClr r="0" g="0" b="0"/>
+      </a:fillRef>
+      <a:effectRef idx="0">
+        <a:scrgbClr r="0" g="0" b="0"/>
+      </a:effectRef>
+      <a:fontRef idx="minor"/>
+    </dgm:style>
+  </dgm:styleLbl>
+</dgm:styleDef>
+</file>
+
 <file path=ppt/diagrams/quickStyle2.xml><?xml version="1.0" encoding="utf-8"?>
 <dgm:styleDef xmlns:dgm="http://schemas.openxmlformats.org/drawingml/2006/diagram" xmlns:a="http://schemas.openxmlformats.org/drawingml/2006/main" uniqueId="urn:microsoft.com/office/officeart/2005/8/quickstyle/simple4">
   <dgm:title val=""/>
@@ -38255,7 +41015,7 @@
           <a:p>
             <a:fld id="{57C9B819-503E-904F-9CD9-C0FC85399753}" type="datetimeFigureOut">
               <a:rPr lang="en-US" smtClean="0"/>
-              <a:t>1/18/14</a:t>
+              <a:t>1/20/14</a:t>
             </a:fld>
             <a:endParaRPr lang="en-US"/>
           </a:p>
@@ -39015,6 +41775,91 @@
               <a:rPr lang="en-US" smtClean="0"/>
               <a:pPr/>
               <a:t>15</a:t>
+            </a:fld>
+            <a:endParaRPr lang="en-US"/>
+          </a:p>
+        </p:txBody>
+      </p:sp>
+    </p:spTree>
+    <p:extLst>
+      <p:ext uri="{BB962C8B-B14F-4D97-AF65-F5344CB8AC3E}">
+        <p14:creationId xmlns:p14="http://schemas.microsoft.com/office/powerpoint/2010/main" val="262088401"/>
+      </p:ext>
+    </p:extLst>
+  </p:cSld>
+  <p:clrMapOvr>
+    <a:masterClrMapping/>
+  </p:clrMapOvr>
+</p:notes>
+</file>
+
+<file path=ppt/notesSlides/notesSlide15.xml><?xml version="1.0" encoding="utf-8"?>
+<p:notes xmlns:a="http://schemas.openxmlformats.org/drawingml/2006/main" xmlns:r="http://schemas.openxmlformats.org/officeDocument/2006/relationships" xmlns:p="http://schemas.openxmlformats.org/presentationml/2006/main">
+  <p:cSld>
+    <p:spTree>
+      <p:nvGrpSpPr>
+        <p:cNvPr id="1" name=""/>
+        <p:cNvGrpSpPr/>
+        <p:nvPr/>
+      </p:nvGrpSpPr>
+      <p:grpSpPr>
+        <a:xfrm>
+          <a:off x="0" y="0"/>
+          <a:ext cx="0" cy="0"/>
+          <a:chOff x="0" y="0"/>
+          <a:chExt cx="0" cy="0"/>
+        </a:xfrm>
+      </p:grpSpPr>
+      <p:sp>
+        <p:nvSpPr>
+          <p:cNvPr id="2" name="Slide Image Placeholder 1"/>
+          <p:cNvSpPr>
+            <a:spLocks noGrp="1" noRot="1" noChangeAspect="1"/>
+          </p:cNvSpPr>
+          <p:nvPr>
+            <p:ph type="sldImg"/>
+          </p:nvPr>
+        </p:nvSpPr>
+        <p:spPr/>
+      </p:sp>
+      <p:sp>
+        <p:nvSpPr>
+          <p:cNvPr id="3" name="Notes Placeholder 2"/>
+          <p:cNvSpPr>
+            <a:spLocks noGrp="1"/>
+          </p:cNvSpPr>
+          <p:nvPr>
+            <p:ph type="body" idx="1"/>
+          </p:nvPr>
+        </p:nvSpPr>
+        <p:spPr/>
+        <p:txBody>
+          <a:bodyPr/>
+          <a:lstStyle/>
+          <a:p>
+            <a:endParaRPr lang="en-US" dirty="0"/>
+          </a:p>
+        </p:txBody>
+      </p:sp>
+      <p:sp>
+        <p:nvSpPr>
+          <p:cNvPr id="4" name="Slide Number Placeholder 3"/>
+          <p:cNvSpPr>
+            <a:spLocks noGrp="1"/>
+          </p:cNvSpPr>
+          <p:nvPr>
+            <p:ph type="sldNum" sz="quarter" idx="10"/>
+          </p:nvPr>
+        </p:nvSpPr>
+        <p:spPr/>
+        <p:txBody>
+          <a:bodyPr/>
+          <a:lstStyle/>
+          <a:p>
+            <a:fld id="{FED5C967-8010-40CB-84CD-9E4E872C88AE}" type="slidenum">
+              <a:rPr lang="en-US" smtClean="0"/>
+              <a:pPr/>
+              <a:t>16</a:t>
             </a:fld>
             <a:endParaRPr lang="en-US"/>
           </a:p>
@@ -39894,7 +42739,7 @@
           <a:p>
             <a:fld id="{0D93FC2B-DB65-B04A-9C42-A47D2314978B}" type="datetimeFigureOut">
               <a:rPr lang="en-US" smtClean="0"/>
-              <a:t>1/18/14</a:t>
+              <a:t>1/20/14</a:t>
             </a:fld>
             <a:endParaRPr lang="en-US"/>
           </a:p>
@@ -40064,7 +42909,7 @@
           <a:p>
             <a:fld id="{0D93FC2B-DB65-B04A-9C42-A47D2314978B}" type="datetimeFigureOut">
               <a:rPr lang="en-US" smtClean="0"/>
-              <a:t>1/18/14</a:t>
+              <a:t>1/20/14</a:t>
             </a:fld>
             <a:endParaRPr lang="en-US"/>
           </a:p>
@@ -40244,7 +43089,7 @@
           <a:p>
             <a:fld id="{0D93FC2B-DB65-B04A-9C42-A47D2314978B}" type="datetimeFigureOut">
               <a:rPr lang="en-US" smtClean="0"/>
-              <a:t>1/18/14</a:t>
+              <a:t>1/20/14</a:t>
             </a:fld>
             <a:endParaRPr lang="en-US"/>
           </a:p>
@@ -40414,7 +43259,7 @@
           <a:p>
             <a:fld id="{0D93FC2B-DB65-B04A-9C42-A47D2314978B}" type="datetimeFigureOut">
               <a:rPr lang="en-US" smtClean="0"/>
-              <a:t>1/18/14</a:t>
+              <a:t>1/20/14</a:t>
             </a:fld>
             <a:endParaRPr lang="en-US"/>
           </a:p>
@@ -40660,7 +43505,7 @@
           <a:p>
             <a:fld id="{0D93FC2B-DB65-B04A-9C42-A47D2314978B}" type="datetimeFigureOut">
               <a:rPr lang="en-US" smtClean="0"/>
-              <a:t>1/18/14</a:t>
+              <a:t>1/20/14</a:t>
             </a:fld>
             <a:endParaRPr lang="en-US"/>
           </a:p>
@@ -40948,7 +43793,7 @@
           <a:p>
             <a:fld id="{0D93FC2B-DB65-B04A-9C42-A47D2314978B}" type="datetimeFigureOut">
               <a:rPr lang="en-US" smtClean="0"/>
-              <a:t>1/18/14</a:t>
+              <a:t>1/20/14</a:t>
             </a:fld>
             <a:endParaRPr lang="en-US"/>
           </a:p>
@@ -41370,7 +44215,7 @@
           <a:p>
             <a:fld id="{0D93FC2B-DB65-B04A-9C42-A47D2314978B}" type="datetimeFigureOut">
               <a:rPr lang="en-US" smtClean="0"/>
-              <a:t>1/18/14</a:t>
+              <a:t>1/20/14</a:t>
             </a:fld>
             <a:endParaRPr lang="en-US"/>
           </a:p>
@@ -41488,7 +44333,7 @@
           <a:p>
             <a:fld id="{0D93FC2B-DB65-B04A-9C42-A47D2314978B}" type="datetimeFigureOut">
               <a:rPr lang="en-US" smtClean="0"/>
-              <a:t>1/18/14</a:t>
+              <a:t>1/20/14</a:t>
             </a:fld>
             <a:endParaRPr lang="en-US"/>
           </a:p>
@@ -41583,7 +44428,7 @@
           <a:p>
             <a:fld id="{0D93FC2B-DB65-B04A-9C42-A47D2314978B}" type="datetimeFigureOut">
               <a:rPr lang="en-US" smtClean="0"/>
-              <a:t>1/18/14</a:t>
+              <a:t>1/20/14</a:t>
             </a:fld>
             <a:endParaRPr lang="en-US"/>
           </a:p>
@@ -41860,7 +44705,7 @@
           <a:p>
             <a:fld id="{0D93FC2B-DB65-B04A-9C42-A47D2314978B}" type="datetimeFigureOut">
               <a:rPr lang="en-US" smtClean="0"/>
-              <a:t>1/18/14</a:t>
+              <a:t>1/20/14</a:t>
             </a:fld>
             <a:endParaRPr lang="en-US"/>
           </a:p>
@@ -42113,7 +44958,7 @@
           <a:p>
             <a:fld id="{0D93FC2B-DB65-B04A-9C42-A47D2314978B}" type="datetimeFigureOut">
               <a:rPr lang="en-US" smtClean="0"/>
-              <a:t>1/18/14</a:t>
+              <a:t>1/20/14</a:t>
             </a:fld>
             <a:endParaRPr lang="en-US"/>
           </a:p>
@@ -42326,7 +45171,7 @@
           <a:p>
             <a:fld id="{0D93FC2B-DB65-B04A-9C42-A47D2314978B}" type="datetimeFigureOut">
               <a:rPr lang="en-US" smtClean="0"/>
-              <a:t>1/18/14</a:t>
+              <a:t>1/20/14</a:t>
             </a:fld>
             <a:endParaRPr lang="en-US"/>
           </a:p>
@@ -43219,6 +46064,226 @@
           <p:nvPr>
             <p:extLst>
               <p:ext uri="{D42A27DB-BD31-4B8C-83A1-F6EECF244321}">
+                <p14:modId xmlns:p14="http://schemas.microsoft.com/office/powerpoint/2010/main" val="3915194616"/>
+              </p:ext>
+            </p:extLst>
+          </p:nvPr>
+        </p:nvGraphicFramePr>
+        <p:xfrm>
+          <a:off x="278343" y="1200984"/>
+          <a:ext cx="8534400" cy="4916104"/>
+        </p:xfrm>
+        <a:graphic>
+          <a:graphicData uri="http://schemas.openxmlformats.org/drawingml/2006/diagram">
+            <dgm:relIds xmlns:dgm="http://schemas.openxmlformats.org/drawingml/2006/diagram" xmlns:r="http://schemas.openxmlformats.org/officeDocument/2006/relationships" r:dm="rId3" r:lo="rId4" r:qs="rId5" r:cs="rId6"/>
+          </a:graphicData>
+        </a:graphic>
+      </p:graphicFrame>
+      <p:cxnSp>
+        <p:nvCxnSpPr>
+          <p:cNvPr id="13" name="Straight Connector 12"/>
+          <p:cNvCxnSpPr/>
+          <p:nvPr/>
+        </p:nvCxnSpPr>
+        <p:spPr>
+          <a:xfrm>
+            <a:off x="0" y="6400800"/>
+            <a:ext cx="9144000" cy="0"/>
+          </a:xfrm>
+          <a:prstGeom prst="line">
+            <a:avLst/>
+          </a:prstGeom>
+          <a:ln>
+            <a:solidFill>
+              <a:srgbClr val="8EB4E3"/>
+            </a:solidFill>
+          </a:ln>
+          <a:effectLst/>
+        </p:spPr>
+        <p:style>
+          <a:lnRef idx="3">
+            <a:schemeClr val="accent2"/>
+          </a:lnRef>
+          <a:fillRef idx="0">
+            <a:schemeClr val="accent2"/>
+          </a:fillRef>
+          <a:effectRef idx="2">
+            <a:schemeClr val="accent2"/>
+          </a:effectRef>
+          <a:fontRef idx="minor">
+            <a:schemeClr val="tx1"/>
+          </a:fontRef>
+        </p:style>
+      </p:cxnSp>
+      <p:pic>
+        <p:nvPicPr>
+          <p:cNvPr id="12" name="Picture 11" descr="Mini Logo.png"/>
+          <p:cNvPicPr>
+            <a:picLocks noChangeAspect="1"/>
+          </p:cNvPicPr>
+          <p:nvPr/>
+        </p:nvPicPr>
+        <p:blipFill>
+          <a:blip r:embed="rId8">
+            <a:extLst>
+              <a:ext uri="{28A0092B-C50C-407E-A947-70E740481C1C}">
+                <a14:useLocalDpi xmlns:a14="http://schemas.microsoft.com/office/drawing/2010/main" val="0"/>
+              </a:ext>
+            </a:extLst>
+          </a:blip>
+          <a:stretch>
+            <a:fillRect/>
+          </a:stretch>
+        </p:blipFill>
+        <p:spPr>
+          <a:xfrm>
+            <a:off x="7202869" y="0"/>
+            <a:ext cx="1941131" cy="680320"/>
+          </a:xfrm>
+          <a:prstGeom prst="rect">
+            <a:avLst/>
+          </a:prstGeom>
+        </p:spPr>
+      </p:pic>
+      <p:pic>
+        <p:nvPicPr>
+          <p:cNvPr id="4" name="Picture 3"/>
+          <p:cNvPicPr>
+            <a:picLocks noChangeAspect="1"/>
+          </p:cNvPicPr>
+          <p:nvPr/>
+        </p:nvPicPr>
+        <p:blipFill>
+          <a:blip r:embed="rId9"/>
+          <a:stretch>
+            <a:fillRect/>
+          </a:stretch>
+        </p:blipFill>
+        <p:spPr>
+          <a:xfrm>
+            <a:off x="278343" y="2661149"/>
+            <a:ext cx="8534400" cy="2566603"/>
+          </a:xfrm>
+          <a:prstGeom prst="rect">
+            <a:avLst/>
+          </a:prstGeom>
+        </p:spPr>
+      </p:pic>
+    </p:spTree>
+    <p:extLst>
+      <p:ext uri="{BB962C8B-B14F-4D97-AF65-F5344CB8AC3E}">
+        <p14:creationId xmlns:p14="http://schemas.microsoft.com/office/powerpoint/2010/main" val="429940160"/>
+      </p:ext>
+    </p:extLst>
+  </p:cSld>
+  <p:clrMapOvr>
+    <a:masterClrMapping/>
+  </p:clrMapOvr>
+  <p:transition xmlns:p14="http://schemas.microsoft.com/office/powerpoint/2010/main" spd="slow">
+    <p:push dir="u"/>
+  </p:transition>
+  <p:timing>
+    <p:tnLst>
+      <p:par>
+        <p:cTn xmlns:p14="http://schemas.microsoft.com/office/powerpoint/2010/main" id="1" dur="indefinite" restart="never" nodeType="tmRoot"/>
+      </p:par>
+    </p:tnLst>
+  </p:timing>
+</p:sld>
+</file>
+
+<file path=ppt/slides/slide11.xml><?xml version="1.0" encoding="utf-8"?>
+<p:sld xmlns:a="http://schemas.openxmlformats.org/drawingml/2006/main" xmlns:r="http://schemas.openxmlformats.org/officeDocument/2006/relationships" xmlns:p="http://schemas.openxmlformats.org/presentationml/2006/main">
+  <p:cSld>
+    <p:spTree>
+      <p:nvGrpSpPr>
+        <p:cNvPr id="1" name=""/>
+        <p:cNvGrpSpPr/>
+        <p:nvPr/>
+      </p:nvGrpSpPr>
+      <p:grpSpPr>
+        <a:xfrm>
+          <a:off x="0" y="0"/>
+          <a:ext cx="0" cy="0"/>
+          <a:chOff x="0" y="0"/>
+          <a:chExt cx="0" cy="0"/>
+        </a:xfrm>
+      </p:grpSpPr>
+      <p:cxnSp>
+        <p:nvCxnSpPr>
+          <p:cNvPr id="6" name="Straight Connector 5"/>
+          <p:cNvCxnSpPr/>
+          <p:nvPr/>
+        </p:nvCxnSpPr>
+        <p:spPr>
+          <a:xfrm>
+            <a:off x="0" y="838200"/>
+            <a:ext cx="9144000" cy="0"/>
+          </a:xfrm>
+          <a:prstGeom prst="line">
+            <a:avLst/>
+          </a:prstGeom>
+          <a:ln>
+            <a:solidFill>
+              <a:schemeClr val="tx2">
+                <a:lumMod val="40000"/>
+                <a:lumOff val="60000"/>
+              </a:schemeClr>
+            </a:solidFill>
+          </a:ln>
+          <a:effectLst/>
+        </p:spPr>
+        <p:style>
+          <a:lnRef idx="3">
+            <a:schemeClr val="accent2"/>
+          </a:lnRef>
+          <a:fillRef idx="0">
+            <a:schemeClr val="accent2"/>
+          </a:fillRef>
+          <a:effectRef idx="2">
+            <a:schemeClr val="accent2"/>
+          </a:effectRef>
+          <a:fontRef idx="minor">
+            <a:schemeClr val="tx1"/>
+          </a:fontRef>
+        </p:style>
+      </p:cxnSp>
+      <p:sp>
+        <p:nvSpPr>
+          <p:cNvPr id="7" name="TextBox 6"/>
+          <p:cNvSpPr txBox="1"/>
+          <p:nvPr/>
+        </p:nvSpPr>
+        <p:spPr>
+          <a:xfrm>
+            <a:off x="457200" y="253425"/>
+            <a:ext cx="6324600" cy="584776"/>
+          </a:xfrm>
+          <a:prstGeom prst="rect">
+            <a:avLst/>
+          </a:prstGeom>
+          <a:noFill/>
+        </p:spPr>
+        <p:txBody>
+          <a:bodyPr wrap="square" rtlCol="0">
+            <a:spAutoFit/>
+          </a:bodyPr>
+          <a:lstStyle/>
+          <a:p>
+            <a:endParaRPr lang="en-US" sz="3200" dirty="0">
+              <a:latin typeface="Arial" pitchFamily="34" charset="0"/>
+              <a:cs typeface="Arial" pitchFamily="34" charset="0"/>
+            </a:endParaRPr>
+          </a:p>
+        </p:txBody>
+      </p:sp>
+      <p:graphicFrame>
+        <p:nvGraphicFramePr>
+          <p:cNvPr id="19" name="Diagram 18"/>
+          <p:cNvGraphicFramePr/>
+          <p:nvPr>
+            <p:extLst>
+              <p:ext uri="{D42A27DB-BD31-4B8C-83A1-F6EECF244321}">
                 <p14:modId xmlns:p14="http://schemas.microsoft.com/office/powerpoint/2010/main" val="2493850331"/>
               </p:ext>
             </p:extLst>
@@ -43353,7 +46418,7 @@
 </p:sld>
 </file>
 
-<file path=ppt/slides/slide11.xml><?xml version="1.0" encoding="utf-8"?>
+<file path=ppt/slides/slide12.xml><?xml version="1.0" encoding="utf-8"?>
 <p:sld xmlns:a="http://schemas.openxmlformats.org/drawingml/2006/main" xmlns:r="http://schemas.openxmlformats.org/officeDocument/2006/relationships" xmlns:p="http://schemas.openxmlformats.org/presentationml/2006/main">
   <p:cSld>
     <p:spTree>
@@ -43579,7 +46644,7 @@
 </p:sld>
 </file>
 
-<file path=ppt/slides/slide12.xml><?xml version="1.0" encoding="utf-8"?>
+<file path=ppt/slides/slide13.xml><?xml version="1.0" encoding="utf-8"?>
 <p:sld xmlns:a="http://schemas.openxmlformats.org/drawingml/2006/main" xmlns:r="http://schemas.openxmlformats.org/officeDocument/2006/relationships" xmlns:p="http://schemas.openxmlformats.org/presentationml/2006/main">
   <p:cSld>
     <p:spTree>
@@ -43774,7 +46839,7 @@
         </p:blipFill>
         <p:spPr>
           <a:xfrm>
-            <a:off x="1322698" y="2131489"/>
+            <a:off x="1322698" y="2119160"/>
             <a:ext cx="6515100" cy="3912601"/>
           </a:xfrm>
           <a:prstGeom prst="rect">
@@ -43805,7 +46870,7 @@
 </p:sld>
 </file>
 
-<file path=ppt/slides/slide13.xml><?xml version="1.0" encoding="utf-8"?>
+<file path=ppt/slides/slide14.xml><?xml version="1.0" encoding="utf-8"?>
 <p:sld xmlns:a="http://schemas.openxmlformats.org/drawingml/2006/main" xmlns:r="http://schemas.openxmlformats.org/officeDocument/2006/relationships" xmlns:p="http://schemas.openxmlformats.org/presentationml/2006/main">
   <p:cSld>
     <p:spTree>
@@ -44001,7 +47066,7 @@
 </p:sld>
 </file>
 
-<file path=ppt/slides/slide14.xml><?xml version="1.0" encoding="utf-8"?>
+<file path=ppt/slides/slide15.xml><?xml version="1.0" encoding="utf-8"?>
 <p:sld xmlns:a="http://schemas.openxmlformats.org/drawingml/2006/main" xmlns:r="http://schemas.openxmlformats.org/officeDocument/2006/relationships" xmlns:p="http://schemas.openxmlformats.org/presentationml/2006/main">
   <p:cSld>
     <p:spTree>
@@ -44197,7 +47262,7 @@
 </p:sld>
 </file>
 
-<file path=ppt/slides/slide15.xml><?xml version="1.0" encoding="utf-8"?>
+<file path=ppt/slides/slide16.xml><?xml version="1.0" encoding="utf-8"?>
 <p:sld xmlns:a="http://schemas.openxmlformats.org/drawingml/2006/main" xmlns:r="http://schemas.openxmlformats.org/officeDocument/2006/relationships" xmlns:p="http://schemas.openxmlformats.org/presentationml/2006/main">
   <p:cSld>
     <p:spTree>
@@ -44737,7 +47802,7 @@
 </p:sld>
 </file>
 
-<file path=ppt/slides/slide16.xml><?xml version="1.0" encoding="utf-8"?>
+<file path=ppt/slides/slide17.xml><?xml version="1.0" encoding="utf-8"?>
 <p:sld xmlns:a="http://schemas.openxmlformats.org/drawingml/2006/main" xmlns:r="http://schemas.openxmlformats.org/officeDocument/2006/relationships" xmlns:p="http://schemas.openxmlformats.org/presentationml/2006/main">
   <p:cSld>
     <p:spTree>
@@ -45037,11 +48102,6 @@
               </a:rPr>
               <a:t>Thank you for your time!</a:t>
             </a:r>
-            <a:endParaRPr lang="en-US" dirty="0" smtClean="0">
-              <a:solidFill>
-                <a:schemeClr val="bg1"/>
-              </a:solidFill>
-            </a:endParaRPr>
           </a:p>
           <a:p>
             <a:endParaRPr lang="en-US" dirty="0" smtClean="0">
@@ -46103,13 +49163,13 @@
   <p:clrMapOvr>
     <a:masterClrMapping/>
   </p:clrMapOvr>
-  <mc:AlternateContent xmlns:mc="http://schemas.openxmlformats.org/markup-compatibility/2006">
-    <mc:Choice xmlns:p14="http://schemas.microsoft.com/office/powerpoint/2010/main" Requires="p14">
+  <mc:AlternateContent xmlns:mc="http://schemas.openxmlformats.org/markup-compatibility/2006" xmlns:p14="http://schemas.microsoft.com/office/powerpoint/2010/main">
+    <mc:Choice Requires="p14">
       <p:transition spd="slow" p14:dur="1200">
         <p:dissolve/>
       </p:transition>
     </mc:Choice>
-    <mc:Fallback>
+    <mc:Fallback xmlns="">
       <p:transition xmlns:p14="http://schemas.microsoft.com/office/powerpoint/2010/main" spd="slow">
         <p:dissolve/>
       </p:transition>
@@ -46413,7 +49473,7 @@
           <p:nvPr>
             <p:extLst>
               <p:ext uri="{D42A27DB-BD31-4B8C-83A1-F6EECF244321}">
-                <p14:modId xmlns:p14="http://schemas.microsoft.com/office/powerpoint/2010/main" val="1718381791"/>
+                <p14:modId xmlns:p14="http://schemas.microsoft.com/office/powerpoint/2010/main" val="2760820124"/>
               </p:ext>
             </p:extLst>
           </p:nvPr>

</xml_diff>